<commit_message>
Future Work added Citation added
</commit_message>
<xml_diff>
--- a/QuickShop_DEMO.pptx
+++ b/QuickShop_DEMO.pptx
@@ -5,14 +5,14 @@
     <p:sldMasterId id="2147483648" r:id="rId1"/>
   </p:sldMasterIdLst>
   <p:notesMasterIdLst>
-    <p:notesMasterId r:id="rId19"/>
+    <p:notesMasterId r:id="rId26"/>
   </p:notesMasterIdLst>
   <p:sldIdLst>
     <p:sldId id="256" r:id="rId2"/>
     <p:sldId id="257" r:id="rId3"/>
     <p:sldId id="258" r:id="rId4"/>
-    <p:sldId id="263" r:id="rId5"/>
-    <p:sldId id="259" r:id="rId6"/>
+    <p:sldId id="259" r:id="rId5"/>
+    <p:sldId id="263" r:id="rId6"/>
     <p:sldId id="260" r:id="rId7"/>
     <p:sldId id="262" r:id="rId8"/>
     <p:sldId id="261" r:id="rId9"/>
@@ -25,6 +25,13 @@
     <p:sldId id="269" r:id="rId16"/>
     <p:sldId id="271" r:id="rId17"/>
     <p:sldId id="272" r:id="rId18"/>
+    <p:sldId id="273" r:id="rId19"/>
+    <p:sldId id="274" r:id="rId20"/>
+    <p:sldId id="275" r:id="rId21"/>
+    <p:sldId id="276" r:id="rId22"/>
+    <p:sldId id="277" r:id="rId23"/>
+    <p:sldId id="278" r:id="rId24"/>
+    <p:sldId id="279" r:id="rId25"/>
   </p:sldIdLst>
   <p:sldSz cx="9144000" cy="6858000" type="screen4x3"/>
   <p:notesSz cx="6858000" cy="9144000"/>
@@ -553,7 +560,7 @@
           <a:p>
             <a:fld id="{F7F49BCA-9C73-C343-9229-B959DA883FBA}" type="slidenum">
               <a:rPr lang="en-US" smtClean="0"/>
-              <a:t>5</a:t>
+              <a:t>4</a:t>
             </a:fld>
             <a:endParaRPr lang="en-US"/>
           </a:p>
@@ -655,6 +662,174 @@
     <p:extLst>
       <p:ext uri="{BB962C8B-B14F-4D97-AF65-F5344CB8AC3E}">
         <p14:creationId xmlns:p14="http://schemas.microsoft.com/office/powerpoint/2010/main" val="4059426552"/>
+      </p:ext>
+    </p:extLst>
+  </p:cSld>
+  <p:clrMapOvr>
+    <a:masterClrMapping/>
+  </p:clrMapOvr>
+</p:notes>
+</file>
+
+<file path=ppt/notesSlides/notesSlide3.xml><?xml version="1.0" encoding="utf-8"?>
+<p:notes xmlns:a="http://schemas.openxmlformats.org/drawingml/2006/main" xmlns:r="http://schemas.openxmlformats.org/officeDocument/2006/relationships" xmlns:p="http://schemas.openxmlformats.org/presentationml/2006/main">
+  <p:cSld>
+    <p:spTree>
+      <p:nvGrpSpPr>
+        <p:cNvPr id="1" name=""/>
+        <p:cNvGrpSpPr/>
+        <p:nvPr/>
+      </p:nvGrpSpPr>
+      <p:grpSpPr>
+        <a:xfrm>
+          <a:off x="0" y="0"/>
+          <a:ext cx="0" cy="0"/>
+          <a:chOff x="0" y="0"/>
+          <a:chExt cx="0" cy="0"/>
+        </a:xfrm>
+      </p:grpSpPr>
+      <p:sp>
+        <p:nvSpPr>
+          <p:cNvPr id="2" name="Slide Image Placeholder 1"/>
+          <p:cNvSpPr>
+            <a:spLocks noGrp="1" noRot="1" noChangeAspect="1"/>
+          </p:cNvSpPr>
+          <p:nvPr>
+            <p:ph type="sldImg"/>
+          </p:nvPr>
+        </p:nvSpPr>
+        <p:spPr/>
+      </p:sp>
+      <p:sp>
+        <p:nvSpPr>
+          <p:cNvPr id="3" name="Notes Placeholder 2"/>
+          <p:cNvSpPr>
+            <a:spLocks noGrp="1"/>
+          </p:cNvSpPr>
+          <p:nvPr>
+            <p:ph type="body" idx="1"/>
+          </p:nvPr>
+        </p:nvSpPr>
+        <p:spPr/>
+        <p:txBody>
+          <a:bodyPr/>
+          <a:lstStyle/>
+          <a:p>
+            <a:endParaRPr lang="en-US" dirty="0"/>
+          </a:p>
+        </p:txBody>
+      </p:sp>
+      <p:sp>
+        <p:nvSpPr>
+          <p:cNvPr id="4" name="Slide Number Placeholder 3"/>
+          <p:cNvSpPr>
+            <a:spLocks noGrp="1"/>
+          </p:cNvSpPr>
+          <p:nvPr>
+            <p:ph type="sldNum" sz="quarter" idx="10"/>
+          </p:nvPr>
+        </p:nvSpPr>
+        <p:spPr/>
+        <p:txBody>
+          <a:bodyPr/>
+          <a:lstStyle/>
+          <a:p>
+            <a:fld id="{F7F49BCA-9C73-C343-9229-B959DA883FBA}" type="slidenum">
+              <a:rPr lang="en-US" smtClean="0"/>
+              <a:t>15</a:t>
+            </a:fld>
+            <a:endParaRPr lang="en-US"/>
+          </a:p>
+        </p:txBody>
+      </p:sp>
+    </p:spTree>
+    <p:extLst>
+      <p:ext uri="{BB962C8B-B14F-4D97-AF65-F5344CB8AC3E}">
+        <p14:creationId xmlns:p14="http://schemas.microsoft.com/office/powerpoint/2010/main" val="1696418911"/>
+      </p:ext>
+    </p:extLst>
+  </p:cSld>
+  <p:clrMapOvr>
+    <a:masterClrMapping/>
+  </p:clrMapOvr>
+</p:notes>
+</file>
+
+<file path=ppt/notesSlides/notesSlide4.xml><?xml version="1.0" encoding="utf-8"?>
+<p:notes xmlns:a="http://schemas.openxmlformats.org/drawingml/2006/main" xmlns:r="http://schemas.openxmlformats.org/officeDocument/2006/relationships" xmlns:p="http://schemas.openxmlformats.org/presentationml/2006/main">
+  <p:cSld>
+    <p:spTree>
+      <p:nvGrpSpPr>
+        <p:cNvPr id="1" name=""/>
+        <p:cNvGrpSpPr/>
+        <p:nvPr/>
+      </p:nvGrpSpPr>
+      <p:grpSpPr>
+        <a:xfrm>
+          <a:off x="0" y="0"/>
+          <a:ext cx="0" cy="0"/>
+          <a:chOff x="0" y="0"/>
+          <a:chExt cx="0" cy="0"/>
+        </a:xfrm>
+      </p:grpSpPr>
+      <p:sp>
+        <p:nvSpPr>
+          <p:cNvPr id="2" name="Slide Image Placeholder 1"/>
+          <p:cNvSpPr>
+            <a:spLocks noGrp="1" noRot="1" noChangeAspect="1"/>
+          </p:cNvSpPr>
+          <p:nvPr>
+            <p:ph type="sldImg"/>
+          </p:nvPr>
+        </p:nvSpPr>
+        <p:spPr/>
+      </p:sp>
+      <p:sp>
+        <p:nvSpPr>
+          <p:cNvPr id="3" name="Notes Placeholder 2"/>
+          <p:cNvSpPr>
+            <a:spLocks noGrp="1"/>
+          </p:cNvSpPr>
+          <p:nvPr>
+            <p:ph type="body" idx="1"/>
+          </p:nvPr>
+        </p:nvSpPr>
+        <p:spPr/>
+        <p:txBody>
+          <a:bodyPr/>
+          <a:lstStyle/>
+          <a:p>
+            <a:endParaRPr lang="en-US" dirty="0"/>
+          </a:p>
+        </p:txBody>
+      </p:sp>
+      <p:sp>
+        <p:nvSpPr>
+          <p:cNvPr id="4" name="Slide Number Placeholder 3"/>
+          <p:cNvSpPr>
+            <a:spLocks noGrp="1"/>
+          </p:cNvSpPr>
+          <p:nvPr>
+            <p:ph type="sldNum" sz="quarter" idx="10"/>
+          </p:nvPr>
+        </p:nvSpPr>
+        <p:spPr/>
+        <p:txBody>
+          <a:bodyPr/>
+          <a:lstStyle/>
+          <a:p>
+            <a:fld id="{F7F49BCA-9C73-C343-9229-B959DA883FBA}" type="slidenum">
+              <a:rPr lang="en-US" smtClean="0"/>
+              <a:t>19</a:t>
+            </a:fld>
+            <a:endParaRPr lang="en-US"/>
+          </a:p>
+        </p:txBody>
+      </p:sp>
+    </p:spTree>
+    <p:extLst>
+      <p:ext uri="{BB962C8B-B14F-4D97-AF65-F5344CB8AC3E}">
+        <p14:creationId xmlns:p14="http://schemas.microsoft.com/office/powerpoint/2010/main" val="1557302019"/>
       </p:ext>
     </p:extLst>
   </p:cSld>
@@ -13916,7 +14091,7 @@
           <p:nvPr/>
         </p:nvPicPr>
         <p:blipFill>
-          <a:blip r:embed="rId2"/>
+          <a:blip r:embed="rId3"/>
           <a:stretch>
             <a:fillRect/>
           </a:stretch>
@@ -13940,7 +14115,7 @@
           <p:nvPr/>
         </p:nvPicPr>
         <p:blipFill>
-          <a:blip r:embed="rId3"/>
+          <a:blip r:embed="rId4"/>
           <a:stretch>
             <a:fillRect/>
           </a:stretch>
@@ -13964,7 +14139,7 @@
           <p:nvPr/>
         </p:nvPicPr>
         <p:blipFill>
-          <a:blip r:embed="rId4"/>
+          <a:blip r:embed="rId5"/>
           <a:stretch>
             <a:fillRect/>
           </a:stretch>
@@ -14790,293 +14965,6 @@
       <p:pic>
         <p:nvPicPr>
           <p:cNvPr id="34" name="Picture 33" descr="Door2.png"/>
-          <p:cNvPicPr>
-            <a:picLocks noChangeAspect="1"/>
-          </p:cNvPicPr>
-          <p:nvPr/>
-        </p:nvPicPr>
-        <p:blipFill>
-          <a:blip r:embed="rId5">
-            <a:extLst>
-              <a:ext uri="{28A0092B-C50C-407E-A947-70E740481C1C}">
-                <a14:useLocalDpi xmlns:a14="http://schemas.microsoft.com/office/drawing/2010/main" val="0"/>
-              </a:ext>
-            </a:extLst>
-          </a:blip>
-          <a:stretch>
-            <a:fillRect/>
-          </a:stretch>
-        </p:blipFill>
-        <p:spPr>
-          <a:xfrm>
-            <a:off x="3688515" y="6265918"/>
-            <a:ext cx="583324" cy="592082"/>
-          </a:xfrm>
-          <a:prstGeom prst="rect">
-            <a:avLst/>
-          </a:prstGeom>
-        </p:spPr>
-      </p:pic>
-      <p:sp>
-        <p:nvSpPr>
-          <p:cNvPr id="35" name="TextBox 34"/>
-          <p:cNvSpPr txBox="1"/>
-          <p:nvPr/>
-        </p:nvSpPr>
-        <p:spPr>
-          <a:xfrm>
-            <a:off x="2264088" y="6289135"/>
-            <a:ext cx="1252483" cy="369332"/>
-          </a:xfrm>
-          <a:prstGeom prst="rect">
-            <a:avLst/>
-          </a:prstGeom>
-          <a:noFill/>
-        </p:spPr>
-        <p:txBody>
-          <a:bodyPr wrap="square" rtlCol="0">
-            <a:spAutoFit/>
-          </a:bodyPr>
-          <a:lstStyle/>
-          <a:p>
-            <a:r>
-              <a:rPr lang="en-US" dirty="0" smtClean="0"/>
-              <a:t>Start point</a:t>
-            </a:r>
-            <a:endParaRPr lang="en-US" dirty="0"/>
-          </a:p>
-        </p:txBody>
-      </p:sp>
-      <p:sp>
-        <p:nvSpPr>
-          <p:cNvPr id="36" name="Right Arrow 35"/>
-          <p:cNvSpPr/>
-          <p:nvPr/>
-        </p:nvSpPr>
-        <p:spPr>
-          <a:xfrm>
-            <a:off x="3433376" y="6404664"/>
-            <a:ext cx="289034" cy="198100"/>
-          </a:xfrm>
-          <a:prstGeom prst="rightArrow">
-            <a:avLst/>
-          </a:prstGeom>
-          <a:solidFill>
-            <a:srgbClr val="008000"/>
-          </a:solidFill>
-        </p:spPr>
-        <p:style>
-          <a:lnRef idx="1">
-            <a:schemeClr val="accent1"/>
-          </a:lnRef>
-          <a:fillRef idx="3">
-            <a:schemeClr val="accent1"/>
-          </a:fillRef>
-          <a:effectRef idx="2">
-            <a:schemeClr val="accent1"/>
-          </a:effectRef>
-          <a:fontRef idx="minor">
-            <a:schemeClr val="lt1"/>
-          </a:fontRef>
-        </p:style>
-        <p:txBody>
-          <a:bodyPr rtlCol="0" anchor="ctr"/>
-          <a:lstStyle/>
-          <a:p>
-            <a:pPr algn="ctr"/>
-            <a:endParaRPr lang="en-US"/>
-          </a:p>
-        </p:txBody>
-      </p:sp>
-      <p:sp>
-        <p:nvSpPr>
-          <p:cNvPr id="37" name="TextBox 36"/>
-          <p:cNvSpPr txBox="1"/>
-          <p:nvPr/>
-        </p:nvSpPr>
-        <p:spPr>
-          <a:xfrm>
-            <a:off x="446690" y="2282498"/>
-            <a:ext cx="2032000" cy="369332"/>
-          </a:xfrm>
-          <a:prstGeom prst="rect">
-            <a:avLst/>
-          </a:prstGeom>
-          <a:noFill/>
-        </p:spPr>
-        <p:txBody>
-          <a:bodyPr wrap="square" rtlCol="0">
-            <a:spAutoFit/>
-          </a:bodyPr>
-          <a:lstStyle/>
-          <a:p>
-            <a:r>
-              <a:rPr lang="en-US" dirty="0" smtClean="0"/>
-              <a:t>Breads</a:t>
-            </a:r>
-            <a:endParaRPr lang="en-US" dirty="0"/>
-          </a:p>
-        </p:txBody>
-      </p:sp>
-      <p:pic>
-        <p:nvPicPr>
-          <p:cNvPr id="38" name="Picture 37"/>
-          <p:cNvPicPr>
-            <a:picLocks noChangeAspect="1"/>
-          </p:cNvPicPr>
-          <p:nvPr/>
-        </p:nvPicPr>
-        <p:blipFill>
-          <a:blip r:embed="rId4"/>
-          <a:stretch>
-            <a:fillRect/>
-          </a:stretch>
-        </p:blipFill>
-        <p:spPr>
-          <a:xfrm>
-            <a:off x="409469" y="2995003"/>
-            <a:ext cx="2743636" cy="294509"/>
-          </a:xfrm>
-          <a:prstGeom prst="rect">
-            <a:avLst/>
-          </a:prstGeom>
-        </p:spPr>
-      </p:pic>
-      <p:sp>
-        <p:nvSpPr>
-          <p:cNvPr id="39" name="TextBox 38"/>
-          <p:cNvSpPr txBox="1"/>
-          <p:nvPr/>
-        </p:nvSpPr>
-        <p:spPr>
-          <a:xfrm>
-            <a:off x="446690" y="2680933"/>
-            <a:ext cx="2032000" cy="369332"/>
-          </a:xfrm>
-          <a:prstGeom prst="rect">
-            <a:avLst/>
-          </a:prstGeom>
-          <a:noFill/>
-        </p:spPr>
-        <p:txBody>
-          <a:bodyPr wrap="square" rtlCol="0">
-            <a:spAutoFit/>
-          </a:bodyPr>
-          <a:lstStyle/>
-          <a:p>
-            <a:r>
-              <a:rPr lang="en-US" dirty="0" smtClean="0"/>
-              <a:t>Wine</a:t>
-            </a:r>
-            <a:endParaRPr lang="en-US" dirty="0"/>
-          </a:p>
-        </p:txBody>
-      </p:sp>
-      <p:sp>
-        <p:nvSpPr>
-          <p:cNvPr id="40" name="TextBox 39"/>
-          <p:cNvSpPr txBox="1"/>
-          <p:nvPr/>
-        </p:nvSpPr>
-        <p:spPr>
-          <a:xfrm>
-            <a:off x="374433" y="3159559"/>
-            <a:ext cx="2032000" cy="369332"/>
-          </a:xfrm>
-          <a:prstGeom prst="rect">
-            <a:avLst/>
-          </a:prstGeom>
-          <a:noFill/>
-        </p:spPr>
-        <p:txBody>
-          <a:bodyPr wrap="square" rtlCol="0">
-            <a:spAutoFit/>
-          </a:bodyPr>
-          <a:lstStyle/>
-          <a:p>
-            <a:r>
-              <a:rPr lang="en-US" dirty="0" smtClean="0"/>
-              <a:t> Canned Milk</a:t>
-            </a:r>
-            <a:endParaRPr lang="en-US" dirty="0"/>
-          </a:p>
-        </p:txBody>
-      </p:sp>
-      <p:pic>
-        <p:nvPicPr>
-          <p:cNvPr id="41" name="Picture 40"/>
-          <p:cNvPicPr>
-            <a:picLocks noChangeAspect="1"/>
-          </p:cNvPicPr>
-          <p:nvPr/>
-        </p:nvPicPr>
-        <p:blipFill>
-          <a:blip r:embed="rId4"/>
-          <a:stretch>
-            <a:fillRect/>
-          </a:stretch>
-        </p:blipFill>
-        <p:spPr>
-          <a:xfrm>
-            <a:off x="386689" y="3497763"/>
-            <a:ext cx="2743636" cy="294509"/>
-          </a:xfrm>
-          <a:prstGeom prst="rect">
-            <a:avLst/>
-          </a:prstGeom>
-        </p:spPr>
-      </p:pic>
-      <p:pic>
-        <p:nvPicPr>
-          <p:cNvPr id="42" name="Picture 41"/>
-          <p:cNvPicPr>
-            <a:picLocks noChangeAspect="1"/>
-          </p:cNvPicPr>
-          <p:nvPr/>
-        </p:nvPicPr>
-        <p:blipFill>
-          <a:blip r:embed="rId3"/>
-          <a:stretch>
-            <a:fillRect/>
-          </a:stretch>
-        </p:blipFill>
-        <p:spPr>
-          <a:xfrm>
-            <a:off x="2673569" y="2669348"/>
-            <a:ext cx="444500" cy="393700"/>
-          </a:xfrm>
-          <a:prstGeom prst="rect">
-            <a:avLst/>
-          </a:prstGeom>
-        </p:spPr>
-      </p:pic>
-      <p:pic>
-        <p:nvPicPr>
-          <p:cNvPr id="43" name="Picture 42"/>
-          <p:cNvPicPr>
-            <a:picLocks noChangeAspect="1"/>
-          </p:cNvPicPr>
-          <p:nvPr/>
-        </p:nvPicPr>
-        <p:blipFill>
-          <a:blip r:embed="rId3"/>
-          <a:stretch>
-            <a:fillRect/>
-          </a:stretch>
-        </p:blipFill>
-        <p:spPr>
-          <a:xfrm>
-            <a:off x="2673569" y="3159559"/>
-            <a:ext cx="444500" cy="393700"/>
-          </a:xfrm>
-          <a:prstGeom prst="rect">
-            <a:avLst/>
-          </a:prstGeom>
-        </p:spPr>
-      </p:pic>
-      <p:pic>
-        <p:nvPicPr>
-          <p:cNvPr id="44" name="Picture 43" descr="shoppingCartIcon.jpg"/>
           <p:cNvPicPr>
             <a:picLocks noChangeAspect="1"/>
           </p:cNvPicPr>
@@ -15096,8 +14984,8 @@
         </p:blipFill>
         <p:spPr>
           <a:xfrm>
-            <a:off x="3722410" y="5731564"/>
-            <a:ext cx="455010" cy="410343"/>
+            <a:off x="3688515" y="6265918"/>
+            <a:ext cx="583324" cy="592082"/>
           </a:xfrm>
           <a:prstGeom prst="rect">
             <a:avLst/>
@@ -15106,14 +14994,14 @@
       </p:pic>
       <p:sp>
         <p:nvSpPr>
-          <p:cNvPr id="45" name="TextBox 44"/>
+          <p:cNvPr id="35" name="TextBox 34"/>
           <p:cNvSpPr txBox="1"/>
           <p:nvPr/>
         </p:nvSpPr>
         <p:spPr>
           <a:xfrm>
-            <a:off x="386689" y="3645753"/>
-            <a:ext cx="2032000" cy="369332"/>
+            <a:off x="2264088" y="6289135"/>
+            <a:ext cx="1252483" cy="369332"/>
           </a:xfrm>
           <a:prstGeom prst="rect">
             <a:avLst/>
@@ -15128,7 +15016,78 @@
           <a:p>
             <a:r>
               <a:rPr lang="en-US" dirty="0" smtClean="0"/>
-              <a:t>Fruit Juices</a:t>
+              <a:t>Start point</a:t>
+            </a:r>
+            <a:endParaRPr lang="en-US" dirty="0"/>
+          </a:p>
+        </p:txBody>
+      </p:sp>
+      <p:sp>
+        <p:nvSpPr>
+          <p:cNvPr id="36" name="Right Arrow 35"/>
+          <p:cNvSpPr/>
+          <p:nvPr/>
+        </p:nvSpPr>
+        <p:spPr>
+          <a:xfrm>
+            <a:off x="3433376" y="6404664"/>
+            <a:ext cx="289034" cy="198100"/>
+          </a:xfrm>
+          <a:prstGeom prst="rightArrow">
+            <a:avLst/>
+          </a:prstGeom>
+          <a:solidFill>
+            <a:srgbClr val="008000"/>
+          </a:solidFill>
+        </p:spPr>
+        <p:style>
+          <a:lnRef idx="1">
+            <a:schemeClr val="accent1"/>
+          </a:lnRef>
+          <a:fillRef idx="3">
+            <a:schemeClr val="accent1"/>
+          </a:fillRef>
+          <a:effectRef idx="2">
+            <a:schemeClr val="accent1"/>
+          </a:effectRef>
+          <a:fontRef idx="minor">
+            <a:schemeClr val="lt1"/>
+          </a:fontRef>
+        </p:style>
+        <p:txBody>
+          <a:bodyPr rtlCol="0" anchor="ctr"/>
+          <a:lstStyle/>
+          <a:p>
+            <a:pPr algn="ctr"/>
+            <a:endParaRPr lang="en-US"/>
+          </a:p>
+        </p:txBody>
+      </p:sp>
+      <p:sp>
+        <p:nvSpPr>
+          <p:cNvPr id="37" name="TextBox 36"/>
+          <p:cNvSpPr txBox="1"/>
+          <p:nvPr/>
+        </p:nvSpPr>
+        <p:spPr>
+          <a:xfrm>
+            <a:off x="446690" y="2282498"/>
+            <a:ext cx="2032000" cy="369332"/>
+          </a:xfrm>
+          <a:prstGeom prst="rect">
+            <a:avLst/>
+          </a:prstGeom>
+          <a:noFill/>
+        </p:spPr>
+        <p:txBody>
+          <a:bodyPr wrap="square" rtlCol="0">
+            <a:spAutoFit/>
+          </a:bodyPr>
+          <a:lstStyle/>
+          <a:p>
+            <a:r>
+              <a:rPr lang="en-US" dirty="0" smtClean="0"/>
+              <a:t>Breads</a:t>
             </a:r>
             <a:endParaRPr lang="en-US" dirty="0"/>
           </a:p>
@@ -15136,7 +15095,115 @@
       </p:sp>
       <p:pic>
         <p:nvPicPr>
-          <p:cNvPr id="46" name="Picture 45"/>
+          <p:cNvPr id="38" name="Picture 37"/>
+          <p:cNvPicPr>
+            <a:picLocks noChangeAspect="1"/>
+          </p:cNvPicPr>
+          <p:nvPr/>
+        </p:nvPicPr>
+        <p:blipFill>
+          <a:blip r:embed="rId5"/>
+          <a:stretch>
+            <a:fillRect/>
+          </a:stretch>
+        </p:blipFill>
+        <p:spPr>
+          <a:xfrm>
+            <a:off x="409469" y="2995003"/>
+            <a:ext cx="2743636" cy="294509"/>
+          </a:xfrm>
+          <a:prstGeom prst="rect">
+            <a:avLst/>
+          </a:prstGeom>
+        </p:spPr>
+      </p:pic>
+      <p:sp>
+        <p:nvSpPr>
+          <p:cNvPr id="39" name="TextBox 38"/>
+          <p:cNvSpPr txBox="1"/>
+          <p:nvPr/>
+        </p:nvSpPr>
+        <p:spPr>
+          <a:xfrm>
+            <a:off x="446690" y="2680933"/>
+            <a:ext cx="2032000" cy="369332"/>
+          </a:xfrm>
+          <a:prstGeom prst="rect">
+            <a:avLst/>
+          </a:prstGeom>
+          <a:noFill/>
+        </p:spPr>
+        <p:txBody>
+          <a:bodyPr wrap="square" rtlCol="0">
+            <a:spAutoFit/>
+          </a:bodyPr>
+          <a:lstStyle/>
+          <a:p>
+            <a:r>
+              <a:rPr lang="en-US" dirty="0" smtClean="0"/>
+              <a:t>Wine</a:t>
+            </a:r>
+            <a:endParaRPr lang="en-US" dirty="0"/>
+          </a:p>
+        </p:txBody>
+      </p:sp>
+      <p:sp>
+        <p:nvSpPr>
+          <p:cNvPr id="40" name="TextBox 39"/>
+          <p:cNvSpPr txBox="1"/>
+          <p:nvPr/>
+        </p:nvSpPr>
+        <p:spPr>
+          <a:xfrm>
+            <a:off x="374433" y="3159559"/>
+            <a:ext cx="2032000" cy="369332"/>
+          </a:xfrm>
+          <a:prstGeom prst="rect">
+            <a:avLst/>
+          </a:prstGeom>
+          <a:noFill/>
+        </p:spPr>
+        <p:txBody>
+          <a:bodyPr wrap="square" rtlCol="0">
+            <a:spAutoFit/>
+          </a:bodyPr>
+          <a:lstStyle/>
+          <a:p>
+            <a:r>
+              <a:rPr lang="en-US" dirty="0" smtClean="0"/>
+              <a:t> Canned Milk</a:t>
+            </a:r>
+            <a:endParaRPr lang="en-US" dirty="0"/>
+          </a:p>
+        </p:txBody>
+      </p:sp>
+      <p:pic>
+        <p:nvPicPr>
+          <p:cNvPr id="41" name="Picture 40"/>
+          <p:cNvPicPr>
+            <a:picLocks noChangeAspect="1"/>
+          </p:cNvPicPr>
+          <p:nvPr/>
+        </p:nvPicPr>
+        <p:blipFill>
+          <a:blip r:embed="rId5"/>
+          <a:stretch>
+            <a:fillRect/>
+          </a:stretch>
+        </p:blipFill>
+        <p:spPr>
+          <a:xfrm>
+            <a:off x="386689" y="3497763"/>
+            <a:ext cx="2743636" cy="294509"/>
+          </a:xfrm>
+          <a:prstGeom prst="rect">
+            <a:avLst/>
+          </a:prstGeom>
+        </p:spPr>
+      </p:pic>
+      <p:pic>
+        <p:nvPicPr>
+          <p:cNvPr id="42" name="Picture 41"/>
           <p:cNvPicPr>
             <a:picLocks noChangeAspect="1"/>
           </p:cNvPicPr>
@@ -15150,6 +15217,114 @@
         </p:blipFill>
         <p:spPr>
           <a:xfrm>
+            <a:off x="2673569" y="2669348"/>
+            <a:ext cx="444500" cy="393700"/>
+          </a:xfrm>
+          <a:prstGeom prst="rect">
+            <a:avLst/>
+          </a:prstGeom>
+        </p:spPr>
+      </p:pic>
+      <p:pic>
+        <p:nvPicPr>
+          <p:cNvPr id="43" name="Picture 42"/>
+          <p:cNvPicPr>
+            <a:picLocks noChangeAspect="1"/>
+          </p:cNvPicPr>
+          <p:nvPr/>
+        </p:nvPicPr>
+        <p:blipFill>
+          <a:blip r:embed="rId4"/>
+          <a:stretch>
+            <a:fillRect/>
+          </a:stretch>
+        </p:blipFill>
+        <p:spPr>
+          <a:xfrm>
+            <a:off x="2673569" y="3159559"/>
+            <a:ext cx="444500" cy="393700"/>
+          </a:xfrm>
+          <a:prstGeom prst="rect">
+            <a:avLst/>
+          </a:prstGeom>
+        </p:spPr>
+      </p:pic>
+      <p:pic>
+        <p:nvPicPr>
+          <p:cNvPr id="44" name="Picture 43" descr="shoppingCartIcon.jpg"/>
+          <p:cNvPicPr>
+            <a:picLocks noChangeAspect="1"/>
+          </p:cNvPicPr>
+          <p:nvPr/>
+        </p:nvPicPr>
+        <p:blipFill>
+          <a:blip r:embed="rId7">
+            <a:extLst>
+              <a:ext uri="{28A0092B-C50C-407E-A947-70E740481C1C}">
+                <a14:useLocalDpi xmlns:a14="http://schemas.microsoft.com/office/drawing/2010/main" val="0"/>
+              </a:ext>
+            </a:extLst>
+          </a:blip>
+          <a:stretch>
+            <a:fillRect/>
+          </a:stretch>
+        </p:blipFill>
+        <p:spPr>
+          <a:xfrm>
+            <a:off x="3722410" y="5731564"/>
+            <a:ext cx="455010" cy="410343"/>
+          </a:xfrm>
+          <a:prstGeom prst="rect">
+            <a:avLst/>
+          </a:prstGeom>
+        </p:spPr>
+      </p:pic>
+      <p:sp>
+        <p:nvSpPr>
+          <p:cNvPr id="45" name="TextBox 44"/>
+          <p:cNvSpPr txBox="1"/>
+          <p:nvPr/>
+        </p:nvSpPr>
+        <p:spPr>
+          <a:xfrm>
+            <a:off x="386689" y="3645753"/>
+            <a:ext cx="2032000" cy="369332"/>
+          </a:xfrm>
+          <a:prstGeom prst="rect">
+            <a:avLst/>
+          </a:prstGeom>
+          <a:noFill/>
+        </p:spPr>
+        <p:txBody>
+          <a:bodyPr wrap="square" rtlCol="0">
+            <a:spAutoFit/>
+          </a:bodyPr>
+          <a:lstStyle/>
+          <a:p>
+            <a:r>
+              <a:rPr lang="en-US" dirty="0" smtClean="0"/>
+              <a:t>Fruit Juices</a:t>
+            </a:r>
+            <a:endParaRPr lang="en-US" dirty="0"/>
+          </a:p>
+        </p:txBody>
+      </p:sp>
+      <p:pic>
+        <p:nvPicPr>
+          <p:cNvPr id="46" name="Picture 45"/>
+          <p:cNvPicPr>
+            <a:picLocks noChangeAspect="1"/>
+          </p:cNvPicPr>
+          <p:nvPr/>
+        </p:nvPicPr>
+        <p:blipFill>
+          <a:blip r:embed="rId5"/>
+          <a:stretch>
+            <a:fillRect/>
+          </a:stretch>
+        </p:blipFill>
+        <p:spPr>
+          <a:xfrm>
             <a:off x="386689" y="3932618"/>
             <a:ext cx="2743636" cy="294509"/>
           </a:xfrm>
@@ -15167,7 +15342,7 @@
           <p:nvPr/>
         </p:nvPicPr>
         <p:blipFill>
-          <a:blip r:embed="rId3"/>
+          <a:blip r:embed="rId4"/>
           <a:stretch>
             <a:fillRect/>
           </a:stretch>
@@ -15221,7 +15396,7 @@
           <p:nvPr/>
         </p:nvPicPr>
         <p:blipFill>
-          <a:blip r:embed="rId4"/>
+          <a:blip r:embed="rId5"/>
           <a:stretch>
             <a:fillRect/>
           </a:stretch>
@@ -15245,7 +15420,7 @@
           <p:nvPr/>
         </p:nvPicPr>
         <p:blipFill>
-          <a:blip r:embed="rId3"/>
+          <a:blip r:embed="rId4"/>
           <a:stretch>
             <a:fillRect/>
           </a:stretch>
@@ -19092,141 +19267,6 @@
                       </p:childTnLst>
                     </p:cTn>
                   </p:par>
-                  <p:par>
-                    <p:cTn id="71" fill="hold">
-                      <p:stCondLst>
-                        <p:cond delay="indefinite"/>
-                      </p:stCondLst>
-                      <p:childTnLst>
-                        <p:par>
-                          <p:cTn id="72" fill="hold">
-                            <p:stCondLst>
-                              <p:cond delay="0"/>
-                            </p:stCondLst>
-                            <p:childTnLst>
-                              <p:par>
-                                <p:cTn id="73" presetID="1" presetClass="entr" presetSubtype="0" fill="hold" grpId="1" nodeType="clickEffect">
-                                  <p:stCondLst>
-                                    <p:cond delay="0"/>
-                                  </p:stCondLst>
-                                  <p:childTnLst>
-                                    <p:set>
-                                      <p:cBhvr>
-                                        <p:cTn id="74" dur="1" fill="hold">
-                                          <p:stCondLst>
-                                            <p:cond delay="0"/>
-                                          </p:stCondLst>
-                                        </p:cTn>
-                                        <p:tgtEl>
-                                          <p:spTgt spid="104"/>
-                                        </p:tgtEl>
-                                        <p:attrNameLst>
-                                          <p:attrName>style.visibility</p:attrName>
-                                        </p:attrNameLst>
-                                      </p:cBhvr>
-                                      <p:to>
-                                        <p:strVal val="visible"/>
-                                      </p:to>
-                                    </p:set>
-                                  </p:childTnLst>
-                                </p:cTn>
-                              </p:par>
-                            </p:childTnLst>
-                          </p:cTn>
-                        </p:par>
-                      </p:childTnLst>
-                    </p:cTn>
-                  </p:par>
-                  <p:par>
-                    <p:cTn id="75" fill="hold">
-                      <p:stCondLst>
-                        <p:cond delay="indefinite"/>
-                      </p:stCondLst>
-                      <p:childTnLst>
-                        <p:par>
-                          <p:cTn id="76" fill="hold">
-                            <p:stCondLst>
-                              <p:cond delay="0"/>
-                            </p:stCondLst>
-                            <p:childTnLst>
-                              <p:par>
-                                <p:cTn id="77" presetID="1" presetClass="entr" presetSubtype="0" fill="hold" grpId="1" nodeType="clickEffect">
-                                  <p:stCondLst>
-                                    <p:cond delay="0"/>
-                                  </p:stCondLst>
-                                  <p:childTnLst>
-                                    <p:set>
-                                      <p:cBhvr>
-                                        <p:cTn id="78" dur="1" fill="hold">
-                                          <p:stCondLst>
-                                            <p:cond delay="0"/>
-                                          </p:stCondLst>
-                                        </p:cTn>
-                                        <p:tgtEl>
-                                          <p:spTgt spid="105"/>
-                                        </p:tgtEl>
-                                        <p:attrNameLst>
-                                          <p:attrName>style.visibility</p:attrName>
-                                        </p:attrNameLst>
-                                      </p:cBhvr>
-                                      <p:to>
-                                        <p:strVal val="visible"/>
-                                      </p:to>
-                                    </p:set>
-                                  </p:childTnLst>
-                                </p:cTn>
-                              </p:par>
-                            </p:childTnLst>
-                          </p:cTn>
-                        </p:par>
-                      </p:childTnLst>
-                    </p:cTn>
-                  </p:par>
-                  <p:par>
-                    <p:cTn id="79" fill="hold">
-                      <p:stCondLst>
-                        <p:cond delay="indefinite"/>
-                      </p:stCondLst>
-                      <p:childTnLst>
-                        <p:par>
-                          <p:cTn id="80" fill="hold">
-                            <p:stCondLst>
-                              <p:cond delay="0"/>
-                            </p:stCondLst>
-                            <p:childTnLst>
-                              <p:par>
-                                <p:cTn id="81" presetID="1" presetClass="entr" presetSubtype="0" fill="hold" grpId="1" nodeType="clickEffect">
-                                  <p:stCondLst>
-                                    <p:cond delay="0"/>
-                                  </p:stCondLst>
-                                  <p:childTnLst>
-                                    <p:set>
-                                      <p:cBhvr>
-                                        <p:cTn id="82" dur="1" fill="hold">
-                                          <p:stCondLst>
-                                            <p:cond delay="0"/>
-                                          </p:stCondLst>
-                                        </p:cTn>
-                                        <p:tgtEl>
-                                          <p:spTgt spid="106"/>
-                                        </p:tgtEl>
-                                        <p:attrNameLst>
-                                          <p:attrName>style.visibility</p:attrName>
-                                        </p:attrNameLst>
-                                      </p:cBhvr>
-                                      <p:to>
-                                        <p:strVal val="visible"/>
-                                      </p:to>
-                                    </p:set>
-                                  </p:childTnLst>
-                                </p:cTn>
-                              </p:par>
-                            </p:childTnLst>
-                          </p:cTn>
-                        </p:par>
-                      </p:childTnLst>
-                    </p:cTn>
-                  </p:par>
                 </p:childTnLst>
               </p:cTn>
               <p:prevCondLst>
@@ -19250,11 +19290,8 @@
     </p:tnLst>
     <p:bldLst>
       <p:bldP spid="104" grpId="0" animBg="1"/>
-      <p:bldP spid="104" grpId="1" animBg="1"/>
       <p:bldP spid="105" grpId="0" animBg="1"/>
-      <p:bldP spid="105" grpId="1" animBg="1"/>
       <p:bldP spid="106" grpId="0" animBg="1"/>
-      <p:bldP spid="106" grpId="1" animBg="1"/>
     </p:bldLst>
   </p:timing>
 </p:sld>
@@ -21876,6 +21913,373 @@
 </p:sld>
 </file>
 
+<file path=ppt/slides/slide18.xml><?xml version="1.0" encoding="utf-8"?>
+<p:sld xmlns:a="http://schemas.openxmlformats.org/drawingml/2006/main" xmlns:r="http://schemas.openxmlformats.org/officeDocument/2006/relationships" xmlns:p="http://schemas.openxmlformats.org/presentationml/2006/main">
+  <p:cSld>
+    <p:spTree>
+      <p:nvGrpSpPr>
+        <p:cNvPr id="1" name=""/>
+        <p:cNvGrpSpPr/>
+        <p:nvPr/>
+      </p:nvGrpSpPr>
+      <p:grpSpPr>
+        <a:xfrm>
+          <a:off x="0" y="0"/>
+          <a:ext cx="0" cy="0"/>
+          <a:chOff x="0" y="0"/>
+          <a:chExt cx="0" cy="0"/>
+        </a:xfrm>
+      </p:grpSpPr>
+      <p:sp>
+        <p:nvSpPr>
+          <p:cNvPr id="2" name="Title 1"/>
+          <p:cNvSpPr>
+            <a:spLocks noGrp="1"/>
+          </p:cNvSpPr>
+          <p:nvPr>
+            <p:ph type="title"/>
+          </p:nvPr>
+        </p:nvSpPr>
+        <p:spPr/>
+        <p:txBody>
+          <a:bodyPr/>
+          <a:lstStyle/>
+          <a:p>
+            <a:r>
+              <a:rPr lang="en-US" dirty="0" smtClean="0"/>
+              <a:t>Issues in finding shortest path</a:t>
+            </a:r>
+            <a:endParaRPr lang="en-US" dirty="0"/>
+          </a:p>
+        </p:txBody>
+      </p:sp>
+      <p:pic>
+        <p:nvPicPr>
+          <p:cNvPr id="4" name="Picture 3" descr="not-proximity.png"/>
+          <p:cNvPicPr>
+            <a:picLocks noChangeAspect="1"/>
+          </p:cNvPicPr>
+          <p:nvPr/>
+        </p:nvPicPr>
+        <p:blipFill>
+          <a:blip r:embed="rId2">
+            <a:extLst>
+              <a:ext uri="{28A0092B-C50C-407E-A947-70E740481C1C}">
+                <a14:useLocalDpi xmlns:a14="http://schemas.microsoft.com/office/drawing/2010/main" val="0"/>
+              </a:ext>
+            </a:extLst>
+          </a:blip>
+          <a:stretch>
+            <a:fillRect/>
+          </a:stretch>
+        </p:blipFill>
+        <p:spPr>
+          <a:xfrm>
+            <a:off x="987778" y="2564891"/>
+            <a:ext cx="7352193" cy="2310690"/>
+          </a:xfrm>
+          <a:prstGeom prst="rect">
+            <a:avLst/>
+          </a:prstGeom>
+        </p:spPr>
+      </p:pic>
+    </p:spTree>
+    <p:extLst>
+      <p:ext uri="{BB962C8B-B14F-4D97-AF65-F5344CB8AC3E}">
+        <p14:creationId xmlns:p14="http://schemas.microsoft.com/office/powerpoint/2010/main" val="2871047240"/>
+      </p:ext>
+    </p:extLst>
+  </p:cSld>
+  <p:clrMapOvr>
+    <a:masterClrMapping/>
+  </p:clrMapOvr>
+  <p:timing>
+    <p:tnLst>
+      <p:par>
+        <p:cTn xmlns:p14="http://schemas.microsoft.com/office/powerpoint/2010/main" id="1" dur="indefinite" restart="never" nodeType="tmRoot"/>
+      </p:par>
+    </p:tnLst>
+  </p:timing>
+</p:sld>
+</file>
+
+<file path=ppt/slides/slide19.xml><?xml version="1.0" encoding="utf-8"?>
+<p:sld xmlns:a="http://schemas.openxmlformats.org/drawingml/2006/main" xmlns:r="http://schemas.openxmlformats.org/officeDocument/2006/relationships" xmlns:p="http://schemas.openxmlformats.org/presentationml/2006/main">
+  <p:cSld>
+    <p:spTree>
+      <p:nvGrpSpPr>
+        <p:cNvPr id="1" name=""/>
+        <p:cNvGrpSpPr/>
+        <p:nvPr/>
+      </p:nvGrpSpPr>
+      <p:grpSpPr>
+        <a:xfrm>
+          <a:off x="0" y="0"/>
+          <a:ext cx="0" cy="0"/>
+          <a:chOff x="0" y="0"/>
+          <a:chExt cx="0" cy="0"/>
+        </a:xfrm>
+      </p:grpSpPr>
+      <p:sp>
+        <p:nvSpPr>
+          <p:cNvPr id="2" name="Title 1"/>
+          <p:cNvSpPr>
+            <a:spLocks noGrp="1"/>
+          </p:cNvSpPr>
+          <p:nvPr>
+            <p:ph type="title"/>
+          </p:nvPr>
+        </p:nvSpPr>
+        <p:spPr/>
+        <p:txBody>
+          <a:bodyPr/>
+          <a:lstStyle/>
+          <a:p>
+            <a:r>
+              <a:rPr lang="en-US" dirty="0" smtClean="0"/>
+              <a:t>Modeling Turns</a:t>
+            </a:r>
+            <a:endParaRPr lang="en-US" dirty="0"/>
+          </a:p>
+        </p:txBody>
+      </p:sp>
+      <p:pic>
+        <p:nvPicPr>
+          <p:cNvPr id="4" name="Picture 3" descr="modeling-turns.png"/>
+          <p:cNvPicPr>
+            <a:picLocks noChangeAspect="1"/>
+          </p:cNvPicPr>
+          <p:nvPr/>
+        </p:nvPicPr>
+        <p:blipFill>
+          <a:blip r:embed="rId3">
+            <a:extLst>
+              <a:ext uri="{28A0092B-C50C-407E-A947-70E740481C1C}">
+                <a14:useLocalDpi xmlns:a14="http://schemas.microsoft.com/office/drawing/2010/main" val="0"/>
+              </a:ext>
+            </a:extLst>
+          </a:blip>
+          <a:stretch>
+            <a:fillRect/>
+          </a:stretch>
+        </p:blipFill>
+        <p:spPr>
+          <a:xfrm>
+            <a:off x="864626" y="1742787"/>
+            <a:ext cx="7001018" cy="1249819"/>
+          </a:xfrm>
+          <a:prstGeom prst="rect">
+            <a:avLst/>
+          </a:prstGeom>
+        </p:spPr>
+      </p:pic>
+      <p:pic>
+        <p:nvPicPr>
+          <p:cNvPr id="5" name="Picture 4" descr="modeling_u-turns.png"/>
+          <p:cNvPicPr>
+            <a:picLocks noChangeAspect="1"/>
+          </p:cNvPicPr>
+          <p:nvPr/>
+        </p:nvPicPr>
+        <p:blipFill>
+          <a:blip r:embed="rId4">
+            <a:extLst>
+              <a:ext uri="{28A0092B-C50C-407E-A947-70E740481C1C}">
+                <a14:useLocalDpi xmlns:a14="http://schemas.microsoft.com/office/drawing/2010/main" val="0"/>
+              </a:ext>
+            </a:extLst>
+          </a:blip>
+          <a:stretch>
+            <a:fillRect/>
+          </a:stretch>
+        </p:blipFill>
+        <p:spPr>
+          <a:xfrm>
+            <a:off x="651847" y="4772053"/>
+            <a:ext cx="7065165" cy="1006080"/>
+          </a:xfrm>
+          <a:prstGeom prst="rect">
+            <a:avLst/>
+          </a:prstGeom>
+        </p:spPr>
+      </p:pic>
+      <p:sp>
+        <p:nvSpPr>
+          <p:cNvPr id="6" name="TextBox 5"/>
+          <p:cNvSpPr txBox="1"/>
+          <p:nvPr/>
+        </p:nvSpPr>
+        <p:spPr>
+          <a:xfrm>
+            <a:off x="878218" y="3191835"/>
+            <a:ext cx="1644353" cy="400110"/>
+          </a:xfrm>
+          <a:prstGeom prst="rect">
+            <a:avLst/>
+          </a:prstGeom>
+          <a:noFill/>
+        </p:spPr>
+        <p:txBody>
+          <a:bodyPr wrap="square" rtlCol="0">
+            <a:spAutoFit/>
+          </a:bodyPr>
+          <a:lstStyle/>
+          <a:p>
+            <a:pPr algn="ctr"/>
+            <a:r>
+              <a:rPr lang="en-US" sz="2000" b="1" dirty="0" smtClean="0"/>
+              <a:t>Primal Graph</a:t>
+            </a:r>
+            <a:endParaRPr lang="en-US" sz="2000" b="1" dirty="0"/>
+          </a:p>
+        </p:txBody>
+      </p:sp>
+      <p:sp>
+        <p:nvSpPr>
+          <p:cNvPr id="7" name="TextBox 6"/>
+          <p:cNvSpPr txBox="1"/>
+          <p:nvPr/>
+        </p:nvSpPr>
+        <p:spPr>
+          <a:xfrm>
+            <a:off x="4831644" y="3150723"/>
+            <a:ext cx="3855156" cy="1015663"/>
+          </a:xfrm>
+          <a:prstGeom prst="rect">
+            <a:avLst/>
+          </a:prstGeom>
+          <a:noFill/>
+        </p:spPr>
+        <p:txBody>
+          <a:bodyPr wrap="square" rtlCol="0">
+            <a:spAutoFit/>
+          </a:bodyPr>
+          <a:lstStyle/>
+          <a:p>
+            <a:r>
+              <a:rPr lang="en-US" sz="2000" b="1" dirty="0" smtClean="0">
+                <a:solidFill>
+                  <a:srgbClr val="FF0000"/>
+                </a:solidFill>
+              </a:rPr>
+              <a:t>Dual Graph:</a:t>
+            </a:r>
+          </a:p>
+          <a:p>
+            <a:r>
+              <a:rPr lang="en-US" sz="2000" dirty="0" smtClean="0">
+                <a:solidFill>
+                  <a:srgbClr val="FF0000"/>
+                </a:solidFill>
+              </a:rPr>
+              <a:t>Nodes: Primal edges</a:t>
+            </a:r>
+          </a:p>
+          <a:p>
+            <a:r>
+              <a:rPr lang="en-US" sz="2000" dirty="0" smtClean="0">
+                <a:solidFill>
+                  <a:srgbClr val="FF0000"/>
+                </a:solidFill>
+              </a:rPr>
+              <a:t>Edges: Turns in primal graph</a:t>
+            </a:r>
+            <a:endParaRPr lang="en-US" sz="2000" dirty="0">
+              <a:solidFill>
+                <a:srgbClr val="FF0000"/>
+              </a:solidFill>
+            </a:endParaRPr>
+          </a:p>
+        </p:txBody>
+      </p:sp>
+      <p:sp>
+        <p:nvSpPr>
+          <p:cNvPr id="8" name="TextBox 7"/>
+          <p:cNvSpPr txBox="1"/>
+          <p:nvPr/>
+        </p:nvSpPr>
+        <p:spPr>
+          <a:xfrm>
+            <a:off x="5376333" y="6025444"/>
+            <a:ext cx="2752000" cy="369332"/>
+          </a:xfrm>
+          <a:prstGeom prst="rect">
+            <a:avLst/>
+          </a:prstGeom>
+          <a:noFill/>
+        </p:spPr>
+        <p:txBody>
+          <a:bodyPr wrap="none" rtlCol="0">
+            <a:spAutoFit/>
+          </a:bodyPr>
+          <a:lstStyle/>
+          <a:p>
+            <a:r>
+              <a:rPr lang="en-US" dirty="0" smtClean="0"/>
+              <a:t>U-turns modeled naturally</a:t>
+            </a:r>
+            <a:endParaRPr lang="en-US" dirty="0"/>
+          </a:p>
+        </p:txBody>
+      </p:sp>
+      <p:sp>
+        <p:nvSpPr>
+          <p:cNvPr id="9" name="TextBox 8"/>
+          <p:cNvSpPr txBox="1"/>
+          <p:nvPr/>
+        </p:nvSpPr>
+        <p:spPr>
+          <a:xfrm>
+            <a:off x="1049867" y="6394776"/>
+            <a:ext cx="7078466" cy="523220"/>
+          </a:xfrm>
+          <a:prstGeom prst="rect">
+            <a:avLst/>
+          </a:prstGeom>
+          <a:noFill/>
+        </p:spPr>
+        <p:txBody>
+          <a:bodyPr wrap="square" rtlCol="0">
+            <a:spAutoFit/>
+          </a:bodyPr>
+          <a:lstStyle/>
+          <a:p>
+            <a:r>
+              <a:rPr lang="en-US" sz="1400" i="1" dirty="0" smtClean="0"/>
+              <a:t>Stephan Winter: Modeling Costs of Turns in Route Planning. </a:t>
+            </a:r>
+            <a:r>
+              <a:rPr lang="en-US" sz="1400" i="1" dirty="0" err="1" smtClean="0"/>
+              <a:t>GeoInformatica</a:t>
+            </a:r>
+            <a:r>
+              <a:rPr lang="en-US" sz="1400" i="1" dirty="0" smtClean="0"/>
+              <a:t> 6(4): 363-380 (2002) </a:t>
+            </a:r>
+            <a:endParaRPr lang="en-US" sz="1400" i="1" dirty="0"/>
+          </a:p>
+        </p:txBody>
+      </p:sp>
+    </p:spTree>
+    <p:extLst>
+      <p:ext uri="{BB962C8B-B14F-4D97-AF65-F5344CB8AC3E}">
+        <p14:creationId xmlns:p14="http://schemas.microsoft.com/office/powerpoint/2010/main" val="2682077827"/>
+      </p:ext>
+    </p:extLst>
+  </p:cSld>
+  <p:clrMapOvr>
+    <a:masterClrMapping/>
+  </p:clrMapOvr>
+  <p:timing>
+    <p:tnLst>
+      <p:par>
+        <p:cTn xmlns:p14="http://schemas.microsoft.com/office/powerpoint/2010/main" id="1" dur="indefinite" restart="never" nodeType="tmRoot"/>
+      </p:par>
+    </p:tnLst>
+  </p:timing>
+</p:sld>
+</file>
+
 <file path=ppt/slides/slide2.xml><?xml version="1.0" encoding="utf-8"?>
 <p:sld xmlns:a="http://schemas.openxmlformats.org/drawingml/2006/main" xmlns:r="http://schemas.openxmlformats.org/officeDocument/2006/relationships" xmlns:p="http://schemas.openxmlformats.org/presentationml/2006/main">
   <p:cSld>
@@ -21929,7 +22333,7 @@
         <p:spPr/>
         <p:txBody>
           <a:bodyPr>
-            <a:normAutofit fontScale="92500" lnSpcReduction="20000"/>
+            <a:normAutofit fontScale="85000" lnSpcReduction="10000"/>
           </a:bodyPr>
           <a:lstStyle/>
           <a:p>
@@ -21985,7 +22389,23 @@
           <a:p>
             <a:r>
               <a:rPr lang="en-US" sz="2000" dirty="0" smtClean="0"/>
-              <a:t>Existing shopping list apps mostly categorize items into predefined categories, display available coupons, saving cards, etc. </a:t>
+              <a:t>Existing shopping list apps mostly categorize items into predefined categories, display available coupons, saving cards, </a:t>
+            </a:r>
+            <a:r>
+              <a:rPr lang="en-US" sz="2000" dirty="0" smtClean="0"/>
+              <a:t>display </a:t>
+            </a:r>
+            <a:r>
+              <a:rPr lang="en-US" sz="2000" dirty="0" smtClean="0"/>
+              <a:t>grocery stores in the vicinity, </a:t>
+            </a:r>
+            <a:r>
+              <a:rPr lang="en-US" sz="2000" dirty="0" smtClean="0"/>
+              <a:t>etc</a:t>
+            </a:r>
+            <a:r>
+              <a:rPr lang="en-US" sz="2000" dirty="0" smtClean="0"/>
+              <a:t>. </a:t>
             </a:r>
           </a:p>
           <a:p>
@@ -22767,6 +23187,590 @@
 </p:sld>
 </file>
 
+<file path=ppt/slides/slide20.xml><?xml version="1.0" encoding="utf-8"?>
+<p:sld xmlns:a="http://schemas.openxmlformats.org/drawingml/2006/main" xmlns:r="http://schemas.openxmlformats.org/officeDocument/2006/relationships" xmlns:p="http://schemas.openxmlformats.org/presentationml/2006/main">
+  <p:cSld>
+    <p:spTree>
+      <p:nvGrpSpPr>
+        <p:cNvPr id="1" name=""/>
+        <p:cNvGrpSpPr/>
+        <p:nvPr/>
+      </p:nvGrpSpPr>
+      <p:grpSpPr>
+        <a:xfrm>
+          <a:off x="0" y="0"/>
+          <a:ext cx="0" cy="0"/>
+          <a:chOff x="0" y="0"/>
+          <a:chExt cx="0" cy="0"/>
+        </a:xfrm>
+      </p:grpSpPr>
+      <p:sp>
+        <p:nvSpPr>
+          <p:cNvPr id="2" name="Title 1"/>
+          <p:cNvSpPr>
+            <a:spLocks noGrp="1"/>
+          </p:cNvSpPr>
+          <p:nvPr>
+            <p:ph type="title"/>
+          </p:nvPr>
+        </p:nvSpPr>
+        <p:spPr/>
+        <p:txBody>
+          <a:bodyPr/>
+          <a:lstStyle/>
+          <a:p>
+            <a:r>
+              <a:rPr lang="en-US" dirty="0" smtClean="0"/>
+              <a:t>Layout of the store</a:t>
+            </a:r>
+            <a:endParaRPr lang="en-US" dirty="0"/>
+          </a:p>
+        </p:txBody>
+      </p:sp>
+      <p:pic>
+        <p:nvPicPr>
+          <p:cNvPr id="4" name="Picture 3" descr="store-primal.png"/>
+          <p:cNvPicPr>
+            <a:picLocks noChangeAspect="1"/>
+          </p:cNvPicPr>
+          <p:nvPr/>
+        </p:nvPicPr>
+        <p:blipFill>
+          <a:blip r:embed="rId2">
+            <a:extLst>
+              <a:ext uri="{28A0092B-C50C-407E-A947-70E740481C1C}">
+                <a14:useLocalDpi xmlns:a14="http://schemas.microsoft.com/office/drawing/2010/main" val="0"/>
+              </a:ext>
+            </a:extLst>
+          </a:blip>
+          <a:stretch>
+            <a:fillRect/>
+          </a:stretch>
+        </p:blipFill>
+        <p:spPr>
+          <a:xfrm>
+            <a:off x="1336853" y="1540137"/>
+            <a:ext cx="6452317" cy="4745247"/>
+          </a:xfrm>
+          <a:prstGeom prst="rect">
+            <a:avLst/>
+          </a:prstGeom>
+        </p:spPr>
+      </p:pic>
+    </p:spTree>
+    <p:extLst>
+      <p:ext uri="{BB962C8B-B14F-4D97-AF65-F5344CB8AC3E}">
+        <p14:creationId xmlns:p14="http://schemas.microsoft.com/office/powerpoint/2010/main" val="1434761729"/>
+      </p:ext>
+    </p:extLst>
+  </p:cSld>
+  <p:clrMapOvr>
+    <a:masterClrMapping/>
+  </p:clrMapOvr>
+  <p:timing>
+    <p:tnLst>
+      <p:par>
+        <p:cTn xmlns:p14="http://schemas.microsoft.com/office/powerpoint/2010/main" id="1" dur="indefinite" restart="never" nodeType="tmRoot"/>
+      </p:par>
+    </p:tnLst>
+  </p:timing>
+</p:sld>
+</file>
+
+<file path=ppt/slides/slide21.xml><?xml version="1.0" encoding="utf-8"?>
+<p:sld xmlns:a="http://schemas.openxmlformats.org/drawingml/2006/main" xmlns:r="http://schemas.openxmlformats.org/officeDocument/2006/relationships" xmlns:p="http://schemas.openxmlformats.org/presentationml/2006/main">
+  <p:cSld>
+    <p:spTree>
+      <p:nvGrpSpPr>
+        <p:cNvPr id="1" name=""/>
+        <p:cNvGrpSpPr/>
+        <p:nvPr/>
+      </p:nvGrpSpPr>
+      <p:grpSpPr>
+        <a:xfrm>
+          <a:off x="0" y="0"/>
+          <a:ext cx="0" cy="0"/>
+          <a:chOff x="0" y="0"/>
+          <a:chExt cx="0" cy="0"/>
+        </a:xfrm>
+      </p:grpSpPr>
+      <p:sp>
+        <p:nvSpPr>
+          <p:cNvPr id="2" name="Title 1"/>
+          <p:cNvSpPr>
+            <a:spLocks noGrp="1"/>
+          </p:cNvSpPr>
+          <p:nvPr>
+            <p:ph type="title"/>
+          </p:nvPr>
+        </p:nvSpPr>
+        <p:spPr/>
+        <p:txBody>
+          <a:bodyPr/>
+          <a:lstStyle/>
+          <a:p>
+            <a:r>
+              <a:rPr lang="en-US" dirty="0" smtClean="0"/>
+              <a:t>Layout of the store</a:t>
+            </a:r>
+            <a:endParaRPr lang="en-US" dirty="0"/>
+          </a:p>
+        </p:txBody>
+      </p:sp>
+      <p:pic>
+        <p:nvPicPr>
+          <p:cNvPr id="4" name="Picture 3" descr="store-dual.png"/>
+          <p:cNvPicPr>
+            <a:picLocks noChangeAspect="1"/>
+          </p:cNvPicPr>
+          <p:nvPr/>
+        </p:nvPicPr>
+        <p:blipFill>
+          <a:blip r:embed="rId2">
+            <a:extLst>
+              <a:ext uri="{28A0092B-C50C-407E-A947-70E740481C1C}">
+                <a14:useLocalDpi xmlns:a14="http://schemas.microsoft.com/office/drawing/2010/main" val="0"/>
+              </a:ext>
+            </a:extLst>
+          </a:blip>
+          <a:stretch>
+            <a:fillRect/>
+          </a:stretch>
+        </p:blipFill>
+        <p:spPr>
+          <a:xfrm>
+            <a:off x="1218268" y="1651000"/>
+            <a:ext cx="6594573" cy="4917987"/>
+          </a:xfrm>
+          <a:prstGeom prst="rect">
+            <a:avLst/>
+          </a:prstGeom>
+        </p:spPr>
+      </p:pic>
+    </p:spTree>
+    <p:extLst>
+      <p:ext uri="{BB962C8B-B14F-4D97-AF65-F5344CB8AC3E}">
+        <p14:creationId xmlns:p14="http://schemas.microsoft.com/office/powerpoint/2010/main" val="3491420594"/>
+      </p:ext>
+    </p:extLst>
+  </p:cSld>
+  <p:clrMapOvr>
+    <a:masterClrMapping/>
+  </p:clrMapOvr>
+  <p:timing>
+    <p:tnLst>
+      <p:par>
+        <p:cTn xmlns:p14="http://schemas.microsoft.com/office/powerpoint/2010/main" id="1" dur="indefinite" restart="never" nodeType="tmRoot"/>
+      </p:par>
+    </p:tnLst>
+  </p:timing>
+</p:sld>
+</file>
+
+<file path=ppt/slides/slide22.xml><?xml version="1.0" encoding="utf-8"?>
+<p:sld xmlns:a="http://schemas.openxmlformats.org/drawingml/2006/main" xmlns:r="http://schemas.openxmlformats.org/officeDocument/2006/relationships" xmlns:p="http://schemas.openxmlformats.org/presentationml/2006/main">
+  <p:cSld>
+    <p:spTree>
+      <p:nvGrpSpPr>
+        <p:cNvPr id="1" name=""/>
+        <p:cNvGrpSpPr/>
+        <p:nvPr/>
+      </p:nvGrpSpPr>
+      <p:grpSpPr>
+        <a:xfrm>
+          <a:off x="0" y="0"/>
+          <a:ext cx="0" cy="0"/>
+          <a:chOff x="0" y="0"/>
+          <a:chExt cx="0" cy="0"/>
+        </a:xfrm>
+      </p:grpSpPr>
+      <p:sp>
+        <p:nvSpPr>
+          <p:cNvPr id="2" name="Title 1"/>
+          <p:cNvSpPr>
+            <a:spLocks noGrp="1"/>
+          </p:cNvSpPr>
+          <p:nvPr>
+            <p:ph type="title"/>
+          </p:nvPr>
+        </p:nvSpPr>
+        <p:spPr/>
+        <p:txBody>
+          <a:bodyPr/>
+          <a:lstStyle/>
+          <a:p>
+            <a:r>
+              <a:rPr lang="en-US" dirty="0" smtClean="0"/>
+              <a:t>Turns in detail</a:t>
+            </a:r>
+            <a:endParaRPr lang="en-US" dirty="0"/>
+          </a:p>
+        </p:txBody>
+      </p:sp>
+      <p:pic>
+        <p:nvPicPr>
+          <p:cNvPr id="4" name="Picture 3" descr="store-detail.png"/>
+          <p:cNvPicPr>
+            <a:picLocks noChangeAspect="1"/>
+          </p:cNvPicPr>
+          <p:nvPr/>
+        </p:nvPicPr>
+        <p:blipFill>
+          <a:blip r:embed="rId2">
+            <a:extLst>
+              <a:ext uri="{28A0092B-C50C-407E-A947-70E740481C1C}">
+                <a14:useLocalDpi xmlns:a14="http://schemas.microsoft.com/office/drawing/2010/main" val="0"/>
+              </a:ext>
+            </a:extLst>
+          </a:blip>
+          <a:stretch>
+            <a:fillRect/>
+          </a:stretch>
+        </p:blipFill>
+        <p:spPr>
+          <a:xfrm>
+            <a:off x="1169710" y="1417638"/>
+            <a:ext cx="6889246" cy="4755408"/>
+          </a:xfrm>
+          <a:prstGeom prst="rect">
+            <a:avLst/>
+          </a:prstGeom>
+        </p:spPr>
+      </p:pic>
+    </p:spTree>
+    <p:extLst>
+      <p:ext uri="{BB962C8B-B14F-4D97-AF65-F5344CB8AC3E}">
+        <p14:creationId xmlns:p14="http://schemas.microsoft.com/office/powerpoint/2010/main" val="2499202149"/>
+      </p:ext>
+    </p:extLst>
+  </p:cSld>
+  <p:clrMapOvr>
+    <a:masterClrMapping/>
+  </p:clrMapOvr>
+  <p:timing>
+    <p:tnLst>
+      <p:par>
+        <p:cTn xmlns:p14="http://schemas.microsoft.com/office/powerpoint/2010/main" id="1" dur="indefinite" restart="never" nodeType="tmRoot"/>
+      </p:par>
+    </p:tnLst>
+  </p:timing>
+</p:sld>
+</file>
+
+<file path=ppt/slides/slide23.xml><?xml version="1.0" encoding="utf-8"?>
+<p:sld xmlns:a="http://schemas.openxmlformats.org/drawingml/2006/main" xmlns:r="http://schemas.openxmlformats.org/officeDocument/2006/relationships" xmlns:p="http://schemas.openxmlformats.org/presentationml/2006/main">
+  <p:cSld>
+    <p:spTree>
+      <p:nvGrpSpPr>
+        <p:cNvPr id="1" name=""/>
+        <p:cNvGrpSpPr/>
+        <p:nvPr/>
+      </p:nvGrpSpPr>
+      <p:grpSpPr>
+        <a:xfrm>
+          <a:off x="0" y="0"/>
+          <a:ext cx="0" cy="0"/>
+          <a:chOff x="0" y="0"/>
+          <a:chExt cx="0" cy="0"/>
+        </a:xfrm>
+      </p:grpSpPr>
+      <p:sp>
+        <p:nvSpPr>
+          <p:cNvPr id="2" name="Title 1"/>
+          <p:cNvSpPr>
+            <a:spLocks noGrp="1"/>
+          </p:cNvSpPr>
+          <p:nvPr>
+            <p:ph type="title"/>
+          </p:nvPr>
+        </p:nvSpPr>
+        <p:spPr/>
+        <p:txBody>
+          <a:bodyPr/>
+          <a:lstStyle/>
+          <a:p>
+            <a:r>
+              <a:rPr lang="en-US" dirty="0" smtClean="0"/>
+              <a:t>Algorithm</a:t>
+            </a:r>
+            <a:endParaRPr lang="en-US" dirty="0"/>
+          </a:p>
+        </p:txBody>
+      </p:sp>
+      <p:sp>
+        <p:nvSpPr>
+          <p:cNvPr id="3" name="Content Placeholder 2"/>
+          <p:cNvSpPr>
+            <a:spLocks noGrp="1"/>
+          </p:cNvSpPr>
+          <p:nvPr>
+            <p:ph idx="1"/>
+          </p:nvPr>
+        </p:nvSpPr>
+        <p:spPr/>
+        <p:txBody>
+          <a:bodyPr>
+            <a:normAutofit fontScale="92500" lnSpcReduction="20000"/>
+          </a:bodyPr>
+          <a:lstStyle/>
+          <a:p>
+            <a:r>
+              <a:rPr lang="en-US" dirty="0" smtClean="0"/>
+              <a:t>Start with fully characterized Dual graph</a:t>
+            </a:r>
+          </a:p>
+          <a:p>
+            <a:r>
+              <a:rPr lang="en-US" dirty="0" smtClean="0"/>
+              <a:t>Use all-pairs shortest path finder (</a:t>
+            </a:r>
+            <a:r>
+              <a:rPr lang="en-US" dirty="0" err="1" smtClean="0"/>
+              <a:t>Dijkstra’s</a:t>
+            </a:r>
+            <a:r>
+              <a:rPr lang="en-US" dirty="0" smtClean="0"/>
+              <a:t> algorithm on every node)</a:t>
+            </a:r>
+          </a:p>
+          <a:p>
+            <a:r>
+              <a:rPr lang="en-US" dirty="0" smtClean="0"/>
+              <a:t>Each category associated with </a:t>
+            </a:r>
+          </a:p>
+          <a:p>
+            <a:pPr lvl="1"/>
+            <a:r>
+              <a:rPr lang="en-US" dirty="0" smtClean="0"/>
+              <a:t>a set of </a:t>
+            </a:r>
+            <a:r>
+              <a:rPr lang="en-US" b="1" dirty="0" smtClean="0"/>
+              <a:t>primal edges</a:t>
+            </a:r>
+          </a:p>
+          <a:p>
+            <a:pPr lvl="1"/>
+            <a:r>
+              <a:rPr lang="en-US" dirty="0" smtClean="0"/>
+              <a:t>a set of </a:t>
+            </a:r>
+            <a:r>
+              <a:rPr lang="en-US" b="1" dirty="0" smtClean="0"/>
+              <a:t>dual nodes</a:t>
+            </a:r>
+          </a:p>
+          <a:p>
+            <a:r>
+              <a:rPr lang="en-US" dirty="0" smtClean="0"/>
+              <a:t>Consider distance from a dual node to a category as:</a:t>
+            </a:r>
+          </a:p>
+          <a:p>
+            <a:pPr marL="1371600" lvl="6" indent="0">
+              <a:buNone/>
+            </a:pPr>
+            <a:r>
+              <a:rPr lang="en-US" dirty="0" err="1"/>
+              <a:t>dist</a:t>
+            </a:r>
+            <a:r>
+              <a:rPr lang="en-US" dirty="0"/>
+              <a:t> (</a:t>
+            </a:r>
+            <a:r>
+              <a:rPr lang="en-US" i="1" dirty="0"/>
+              <a:t>u</a:t>
+            </a:r>
+            <a:r>
+              <a:rPr lang="en-US" dirty="0"/>
+              <a:t>, category) = min { </a:t>
+            </a:r>
+            <a:r>
+              <a:rPr lang="en-US" dirty="0" err="1"/>
+              <a:t>dist</a:t>
+            </a:r>
+            <a:r>
+              <a:rPr lang="en-US" dirty="0"/>
+              <a:t>(</a:t>
+            </a:r>
+            <a:r>
+              <a:rPr lang="en-US" i="1" dirty="0"/>
+              <a:t>u, v</a:t>
+            </a:r>
+            <a:r>
+              <a:rPr lang="en-US" dirty="0"/>
+              <a:t>) </a:t>
+            </a:r>
+            <a:r>
+              <a:rPr lang="en-US" dirty="0" smtClean="0"/>
+              <a:t>}</a:t>
+            </a:r>
+          </a:p>
+          <a:p>
+            <a:r>
+              <a:rPr lang="en-US" dirty="0" smtClean="0"/>
+              <a:t>Greedy algorithm to walk from category to category</a:t>
+            </a:r>
+          </a:p>
+          <a:p>
+            <a:pPr marL="1371600" lvl="3" indent="0">
+              <a:buNone/>
+            </a:pPr>
+            <a:endParaRPr lang="en-US" dirty="0" smtClean="0"/>
+          </a:p>
+        </p:txBody>
+      </p:sp>
+    </p:spTree>
+    <p:extLst>
+      <p:ext uri="{BB962C8B-B14F-4D97-AF65-F5344CB8AC3E}">
+        <p14:creationId xmlns:p14="http://schemas.microsoft.com/office/powerpoint/2010/main" val="1664058978"/>
+      </p:ext>
+    </p:extLst>
+  </p:cSld>
+  <p:clrMapOvr>
+    <a:masterClrMapping/>
+  </p:clrMapOvr>
+  <p:timing>
+    <p:tnLst>
+      <p:par>
+        <p:cTn xmlns:p14="http://schemas.microsoft.com/office/powerpoint/2010/main" id="1" dur="indefinite" restart="never" nodeType="tmRoot"/>
+      </p:par>
+    </p:tnLst>
+  </p:timing>
+</p:sld>
+</file>
+
+<file path=ppt/slides/slide24.xml><?xml version="1.0" encoding="utf-8"?>
+<p:sld xmlns:a="http://schemas.openxmlformats.org/drawingml/2006/main" xmlns:r="http://schemas.openxmlformats.org/officeDocument/2006/relationships" xmlns:p="http://schemas.openxmlformats.org/presentationml/2006/main">
+  <p:cSld>
+    <p:spTree>
+      <p:nvGrpSpPr>
+        <p:cNvPr id="1" name=""/>
+        <p:cNvGrpSpPr/>
+        <p:nvPr/>
+      </p:nvGrpSpPr>
+      <p:grpSpPr>
+        <a:xfrm>
+          <a:off x="0" y="0"/>
+          <a:ext cx="0" cy="0"/>
+          <a:chOff x="0" y="0"/>
+          <a:chExt cx="0" cy="0"/>
+        </a:xfrm>
+      </p:grpSpPr>
+      <p:sp>
+        <p:nvSpPr>
+          <p:cNvPr id="2" name="Title 1"/>
+          <p:cNvSpPr>
+            <a:spLocks noGrp="1"/>
+          </p:cNvSpPr>
+          <p:nvPr>
+            <p:ph type="title"/>
+          </p:nvPr>
+        </p:nvSpPr>
+        <p:spPr/>
+        <p:txBody>
+          <a:bodyPr/>
+          <a:lstStyle/>
+          <a:p>
+            <a:r>
+              <a:rPr lang="en-US" dirty="0" smtClean="0"/>
+              <a:t>Future Work</a:t>
+            </a:r>
+            <a:endParaRPr lang="en-US" dirty="0"/>
+          </a:p>
+        </p:txBody>
+      </p:sp>
+      <p:sp>
+        <p:nvSpPr>
+          <p:cNvPr id="3" name="Content Placeholder 2"/>
+          <p:cNvSpPr>
+            <a:spLocks noGrp="1"/>
+          </p:cNvSpPr>
+          <p:nvPr>
+            <p:ph idx="1"/>
+          </p:nvPr>
+        </p:nvSpPr>
+        <p:spPr/>
+        <p:txBody>
+          <a:bodyPr>
+            <a:normAutofit lnSpcReduction="10000"/>
+          </a:bodyPr>
+          <a:lstStyle/>
+          <a:p>
+            <a:r>
+              <a:rPr lang="en-US" sz="2800" dirty="0" smtClean="0"/>
+              <a:t>Sync the app to automatically gather store layout data into the database. </a:t>
+            </a:r>
+          </a:p>
+          <a:p>
+            <a:endParaRPr lang="en-US" sz="2800" dirty="0" smtClean="0"/>
+          </a:p>
+          <a:p>
+            <a:r>
+              <a:rPr lang="en-US" sz="2800" dirty="0" smtClean="0"/>
+              <a:t>Integrate Google Maps in the app to automatically get the store location. </a:t>
+            </a:r>
+          </a:p>
+          <a:p>
+            <a:endParaRPr lang="en-US" sz="2800" dirty="0" smtClean="0"/>
+          </a:p>
+          <a:p>
+            <a:r>
+              <a:rPr lang="en-US" sz="2800" dirty="0" smtClean="0"/>
+              <a:t>A </a:t>
+            </a:r>
+            <a:r>
+              <a:rPr lang="en-US" sz="2800" dirty="0"/>
+              <a:t>useful additional feature for </a:t>
+            </a:r>
+            <a:r>
+              <a:rPr lang="en-US" sz="2800" dirty="0" err="1"/>
+              <a:t>QuickShop</a:t>
+            </a:r>
+            <a:r>
+              <a:rPr lang="en-US" sz="2800" dirty="0"/>
+              <a:t> would be an easy way for a user to map out a store </a:t>
+            </a:r>
+            <a:r>
+              <a:rPr lang="en-US" sz="2800" dirty="0" smtClean="0"/>
+              <a:t>himself; </a:t>
+            </a:r>
+            <a:r>
+              <a:rPr lang="en-US" sz="2800" dirty="0"/>
+              <a:t>such data could then be made available to other users in the same area </a:t>
+            </a:r>
+            <a:endParaRPr lang="en-US" sz="2800" dirty="0"/>
+          </a:p>
+          <a:p>
+            <a:endParaRPr lang="en-US" sz="2800" dirty="0" smtClean="0"/>
+          </a:p>
+          <a:p>
+            <a:endParaRPr lang="en-US" sz="2800" dirty="0"/>
+          </a:p>
+        </p:txBody>
+      </p:sp>
+    </p:spTree>
+    <p:extLst>
+      <p:ext uri="{BB962C8B-B14F-4D97-AF65-F5344CB8AC3E}">
+        <p14:creationId xmlns:p14="http://schemas.microsoft.com/office/powerpoint/2010/main" val="909888528"/>
+      </p:ext>
+    </p:extLst>
+  </p:cSld>
+  <p:clrMapOvr>
+    <a:masterClrMapping/>
+  </p:clrMapOvr>
+  <p:timing>
+    <p:tnLst>
+      <p:par>
+        <p:cTn xmlns:p14="http://schemas.microsoft.com/office/powerpoint/2010/main" id="1" dur="indefinite" restart="never" nodeType="tmRoot"/>
+      </p:par>
+    </p:tnLst>
+  </p:timing>
+</p:sld>
+</file>
+
 <file path=ppt/slides/slide3.xml><?xml version="1.0" encoding="utf-8"?>
 <p:sld xmlns:a="http://schemas.openxmlformats.org/drawingml/2006/main" xmlns:r="http://schemas.openxmlformats.org/officeDocument/2006/relationships" xmlns:p="http://schemas.openxmlformats.org/presentationml/2006/main">
   <p:cSld>
@@ -22924,16 +23928,18 @@
         </p:nvSpPr>
         <p:spPr/>
         <p:txBody>
-          <a:bodyPr>
-            <a:normAutofit/>
-          </a:bodyPr>
-          <a:lstStyle/>
-          <a:p>
-            <a:r>
-              <a:rPr lang="en-US" b="1" dirty="0" smtClean="0"/>
-              <a:t>Technologies used</a:t>
-            </a:r>
-            <a:endParaRPr lang="en-US" b="1" dirty="0"/>
+          <a:bodyPr/>
+          <a:lstStyle/>
+          <a:p>
+            <a:r>
+              <a:rPr lang="en-US" dirty="0" err="1" smtClean="0"/>
+              <a:t>QuickShop</a:t>
+            </a:r>
+            <a:r>
+              <a:rPr lang="en-US" dirty="0" smtClean="0"/>
+              <a:t>	</a:t>
+            </a:r>
+            <a:endParaRPr lang="en-US" dirty="0"/>
           </a:p>
         </p:txBody>
       </p:sp>
@@ -22950,67 +23956,75 @@
         <p:spPr/>
         <p:txBody>
           <a:bodyPr>
-            <a:normAutofit lnSpcReduction="10000"/>
+            <a:normAutofit/>
           </a:bodyPr>
           <a:lstStyle/>
           <a:p>
             <a:r>
-              <a:rPr lang="en-US" b="1" dirty="0" smtClean="0"/>
-              <a:t>Java</a:t>
-            </a:r>
-            <a:r>
-              <a:rPr lang="en-US" dirty="0" smtClean="0"/>
-              <a:t> - Programming language</a:t>
-            </a:r>
-          </a:p>
-          <a:p>
-            <a:endParaRPr lang="en-US" dirty="0" smtClean="0"/>
-          </a:p>
-          <a:p>
-            <a:r>
-              <a:rPr lang="en-US" b="1" dirty="0" smtClean="0"/>
-              <a:t>Eclipse IDE </a:t>
-            </a:r>
-            <a:r>
-              <a:rPr lang="en-US" dirty="0" smtClean="0"/>
-              <a:t>- Development engine </a:t>
-            </a:r>
-          </a:p>
-          <a:p>
-            <a:endParaRPr lang="en-US" dirty="0" smtClean="0"/>
-          </a:p>
-          <a:p>
-            <a:r>
-              <a:rPr lang="en-US" b="1" dirty="0" smtClean="0"/>
-              <a:t>Android SDK </a:t>
-            </a:r>
-            <a:r>
-              <a:rPr lang="en-US" dirty="0" smtClean="0"/>
-              <a:t>- Application development</a:t>
-            </a:r>
-          </a:p>
-          <a:p>
-            <a:endParaRPr lang="en-US" dirty="0" smtClean="0"/>
-          </a:p>
-          <a:p>
-            <a:r>
-              <a:rPr lang="en-US" b="1" dirty="0" smtClean="0"/>
-              <a:t>SQLite Database </a:t>
-            </a:r>
-            <a:r>
-              <a:rPr lang="en-US" dirty="0" smtClean="0"/>
-              <a:t>- To record store layout information</a:t>
-            </a:r>
-          </a:p>
-          <a:p>
-            <a:endParaRPr lang="en-US" dirty="0"/>
+              <a:rPr lang="en-US" sz="2000" dirty="0" smtClean="0"/>
+              <a:t>Android app to sort a shopping list by category to make the user pick up items in one pass without returning to a section </a:t>
+            </a:r>
+          </a:p>
+          <a:p>
+            <a:endParaRPr lang="en-US" sz="2000" dirty="0" smtClean="0"/>
+          </a:p>
+          <a:p>
+            <a:r>
+              <a:rPr lang="en-US" sz="2000" dirty="0" smtClean="0"/>
+              <a:t>Store layout stored in a SQLite Database</a:t>
+            </a:r>
+          </a:p>
+          <a:p>
+            <a:endParaRPr lang="en-US" sz="2000" dirty="0" smtClean="0"/>
+          </a:p>
+          <a:p>
+            <a:r>
+              <a:rPr lang="en-US" sz="2000" dirty="0" smtClean="0"/>
+              <a:t>Dynamic sorting of categories</a:t>
+            </a:r>
+          </a:p>
+          <a:p>
+            <a:endParaRPr lang="en-US" sz="2000" dirty="0" smtClean="0"/>
+          </a:p>
+          <a:p>
+            <a:r>
+              <a:rPr lang="en-US" sz="2000" dirty="0" smtClean="0"/>
+              <a:t>Helps saving user’s time and effort</a:t>
+            </a:r>
+          </a:p>
+          <a:p>
+            <a:endParaRPr lang="en-US" sz="2000" dirty="0" smtClean="0"/>
+          </a:p>
+          <a:p>
+            <a:r>
+              <a:rPr lang="en-US" sz="2000" dirty="0" smtClean="0"/>
+              <a:t>List becomes a virtual guide helping picking up items in the right order. </a:t>
+            </a:r>
+          </a:p>
+          <a:p>
+            <a:endParaRPr lang="en-US" sz="2000" dirty="0" smtClean="0"/>
+          </a:p>
+          <a:p>
+            <a:r>
+              <a:rPr lang="en-US" sz="2000" dirty="0" smtClean="0"/>
+              <a:t>Great help in an unfamiliar store</a:t>
+            </a:r>
+          </a:p>
+          <a:p>
+            <a:endParaRPr lang="en-US" sz="2000" dirty="0" smtClean="0"/>
+          </a:p>
+          <a:p>
+            <a:endParaRPr lang="en-US" sz="2000" dirty="0" smtClean="0"/>
+          </a:p>
+          <a:p>
+            <a:endParaRPr lang="en-US" sz="2000" dirty="0"/>
           </a:p>
         </p:txBody>
       </p:sp>
     </p:spTree>
     <p:extLst>
       <p:ext uri="{BB962C8B-B14F-4D97-AF65-F5344CB8AC3E}">
-        <p14:creationId xmlns:p14="http://schemas.microsoft.com/office/powerpoint/2010/main" val="4291848706"/>
+        <p14:creationId xmlns:p14="http://schemas.microsoft.com/office/powerpoint/2010/main" val="1412936036"/>
       </p:ext>
     </p:extLst>
   </p:cSld>
@@ -23056,18 +24070,16 @@
         </p:nvSpPr>
         <p:spPr/>
         <p:txBody>
-          <a:bodyPr/>
-          <a:lstStyle/>
-          <a:p>
-            <a:r>
-              <a:rPr lang="en-US" dirty="0" err="1" smtClean="0"/>
-              <a:t>QuickShop</a:t>
-            </a:r>
-            <a:r>
-              <a:rPr lang="en-US" dirty="0" smtClean="0"/>
-              <a:t>	</a:t>
-            </a:r>
-            <a:endParaRPr lang="en-US" dirty="0"/>
+          <a:bodyPr>
+            <a:normAutofit/>
+          </a:bodyPr>
+          <a:lstStyle/>
+          <a:p>
+            <a:r>
+              <a:rPr lang="en-US" b="1" dirty="0" smtClean="0"/>
+              <a:t>Technologies used</a:t>
+            </a:r>
+            <a:endParaRPr lang="en-US" b="1" dirty="0"/>
           </a:p>
         </p:txBody>
       </p:sp>
@@ -23084,75 +24096,67 @@
         <p:spPr/>
         <p:txBody>
           <a:bodyPr>
-            <a:normAutofit/>
+            <a:normAutofit lnSpcReduction="10000"/>
           </a:bodyPr>
           <a:lstStyle/>
           <a:p>
             <a:r>
-              <a:rPr lang="en-US" sz="2000" dirty="0" smtClean="0"/>
-              <a:t>Android app to sort a shopping list by category to make the user pick up items in one pass without returning to a section </a:t>
-            </a:r>
-          </a:p>
-          <a:p>
-            <a:endParaRPr lang="en-US" sz="2000" dirty="0" smtClean="0"/>
-          </a:p>
-          <a:p>
-            <a:r>
-              <a:rPr lang="en-US" sz="2000" dirty="0" smtClean="0"/>
-              <a:t>Store layout stored in a SQLite Database</a:t>
-            </a:r>
-          </a:p>
-          <a:p>
-            <a:endParaRPr lang="en-US" sz="2000" dirty="0" smtClean="0"/>
-          </a:p>
-          <a:p>
-            <a:r>
-              <a:rPr lang="en-US" sz="2000" dirty="0" smtClean="0"/>
-              <a:t>Dynamic sorting of categories</a:t>
-            </a:r>
-          </a:p>
-          <a:p>
-            <a:endParaRPr lang="en-US" sz="2000" dirty="0" smtClean="0"/>
-          </a:p>
-          <a:p>
-            <a:r>
-              <a:rPr lang="en-US" sz="2000" dirty="0" smtClean="0"/>
-              <a:t>Helps saving user’s time and effort</a:t>
-            </a:r>
-          </a:p>
-          <a:p>
-            <a:endParaRPr lang="en-US" sz="2000" dirty="0" smtClean="0"/>
-          </a:p>
-          <a:p>
-            <a:r>
-              <a:rPr lang="en-US" sz="2000" dirty="0" smtClean="0"/>
-              <a:t>List becomes a virtual guide helping picking up items in the right order. </a:t>
-            </a:r>
-          </a:p>
-          <a:p>
-            <a:endParaRPr lang="en-US" sz="2000" dirty="0" smtClean="0"/>
-          </a:p>
-          <a:p>
-            <a:r>
-              <a:rPr lang="en-US" sz="2000" dirty="0" smtClean="0"/>
-              <a:t>Great help in an unfamiliar store</a:t>
-            </a:r>
-          </a:p>
-          <a:p>
-            <a:endParaRPr lang="en-US" sz="2000" dirty="0" smtClean="0"/>
-          </a:p>
-          <a:p>
-            <a:endParaRPr lang="en-US" sz="2000" dirty="0" smtClean="0"/>
-          </a:p>
-          <a:p>
-            <a:endParaRPr lang="en-US" sz="2000" dirty="0"/>
+              <a:rPr lang="en-US" b="1" dirty="0" smtClean="0"/>
+              <a:t>Java</a:t>
+            </a:r>
+            <a:r>
+              <a:rPr lang="en-US" dirty="0" smtClean="0"/>
+              <a:t> - Programming language</a:t>
+            </a:r>
+          </a:p>
+          <a:p>
+            <a:endParaRPr lang="en-US" dirty="0" smtClean="0"/>
+          </a:p>
+          <a:p>
+            <a:r>
+              <a:rPr lang="en-US" b="1" dirty="0" smtClean="0"/>
+              <a:t>Eclipse IDE </a:t>
+            </a:r>
+            <a:r>
+              <a:rPr lang="en-US" dirty="0" smtClean="0"/>
+              <a:t>- Development engine </a:t>
+            </a:r>
+          </a:p>
+          <a:p>
+            <a:endParaRPr lang="en-US" dirty="0" smtClean="0"/>
+          </a:p>
+          <a:p>
+            <a:r>
+              <a:rPr lang="en-US" b="1" dirty="0" smtClean="0"/>
+              <a:t>Android SDK </a:t>
+            </a:r>
+            <a:r>
+              <a:rPr lang="en-US" dirty="0" smtClean="0"/>
+              <a:t>- Application development</a:t>
+            </a:r>
+          </a:p>
+          <a:p>
+            <a:endParaRPr lang="en-US" dirty="0" smtClean="0"/>
+          </a:p>
+          <a:p>
+            <a:r>
+              <a:rPr lang="en-US" b="1" dirty="0" smtClean="0"/>
+              <a:t>SQLite Database </a:t>
+            </a:r>
+            <a:r>
+              <a:rPr lang="en-US" dirty="0" smtClean="0"/>
+              <a:t>- To record store layout information</a:t>
+            </a:r>
+          </a:p>
+          <a:p>
+            <a:endParaRPr lang="en-US" dirty="0"/>
           </a:p>
         </p:txBody>
       </p:sp>
     </p:spTree>
     <p:extLst>
       <p:ext uri="{BB962C8B-B14F-4D97-AF65-F5344CB8AC3E}">
-        <p14:creationId xmlns:p14="http://schemas.microsoft.com/office/powerpoint/2010/main" val="1412936036"/>
+        <p14:creationId xmlns:p14="http://schemas.microsoft.com/office/powerpoint/2010/main" val="4291848706"/>
       </p:ext>
     </p:extLst>
   </p:cSld>
@@ -23461,13 +24465,8 @@
             </a:pPr>
             <a:r>
               <a:rPr lang="en-US" sz="1600" dirty="0" smtClean="0"/>
-              <a:t>          - Each </a:t>
-            </a:r>
-            <a:r>
-              <a:rPr lang="en-US" sz="1600" dirty="0" smtClean="0"/>
-              <a:t>category spans one or more 	   segments</a:t>
-            </a:r>
-            <a:endParaRPr lang="en-US" sz="1600" dirty="0" smtClean="0"/>
+              <a:t>          - Each category spans one or more 	   segments</a:t>
+            </a:r>
           </a:p>
           <a:p>
             <a:pPr marL="0" indent="0">
@@ -25010,6 +26009,42 @@
           <a:xfrm flipH="1" flipV="1">
             <a:off x="5128231" y="4648664"/>
             <a:ext cx="997536" cy="1755"/>
+          </a:xfrm>
+          <a:prstGeom prst="straightConnector1">
+            <a:avLst/>
+          </a:prstGeom>
+          <a:ln>
+            <a:solidFill>
+              <a:srgbClr val="008000"/>
+            </a:solidFill>
+            <a:tailEnd type="arrow"/>
+          </a:ln>
+        </p:spPr>
+        <p:style>
+          <a:lnRef idx="2">
+            <a:schemeClr val="accent1"/>
+          </a:lnRef>
+          <a:fillRef idx="0">
+            <a:schemeClr val="accent1"/>
+          </a:fillRef>
+          <a:effectRef idx="1">
+            <a:schemeClr val="accent1"/>
+          </a:effectRef>
+          <a:fontRef idx="minor">
+            <a:schemeClr val="tx1"/>
+          </a:fontRef>
+        </p:style>
+      </p:cxnSp>
+      <p:cxnSp>
+        <p:nvCxnSpPr>
+          <p:cNvPr id="55" name="Straight Arrow Connector 54"/>
+          <p:cNvCxnSpPr/>
+          <p:nvPr/>
+        </p:nvCxnSpPr>
+        <p:spPr>
+          <a:xfrm flipV="1">
+            <a:off x="3226477" y="2539986"/>
+            <a:ext cx="2657856" cy="2193088"/>
           </a:xfrm>
           <a:prstGeom prst="straightConnector1">
             <a:avLst/>
@@ -25411,7 +26446,7 @@
                                           </p:stCondLst>
                                         </p:cTn>
                                         <p:tgtEl>
-                                          <p:spTgt spid="24"/>
+                                          <p:spTgt spid="55"/>
                                         </p:tgtEl>
                                         <p:attrNameLst>
                                           <p:attrName>style.visibility</p:attrName>
@@ -25443,7 +26478,7 @@
                             </p:stCondLst>
                             <p:childTnLst>
                               <p:par>
-                                <p:cTn id="37" presetID="1" presetClass="entr" presetSubtype="0" fill="hold" grpId="0" nodeType="clickEffect">
+                                <p:cTn id="37" presetID="1" presetClass="entr" presetSubtype="0" fill="hold" nodeType="clickEffect">
                                   <p:stCondLst>
                                     <p:cond delay="0"/>
                                   </p:stCondLst>
@@ -25456,7 +26491,7 @@
                                           </p:stCondLst>
                                         </p:cTn>
                                         <p:tgtEl>
-                                          <p:spTgt spid="56"/>
+                                          <p:spTgt spid="24"/>
                                         </p:tgtEl>
                                         <p:attrNameLst>
                                           <p:attrName>style.visibility</p:attrName>
@@ -25488,7 +26523,7 @@
                             </p:stCondLst>
                             <p:childTnLst>
                               <p:par>
-                                <p:cTn id="41" presetID="1" presetClass="entr" presetSubtype="0" fill="hold" nodeType="clickEffect">
+                                <p:cTn id="41" presetID="1" presetClass="entr" presetSubtype="0" fill="hold" grpId="0" nodeType="clickEffect">
                                   <p:stCondLst>
                                     <p:cond delay="0"/>
                                   </p:stCondLst>
@@ -25501,11 +26536,7 @@
                                           </p:stCondLst>
                                         </p:cTn>
                                         <p:tgtEl>
-                                          <p:spTgt spid="5">
-                                            <p:txEl>
-                                              <p:pRg st="8" end="8"/>
-                                            </p:txEl>
-                                          </p:spTgt>
+                                          <p:spTgt spid="56"/>
                                         </p:tgtEl>
                                         <p:attrNameLst>
                                           <p:attrName>style.visibility</p:attrName>
@@ -25550,7 +26581,11 @@
                                           </p:stCondLst>
                                         </p:cTn>
                                         <p:tgtEl>
-                                          <p:spTgt spid="65"/>
+                                          <p:spTgt spid="5">
+                                            <p:txEl>
+                                              <p:pRg st="8" end="8"/>
+                                            </p:txEl>
+                                          </p:spTgt>
                                         </p:tgtEl>
                                         <p:attrNameLst>
                                           <p:attrName>style.visibility</p:attrName>
@@ -25590,6 +26625,51 @@
                                     <p:set>
                                       <p:cBhvr>
                                         <p:cTn id="50" dur="1" fill="hold">
+                                          <p:stCondLst>
+                                            <p:cond delay="0"/>
+                                          </p:stCondLst>
+                                        </p:cTn>
+                                        <p:tgtEl>
+                                          <p:spTgt spid="65"/>
+                                        </p:tgtEl>
+                                        <p:attrNameLst>
+                                          <p:attrName>style.visibility</p:attrName>
+                                        </p:attrNameLst>
+                                      </p:cBhvr>
+                                      <p:to>
+                                        <p:strVal val="visible"/>
+                                      </p:to>
+                                    </p:set>
+                                  </p:childTnLst>
+                                </p:cTn>
+                              </p:par>
+                            </p:childTnLst>
+                          </p:cTn>
+                        </p:par>
+                      </p:childTnLst>
+                    </p:cTn>
+                  </p:par>
+                  <p:par>
+                    <p:cTn id="51" fill="hold">
+                      <p:stCondLst>
+                        <p:cond delay="indefinite"/>
+                      </p:stCondLst>
+                      <p:childTnLst>
+                        <p:par>
+                          <p:cTn id="52" fill="hold">
+                            <p:stCondLst>
+                              <p:cond delay="0"/>
+                            </p:stCondLst>
+                            <p:childTnLst>
+                              <p:par>
+                                <p:cTn id="53" presetID="1" presetClass="entr" presetSubtype="0" fill="hold" nodeType="clickEffect">
+                                  <p:stCondLst>
+                                    <p:cond delay="0"/>
+                                  </p:stCondLst>
+                                  <p:childTnLst>
+                                    <p:set>
+                                      <p:cBhvr>
+                                        <p:cTn id="54" dur="1" fill="hold">
                                           <p:stCondLst>
                                             <p:cond delay="0"/>
                                           </p:stCondLst>
@@ -25967,8 +27047,8 @@
         </p:nvSpPr>
         <p:spPr>
           <a:xfrm>
-            <a:off x="3538495" y="2093310"/>
-            <a:ext cx="744483" cy="1383863"/>
+            <a:off x="3538495" y="1994586"/>
+            <a:ext cx="744483" cy="1482587"/>
           </a:xfrm>
           <a:prstGeom prst="rect">
             <a:avLst/>
@@ -26746,7 +27826,7 @@
         <p:spPr>
           <a:xfrm>
             <a:off x="5579241" y="4976980"/>
-            <a:ext cx="387124" cy="1345773"/>
+            <a:ext cx="387124" cy="1478123"/>
           </a:xfrm>
           <a:prstGeom prst="rect">
             <a:avLst/>
@@ -26912,11 +27992,7 @@
           <a:p>
             <a:r>
               <a:rPr lang="en-US" dirty="0" smtClean="0"/>
-              <a:t>Publix - </a:t>
-            </a:r>
-            <a:r>
-              <a:rPr lang="en-US" dirty="0" smtClean="0"/>
-              <a:t>Holcomb Bridge Road </a:t>
+              <a:t>Publix - Holcomb Bridge Road </a:t>
             </a:r>
             <a:endParaRPr lang="en-US" dirty="0"/>
           </a:p>

</xml_diff>

<commit_message>
- All changes suggested have been added
</commit_message>
<xml_diff>
--- a/QuickShop_DEMO.pptx
+++ b/QuickShop_DEMO.pptx
@@ -215,7 +215,7 @@
           <a:p>
             <a:fld id="{5065205F-B051-D044-AB5B-DA201AA55B9C}" type="datetimeFigureOut">
               <a:rPr lang="en-US" smtClean="0"/>
-              <a:t>12/9/12</a:t>
+              <a:t>12/10/12</a:t>
             </a:fld>
             <a:endParaRPr lang="en-US"/>
           </a:p>
@@ -1020,7 +1020,7 @@
           <a:p>
             <a:fld id="{B8FBF820-FFCF-B240-9F3B-BA537EEA3488}" type="datetimeFigureOut">
               <a:rPr lang="en-US" smtClean="0"/>
-              <a:t>12/9/12</a:t>
+              <a:t>12/10/12</a:t>
             </a:fld>
             <a:endParaRPr lang="en-US"/>
           </a:p>
@@ -1190,7 +1190,7 @@
           <a:p>
             <a:fld id="{B8FBF820-FFCF-B240-9F3B-BA537EEA3488}" type="datetimeFigureOut">
               <a:rPr lang="en-US" smtClean="0"/>
-              <a:t>12/9/12</a:t>
+              <a:t>12/10/12</a:t>
             </a:fld>
             <a:endParaRPr lang="en-US"/>
           </a:p>
@@ -1370,7 +1370,7 @@
           <a:p>
             <a:fld id="{B8FBF820-FFCF-B240-9F3B-BA537EEA3488}" type="datetimeFigureOut">
               <a:rPr lang="en-US" smtClean="0"/>
-              <a:t>12/9/12</a:t>
+              <a:t>12/10/12</a:t>
             </a:fld>
             <a:endParaRPr lang="en-US"/>
           </a:p>
@@ -1540,7 +1540,7 @@
           <a:p>
             <a:fld id="{B8FBF820-FFCF-B240-9F3B-BA537EEA3488}" type="datetimeFigureOut">
               <a:rPr lang="en-US" smtClean="0"/>
-              <a:t>12/9/12</a:t>
+              <a:t>12/10/12</a:t>
             </a:fld>
             <a:endParaRPr lang="en-US"/>
           </a:p>
@@ -1786,7 +1786,7 @@
           <a:p>
             <a:fld id="{B8FBF820-FFCF-B240-9F3B-BA537EEA3488}" type="datetimeFigureOut">
               <a:rPr lang="en-US" smtClean="0"/>
-              <a:t>12/9/12</a:t>
+              <a:t>12/10/12</a:t>
             </a:fld>
             <a:endParaRPr lang="en-US"/>
           </a:p>
@@ -2074,7 +2074,7 @@
           <a:p>
             <a:fld id="{B8FBF820-FFCF-B240-9F3B-BA537EEA3488}" type="datetimeFigureOut">
               <a:rPr lang="en-US" smtClean="0"/>
-              <a:t>12/9/12</a:t>
+              <a:t>12/10/12</a:t>
             </a:fld>
             <a:endParaRPr lang="en-US"/>
           </a:p>
@@ -2496,7 +2496,7 @@
           <a:p>
             <a:fld id="{B8FBF820-FFCF-B240-9F3B-BA537EEA3488}" type="datetimeFigureOut">
               <a:rPr lang="en-US" smtClean="0"/>
-              <a:t>12/9/12</a:t>
+              <a:t>12/10/12</a:t>
             </a:fld>
             <a:endParaRPr lang="en-US"/>
           </a:p>
@@ -2614,7 +2614,7 @@
           <a:p>
             <a:fld id="{B8FBF820-FFCF-B240-9F3B-BA537EEA3488}" type="datetimeFigureOut">
               <a:rPr lang="en-US" smtClean="0"/>
-              <a:t>12/9/12</a:t>
+              <a:t>12/10/12</a:t>
             </a:fld>
             <a:endParaRPr lang="en-US"/>
           </a:p>
@@ -2709,7 +2709,7 @@
           <a:p>
             <a:fld id="{B8FBF820-FFCF-B240-9F3B-BA537EEA3488}" type="datetimeFigureOut">
               <a:rPr lang="en-US" smtClean="0"/>
-              <a:t>12/9/12</a:t>
+              <a:t>12/10/12</a:t>
             </a:fld>
             <a:endParaRPr lang="en-US"/>
           </a:p>
@@ -2986,7 +2986,7 @@
           <a:p>
             <a:fld id="{B8FBF820-FFCF-B240-9F3B-BA537EEA3488}" type="datetimeFigureOut">
               <a:rPr lang="en-US" smtClean="0"/>
-              <a:t>12/9/12</a:t>
+              <a:t>12/10/12</a:t>
             </a:fld>
             <a:endParaRPr lang="en-US"/>
           </a:p>
@@ -3239,7 +3239,7 @@
           <a:p>
             <a:fld id="{B8FBF820-FFCF-B240-9F3B-BA537EEA3488}" type="datetimeFigureOut">
               <a:rPr lang="en-US" smtClean="0"/>
-              <a:t>12/9/12</a:t>
+              <a:t>12/10/12</a:t>
             </a:fld>
             <a:endParaRPr lang="en-US"/>
           </a:p>
@@ -3452,7 +3452,7 @@
           <a:p>
             <a:fld id="{B8FBF820-FFCF-B240-9F3B-BA537EEA3488}" type="datetimeFigureOut">
               <a:rPr lang="en-US" smtClean="0"/>
-              <a:t>12/9/12</a:t>
+              <a:t>12/10/12</a:t>
             </a:fld>
             <a:endParaRPr lang="en-US"/>
           </a:p>
@@ -7025,7 +7025,7 @@
         </p:nvSpPr>
         <p:spPr>
           <a:xfrm>
-            <a:off x="446690" y="2282498"/>
+            <a:off x="446690" y="2292647"/>
             <a:ext cx="2032000" cy="369332"/>
           </a:xfrm>
           <a:prstGeom prst="rect">
@@ -7041,7 +7041,7 @@
           <a:p>
             <a:r>
               <a:rPr lang="en-US" dirty="0" smtClean="0"/>
-              <a:t>Wine</a:t>
+              <a:t>Peanut Butter</a:t>
             </a:r>
             <a:endParaRPr lang="en-US" dirty="0"/>
           </a:p>
@@ -7125,7 +7125,7 @@
           <a:p>
             <a:r>
               <a:rPr lang="en-US" dirty="0" smtClean="0"/>
-              <a:t> Peanut Butter</a:t>
+              <a:t> Wine</a:t>
             </a:r>
             <a:endParaRPr lang="en-US" dirty="0"/>
           </a:p>
@@ -7225,7 +7225,7 @@
         </p:blipFill>
         <p:spPr>
           <a:xfrm>
-            <a:off x="3722410" y="5731564"/>
+            <a:off x="4177420" y="6316060"/>
             <a:ext cx="455010" cy="410343"/>
           </a:xfrm>
           <a:prstGeom prst="rect">
@@ -7233,18 +7233,110 @@
           </a:prstGeom>
         </p:spPr>
       </p:pic>
+      <p:sp>
+        <p:nvSpPr>
+          <p:cNvPr id="52" name="TextBox 51"/>
+          <p:cNvSpPr txBox="1"/>
+          <p:nvPr/>
+        </p:nvSpPr>
+        <p:spPr>
+          <a:xfrm>
+            <a:off x="4784381" y="589906"/>
+            <a:ext cx="307777" cy="1703111"/>
+          </a:xfrm>
+          <a:prstGeom prst="rect">
+            <a:avLst/>
+          </a:prstGeom>
+          <a:noFill/>
+        </p:spPr>
+        <p:txBody>
+          <a:bodyPr vert="wordArtVert" wrap="square" rtlCol="0">
+            <a:spAutoFit/>
+          </a:bodyPr>
+          <a:lstStyle/>
+          <a:p>
+            <a:r>
+              <a:rPr lang="en-US" sz="800" dirty="0" smtClean="0"/>
+              <a:t>I n s e c t I c I d e s</a:t>
+            </a:r>
+            <a:endParaRPr lang="en-US" sz="800" dirty="0"/>
+          </a:p>
+        </p:txBody>
+      </p:sp>
+      <p:sp>
+        <p:nvSpPr>
+          <p:cNvPr id="53" name="TextBox 52"/>
+          <p:cNvSpPr txBox="1"/>
+          <p:nvPr/>
+        </p:nvSpPr>
+        <p:spPr>
+          <a:xfrm>
+            <a:off x="4784381" y="2636078"/>
+            <a:ext cx="307777" cy="1703111"/>
+          </a:xfrm>
+          <a:prstGeom prst="rect">
+            <a:avLst/>
+          </a:prstGeom>
+          <a:noFill/>
+        </p:spPr>
+        <p:txBody>
+          <a:bodyPr vert="wordArtVert" wrap="square" rtlCol="0">
+            <a:spAutoFit/>
+          </a:bodyPr>
+          <a:lstStyle/>
+          <a:p>
+            <a:r>
+              <a:rPr lang="en-US" sz="800" dirty="0" smtClean="0"/>
+              <a:t>P a p e r  P l a t e s</a:t>
+            </a:r>
+            <a:endParaRPr lang="en-US" sz="800" dirty="0"/>
+          </a:p>
+        </p:txBody>
+      </p:sp>
+      <p:sp>
+        <p:nvSpPr>
+          <p:cNvPr id="54" name="TextBox 53"/>
+          <p:cNvSpPr txBox="1"/>
+          <p:nvPr/>
+        </p:nvSpPr>
+        <p:spPr>
+          <a:xfrm>
+            <a:off x="4764690" y="4832790"/>
+            <a:ext cx="307777" cy="1420865"/>
+          </a:xfrm>
+          <a:prstGeom prst="rect">
+            <a:avLst/>
+          </a:prstGeom>
+          <a:noFill/>
+        </p:spPr>
+        <p:txBody>
+          <a:bodyPr vert="wordArtVert" wrap="square" rtlCol="0">
+            <a:spAutoFit/>
+          </a:bodyPr>
+          <a:lstStyle/>
+          <a:p>
+            <a:r>
+              <a:rPr lang="en-US" sz="800" dirty="0" smtClean="0"/>
+              <a:t>P e t  F o o d</a:t>
+            </a:r>
+            <a:endParaRPr lang="en-US" sz="800" dirty="0"/>
+          </a:p>
+        </p:txBody>
+      </p:sp>
       <p:cxnSp>
         <p:nvCxnSpPr>
-          <p:cNvPr id="4" name="Straight Arrow Connector 3"/>
-          <p:cNvCxnSpPr/>
+          <p:cNvPr id="5" name="Straight Connector 4"/>
+          <p:cNvCxnSpPr>
+            <a:stCxn id="44" idx="3"/>
+          </p:cNvCxnSpPr>
           <p:nvPr/>
         </p:nvCxnSpPr>
         <p:spPr>
-          <a:xfrm flipH="1" flipV="1">
-            <a:off x="3871520" y="1109609"/>
-            <a:ext cx="12330" cy="4524739"/>
-          </a:xfrm>
-          <a:prstGeom prst="straightConnector1">
+          <a:xfrm>
+            <a:off x="4632430" y="6521232"/>
+            <a:ext cx="459728" cy="0"/>
+          </a:xfrm>
+          <a:prstGeom prst="line">
             <a:avLst/>
           </a:prstGeom>
           <a:ln>
@@ -7252,7 +7344,6 @@
               <a:srgbClr val="FF0000"/>
             </a:solidFill>
             <a:prstDash val="dash"/>
-            <a:tailEnd type="arrow"/>
           </a:ln>
         </p:spPr>
         <p:style>
@@ -7272,16 +7363,16 @@
       </p:cxnSp>
       <p:cxnSp>
         <p:nvCxnSpPr>
-          <p:cNvPr id="16" name="Straight Connector 15"/>
+          <p:cNvPr id="46" name="Straight Arrow Connector 45"/>
           <p:cNvCxnSpPr/>
           <p:nvPr/>
         </p:nvCxnSpPr>
         <p:spPr>
-          <a:xfrm flipV="1">
-            <a:off x="3871520" y="280277"/>
-            <a:ext cx="0" cy="829332"/>
-          </a:xfrm>
-          <a:prstGeom prst="line">
+          <a:xfrm flipH="1" flipV="1">
+            <a:off x="5092158" y="5335711"/>
+            <a:ext cx="1" cy="1185522"/>
+          </a:xfrm>
+          <a:prstGeom prst="straightConnector1">
             <a:avLst/>
           </a:prstGeom>
           <a:ln>
@@ -7289,6 +7380,7 @@
               <a:srgbClr val="FF0000"/>
             </a:solidFill>
             <a:prstDash val="dash"/>
+            <a:tailEnd type="arrow"/>
           </a:ln>
         </p:spPr>
         <p:style>
@@ -7308,16 +7400,16 @@
       </p:cxnSp>
       <p:cxnSp>
         <p:nvCxnSpPr>
-          <p:cNvPr id="47" name="Straight Connector 46"/>
+          <p:cNvPr id="50" name="Straight Arrow Connector 49"/>
           <p:cNvCxnSpPr/>
           <p:nvPr/>
         </p:nvCxnSpPr>
         <p:spPr>
-          <a:xfrm>
-            <a:off x="3883850" y="280276"/>
-            <a:ext cx="1208308" cy="0"/>
-          </a:xfrm>
-          <a:prstGeom prst="line">
+          <a:xfrm flipH="1" flipV="1">
+            <a:off x="5072467" y="1165707"/>
+            <a:ext cx="19692" cy="4170004"/>
+          </a:xfrm>
+          <a:prstGeom prst="straightConnector1">
             <a:avLst/>
           </a:prstGeom>
           <a:ln>
@@ -7325,6 +7417,7 @@
               <a:srgbClr val="FF0000"/>
             </a:solidFill>
             <a:prstDash val="dash"/>
+            <a:tailEnd type="arrow"/>
           </a:ln>
         </p:spPr>
         <p:style>
@@ -7344,16 +7437,16 @@
       </p:cxnSp>
       <p:cxnSp>
         <p:nvCxnSpPr>
-          <p:cNvPr id="49" name="Straight Arrow Connector 48"/>
+          <p:cNvPr id="61" name="Straight Connector 60"/>
           <p:cNvCxnSpPr/>
           <p:nvPr/>
         </p:nvCxnSpPr>
         <p:spPr>
-          <a:xfrm>
-            <a:off x="5092158" y="280277"/>
-            <a:ext cx="0" cy="983812"/>
-          </a:xfrm>
-          <a:prstGeom prst="straightConnector1">
+          <a:xfrm flipV="1">
+            <a:off x="5072467" y="280276"/>
+            <a:ext cx="0" cy="885431"/>
+          </a:xfrm>
+          <a:prstGeom prst="line">
             <a:avLst/>
           </a:prstGeom>
           <a:ln>
@@ -7361,7 +7454,6 @@
               <a:srgbClr val="FF0000"/>
             </a:solidFill>
             <a:prstDash val="dash"/>
-            <a:tailEnd type="arrow"/>
           </a:ln>
         </p:spPr>
         <p:style>
@@ -7381,14 +7473,50 @@
       </p:cxnSp>
       <p:cxnSp>
         <p:nvCxnSpPr>
-          <p:cNvPr id="51" name="Straight Arrow Connector 50"/>
+          <p:cNvPr id="63" name="Straight Connector 62"/>
           <p:cNvCxnSpPr/>
           <p:nvPr/>
         </p:nvCxnSpPr>
         <p:spPr>
-          <a:xfrm>
-            <a:off x="5092158" y="1264089"/>
-            <a:ext cx="0" cy="4212468"/>
+          <a:xfrm flipH="1">
+            <a:off x="3933413" y="280276"/>
+            <a:ext cx="1139054" cy="0"/>
+          </a:xfrm>
+          <a:prstGeom prst="line">
+            <a:avLst/>
+          </a:prstGeom>
+          <a:ln>
+            <a:solidFill>
+              <a:srgbClr val="FF0000"/>
+            </a:solidFill>
+            <a:prstDash val="dash"/>
+          </a:ln>
+        </p:spPr>
+        <p:style>
+          <a:lnRef idx="2">
+            <a:schemeClr val="accent1"/>
+          </a:lnRef>
+          <a:fillRef idx="0">
+            <a:schemeClr val="accent1"/>
+          </a:fillRef>
+          <a:effectRef idx="1">
+            <a:schemeClr val="accent1"/>
+          </a:effectRef>
+          <a:fontRef idx="minor">
+            <a:schemeClr val="tx1"/>
+          </a:fontRef>
+        </p:style>
+      </p:cxnSp>
+      <p:cxnSp>
+        <p:nvCxnSpPr>
+          <p:cNvPr id="65" name="Straight Arrow Connector 64"/>
+          <p:cNvCxnSpPr/>
+          <p:nvPr/>
+        </p:nvCxnSpPr>
+        <p:spPr>
+          <a:xfrm>
+            <a:off x="3933413" y="280276"/>
+            <a:ext cx="0" cy="762225"/>
           </a:xfrm>
           <a:prstGeom prst="straightConnector1">
             <a:avLst/>
@@ -7416,96 +7544,6 @@
           </a:fontRef>
         </p:style>
       </p:cxnSp>
-      <p:sp>
-        <p:nvSpPr>
-          <p:cNvPr id="52" name="TextBox 51"/>
-          <p:cNvSpPr txBox="1"/>
-          <p:nvPr/>
-        </p:nvSpPr>
-        <p:spPr>
-          <a:xfrm>
-            <a:off x="4784381" y="589906"/>
-            <a:ext cx="307777" cy="1703111"/>
-          </a:xfrm>
-          <a:prstGeom prst="rect">
-            <a:avLst/>
-          </a:prstGeom>
-          <a:noFill/>
-        </p:spPr>
-        <p:txBody>
-          <a:bodyPr vert="wordArtVert" wrap="square" rtlCol="0">
-            <a:spAutoFit/>
-          </a:bodyPr>
-          <a:lstStyle/>
-          <a:p>
-            <a:r>
-              <a:rPr lang="en-US" sz="800" dirty="0" smtClean="0"/>
-              <a:t>I n s e c t I c I d e s</a:t>
-            </a:r>
-            <a:endParaRPr lang="en-US" sz="800" dirty="0"/>
-          </a:p>
-        </p:txBody>
-      </p:sp>
-      <p:sp>
-        <p:nvSpPr>
-          <p:cNvPr id="53" name="TextBox 52"/>
-          <p:cNvSpPr txBox="1"/>
-          <p:nvPr/>
-        </p:nvSpPr>
-        <p:spPr>
-          <a:xfrm>
-            <a:off x="4784381" y="2636078"/>
-            <a:ext cx="307777" cy="1703111"/>
-          </a:xfrm>
-          <a:prstGeom prst="rect">
-            <a:avLst/>
-          </a:prstGeom>
-          <a:noFill/>
-        </p:spPr>
-        <p:txBody>
-          <a:bodyPr vert="wordArtVert" wrap="square" rtlCol="0">
-            <a:spAutoFit/>
-          </a:bodyPr>
-          <a:lstStyle/>
-          <a:p>
-            <a:r>
-              <a:rPr lang="en-US" sz="800" dirty="0" smtClean="0"/>
-              <a:t>P a p e r  P l a t e s</a:t>
-            </a:r>
-            <a:endParaRPr lang="en-US" sz="800" dirty="0"/>
-          </a:p>
-        </p:txBody>
-      </p:sp>
-      <p:sp>
-        <p:nvSpPr>
-          <p:cNvPr id="54" name="TextBox 53"/>
-          <p:cNvSpPr txBox="1"/>
-          <p:nvPr/>
-        </p:nvSpPr>
-        <p:spPr>
-          <a:xfrm>
-            <a:off x="4764690" y="4832790"/>
-            <a:ext cx="307777" cy="1420865"/>
-          </a:xfrm>
-          <a:prstGeom prst="rect">
-            <a:avLst/>
-          </a:prstGeom>
-          <a:noFill/>
-        </p:spPr>
-        <p:txBody>
-          <a:bodyPr vert="wordArtVert" wrap="square" rtlCol="0">
-            <a:spAutoFit/>
-          </a:bodyPr>
-          <a:lstStyle/>
-          <a:p>
-            <a:r>
-              <a:rPr lang="en-US" sz="800" dirty="0" smtClean="0"/>
-              <a:t>P e t  F o o d</a:t>
-            </a:r>
-            <a:endParaRPr lang="en-US" sz="800" dirty="0"/>
-          </a:p>
-        </p:txBody>
-      </p:sp>
     </p:spTree>
     <p:extLst>
       <p:ext uri="{BB962C8B-B14F-4D97-AF65-F5344CB8AC3E}">
@@ -7542,7 +7580,7 @@
                                     <p:cond delay="0"/>
                                   </p:stCondLst>
                                   <p:childTnLst>
-                                    <p:animMotion origin="layout" path="M -0.00086 -0.07616 L -0.00191 -0.71088 " pathEditMode="relative" ptsTypes="AA">
+                                    <p:animMotion origin="layout" path="M 0.02934 0.00115 L 0.07812 0.00115 " pathEditMode="relative" ptsTypes="AA">
                                       <p:cBhvr>
                                         <p:cTn id="6" dur="2000" fill="hold"/>
                                         <p:tgtEl>
@@ -7581,7 +7619,7 @@
                                     <p:cond delay="0"/>
                                   </p:stCondLst>
                                   <p:childTnLst>
-                                    <p:animMotion origin="layout" path="M -0.00191 -0.71088 C -0.0092 -0.7419 -0.0052 -0.77708 -0.00086 -0.80903 C -4.44444E-6 -0.81551 0.00348 -0.82523 0.00869 -0.82708 C 0.01198 -0.82847 0.01928 -0.82963 0.01928 -0.82963 C 0.04757 -0.82893 0.08351 -0.83356 0.11216 -0.82315 C 0.11303 -0.81898 0.11476 -0.81574 0.11598 -0.81157 C 0.11945 -0.77639 0.11789 -0.73842 0.11789 -0.70301 " pathEditMode="relative" ptsTypes="ffffffA">
+                                    <p:animMotion origin="layout" path="M 0.07812 0.00115 L 0.07812 -0.17701 " pathEditMode="relative" ptsTypes="AA">
                                       <p:cBhvr>
                                         <p:cTn id="10" dur="2000" fill="hold"/>
                                         <p:tgtEl>
@@ -7620,9 +7658,126 @@
                                     <p:cond delay="0"/>
                                   </p:stCondLst>
                                   <p:childTnLst>
-                                    <p:animMotion origin="layout" path="M 0.11788 -0.70301 L 0.11788 -0.10787 " pathEditMode="relative" ptsTypes="AA">
+                                    <p:animMotion origin="layout" path="M 0.07812 -0.17701 L 0.07812 -0.764 " pathEditMode="relative" ptsTypes="AA">
                                       <p:cBhvr>
                                         <p:cTn id="14" dur="2000" fill="hold"/>
+                                        <p:tgtEl>
+                                          <p:spTgt spid="44"/>
+                                        </p:tgtEl>
+                                        <p:attrNameLst>
+                                          <p:attrName>ppt_x</p:attrName>
+                                          <p:attrName>ppt_y</p:attrName>
+                                        </p:attrNameLst>
+                                      </p:cBhvr>
+                                    </p:animMotion>
+                                  </p:childTnLst>
+                                </p:cTn>
+                              </p:par>
+                            </p:childTnLst>
+                          </p:cTn>
+                        </p:par>
+                      </p:childTnLst>
+                    </p:cTn>
+                  </p:par>
+                  <p:par>
+                    <p:cTn id="15" fill="hold">
+                      <p:stCondLst>
+                        <p:cond delay="indefinite"/>
+                      </p:stCondLst>
+                      <p:childTnLst>
+                        <p:par>
+                          <p:cTn id="16" fill="hold">
+                            <p:stCondLst>
+                              <p:cond delay="0"/>
+                            </p:stCondLst>
+                            <p:childTnLst>
+                              <p:par>
+                                <p:cTn id="17" presetID="0" presetClass="path" presetSubtype="0" accel="50000" decel="50000" fill="hold" nodeType="clickEffect">
+                                  <p:stCondLst>
+                                    <p:cond delay="0"/>
+                                  </p:stCondLst>
+                                  <p:childTnLst>
+                                    <p:animMotion origin="layout" path="M 0.07812 -0.764 L 0.07812 -0.91046 " pathEditMode="relative" ptsTypes="AA">
+                                      <p:cBhvr>
+                                        <p:cTn id="18" dur="2000" fill="hold"/>
+                                        <p:tgtEl>
+                                          <p:spTgt spid="44"/>
+                                        </p:tgtEl>
+                                        <p:attrNameLst>
+                                          <p:attrName>ppt_x</p:attrName>
+                                          <p:attrName>ppt_y</p:attrName>
+                                        </p:attrNameLst>
+                                      </p:cBhvr>
+                                    </p:animMotion>
+                                  </p:childTnLst>
+                                </p:cTn>
+                              </p:par>
+                            </p:childTnLst>
+                          </p:cTn>
+                        </p:par>
+                      </p:childTnLst>
+                    </p:cTn>
+                  </p:par>
+                  <p:par>
+                    <p:cTn id="19" fill="hold">
+                      <p:stCondLst>
+                        <p:cond delay="indefinite"/>
+                      </p:stCondLst>
+                      <p:childTnLst>
+                        <p:par>
+                          <p:cTn id="20" fill="hold">
+                            <p:stCondLst>
+                              <p:cond delay="0"/>
+                            </p:stCondLst>
+                            <p:childTnLst>
+                              <p:par>
+                                <p:cTn id="21" presetID="0" presetClass="path" presetSubtype="0" accel="50000" decel="50000" fill="hold" nodeType="clickEffect">
+                                  <p:stCondLst>
+                                    <p:cond delay="0"/>
+                                  </p:stCondLst>
+                                  <p:childTnLst>
+                                    <p:animMotion origin="layout" path="M 0.07812 -0.91046 L -0.05242 -0.91046 " pathEditMode="relative" ptsTypes="AA">
+                                      <p:cBhvr>
+                                        <p:cTn id="22" dur="2000" fill="hold"/>
+                                        <p:tgtEl>
+                                          <p:spTgt spid="44"/>
+                                        </p:tgtEl>
+                                        <p:attrNameLst>
+                                          <p:attrName>ppt_x</p:attrName>
+                                          <p:attrName>ppt_y</p:attrName>
+                                        </p:attrNameLst>
+                                      </p:cBhvr>
+                                    </p:animMotion>
+                                  </p:childTnLst>
+                                </p:cTn>
+                              </p:par>
+                            </p:childTnLst>
+                          </p:cTn>
+                        </p:par>
+                      </p:childTnLst>
+                    </p:cTn>
+                  </p:par>
+                  <p:par>
+                    <p:cTn id="23" fill="hold">
+                      <p:stCondLst>
+                        <p:cond delay="indefinite"/>
+                      </p:stCondLst>
+                      <p:childTnLst>
+                        <p:par>
+                          <p:cTn id="24" fill="hold">
+                            <p:stCondLst>
+                              <p:cond delay="0"/>
+                            </p:stCondLst>
+                            <p:childTnLst>
+                              <p:par>
+                                <p:cTn id="25" presetID="0" presetClass="path" presetSubtype="0" accel="50000" decel="50000" fill="hold" nodeType="clickEffect">
+                                  <p:stCondLst>
+                                    <p:cond delay="0"/>
+                                  </p:stCondLst>
+                                  <p:childTnLst>
+                                    <p:animMotion origin="layout" path="M -0.05242 -0.91046 L -0.05242 -0.80842 " pathEditMode="relative" ptsTypes="AA">
+                                      <p:cBhvr>
+                                        <p:cTn id="26" dur="2000" fill="hold"/>
                                         <p:tgtEl>
                                           <p:spTgt spid="44"/>
                                         </p:tgtEl>
@@ -8686,7 +8841,7 @@
           <a:p>
             <a:r>
               <a:rPr lang="en-US" dirty="0" smtClean="0"/>
-              <a:t>Wine</a:t>
+              <a:t>Peanut Butter</a:t>
             </a:r>
             <a:endParaRPr lang="en-US" dirty="0"/>
           </a:p>
@@ -8770,7 +8925,7 @@
           <a:p>
             <a:r>
               <a:rPr lang="en-US" dirty="0" smtClean="0"/>
-              <a:t> Peanut Butter</a:t>
+              <a:t>  Wine</a:t>
             </a:r>
             <a:endParaRPr lang="en-US" dirty="0"/>
           </a:p>
@@ -8870,7 +9025,7 @@
         </p:blipFill>
         <p:spPr>
           <a:xfrm>
-            <a:off x="3722410" y="5731564"/>
+            <a:off x="4177420" y="6385952"/>
             <a:ext cx="455010" cy="410343"/>
           </a:xfrm>
           <a:prstGeom prst="rect">
@@ -8956,305 +9111,6 @@
           </a:prstGeom>
         </p:spPr>
       </p:pic>
-      <p:cxnSp>
-        <p:nvCxnSpPr>
-          <p:cNvPr id="4" name="Straight Arrow Connector 3"/>
-          <p:cNvCxnSpPr>
-            <a:stCxn id="44" idx="0"/>
-          </p:cNvCxnSpPr>
-          <p:nvPr/>
-        </p:nvCxnSpPr>
-        <p:spPr>
-          <a:xfrm flipV="1">
-            <a:off x="3949915" y="1050554"/>
-            <a:ext cx="0" cy="4681010"/>
-          </a:xfrm>
-          <a:prstGeom prst="straightConnector1">
-            <a:avLst/>
-          </a:prstGeom>
-          <a:ln>
-            <a:solidFill>
-              <a:srgbClr val="FF0000"/>
-            </a:solidFill>
-            <a:prstDash val="dash"/>
-            <a:tailEnd type="arrow"/>
-          </a:ln>
-        </p:spPr>
-        <p:style>
-          <a:lnRef idx="2">
-            <a:schemeClr val="accent1"/>
-          </a:lnRef>
-          <a:fillRef idx="0">
-            <a:schemeClr val="accent1"/>
-          </a:fillRef>
-          <a:effectRef idx="1">
-            <a:schemeClr val="accent1"/>
-          </a:effectRef>
-          <a:fontRef idx="minor">
-            <a:schemeClr val="tx1"/>
-          </a:fontRef>
-        </p:style>
-      </p:cxnSp>
-      <p:cxnSp>
-        <p:nvCxnSpPr>
-          <p:cNvPr id="54" name="Straight Connector 53"/>
-          <p:cNvCxnSpPr/>
-          <p:nvPr/>
-        </p:nvCxnSpPr>
-        <p:spPr>
-          <a:xfrm flipV="1">
-            <a:off x="3949915" y="280276"/>
-            <a:ext cx="0" cy="770279"/>
-          </a:xfrm>
-          <a:prstGeom prst="line">
-            <a:avLst/>
-          </a:prstGeom>
-          <a:ln>
-            <a:solidFill>
-              <a:srgbClr val="FF0000"/>
-            </a:solidFill>
-            <a:prstDash val="dash"/>
-          </a:ln>
-        </p:spPr>
-        <p:style>
-          <a:lnRef idx="2">
-            <a:schemeClr val="accent1"/>
-          </a:lnRef>
-          <a:fillRef idx="0">
-            <a:schemeClr val="accent1"/>
-          </a:fillRef>
-          <a:effectRef idx="1">
-            <a:schemeClr val="accent1"/>
-          </a:effectRef>
-          <a:fontRef idx="minor">
-            <a:schemeClr val="tx1"/>
-          </a:fontRef>
-        </p:style>
-      </p:cxnSp>
-      <p:cxnSp>
-        <p:nvCxnSpPr>
-          <p:cNvPr id="57" name="Straight Connector 56"/>
-          <p:cNvCxnSpPr/>
-          <p:nvPr/>
-        </p:nvCxnSpPr>
-        <p:spPr>
-          <a:xfrm>
-            <a:off x="3949915" y="280276"/>
-            <a:ext cx="1246227" cy="0"/>
-          </a:xfrm>
-          <a:prstGeom prst="line">
-            <a:avLst/>
-          </a:prstGeom>
-          <a:ln>
-            <a:solidFill>
-              <a:srgbClr val="FF0000"/>
-            </a:solidFill>
-            <a:prstDash val="dash"/>
-          </a:ln>
-        </p:spPr>
-        <p:style>
-          <a:lnRef idx="2">
-            <a:schemeClr val="accent1"/>
-          </a:lnRef>
-          <a:fillRef idx="0">
-            <a:schemeClr val="accent1"/>
-          </a:fillRef>
-          <a:effectRef idx="1">
-            <a:schemeClr val="accent1"/>
-          </a:effectRef>
-          <a:fontRef idx="minor">
-            <a:schemeClr val="tx1"/>
-          </a:fontRef>
-        </p:style>
-      </p:cxnSp>
-      <p:cxnSp>
-        <p:nvCxnSpPr>
-          <p:cNvPr id="60" name="Straight Arrow Connector 59"/>
-          <p:cNvCxnSpPr/>
-          <p:nvPr/>
-        </p:nvCxnSpPr>
-        <p:spPr>
-          <a:xfrm>
-            <a:off x="5196142" y="280276"/>
-            <a:ext cx="0" cy="1234966"/>
-          </a:xfrm>
-          <a:prstGeom prst="straightConnector1">
-            <a:avLst/>
-          </a:prstGeom>
-          <a:ln>
-            <a:solidFill>
-              <a:srgbClr val="FF0000"/>
-            </a:solidFill>
-            <a:prstDash val="dash"/>
-            <a:tailEnd type="arrow"/>
-          </a:ln>
-        </p:spPr>
-        <p:style>
-          <a:lnRef idx="2">
-            <a:schemeClr val="accent1"/>
-          </a:lnRef>
-          <a:fillRef idx="0">
-            <a:schemeClr val="accent1"/>
-          </a:fillRef>
-          <a:effectRef idx="1">
-            <a:schemeClr val="accent1"/>
-          </a:effectRef>
-          <a:fontRef idx="minor">
-            <a:schemeClr val="tx1"/>
-          </a:fontRef>
-        </p:style>
-      </p:cxnSp>
-      <p:cxnSp>
-        <p:nvCxnSpPr>
-          <p:cNvPr id="63" name="Straight Arrow Connector 62"/>
-          <p:cNvCxnSpPr>
-            <a:stCxn id="17" idx="1"/>
-          </p:cNvCxnSpPr>
-          <p:nvPr/>
-        </p:nvCxnSpPr>
-        <p:spPr>
-          <a:xfrm flipH="1">
-            <a:off x="4891432" y="5283420"/>
-            <a:ext cx="304710" cy="0"/>
-          </a:xfrm>
-          <a:prstGeom prst="straightConnector1">
-            <a:avLst/>
-          </a:prstGeom>
-          <a:ln>
-            <a:solidFill>
-              <a:srgbClr val="FF0000"/>
-            </a:solidFill>
-            <a:tailEnd type="arrow"/>
-          </a:ln>
-        </p:spPr>
-        <p:style>
-          <a:lnRef idx="2">
-            <a:schemeClr val="accent1"/>
-          </a:lnRef>
-          <a:fillRef idx="0">
-            <a:schemeClr val="accent1"/>
-          </a:fillRef>
-          <a:effectRef idx="1">
-            <a:schemeClr val="accent1"/>
-          </a:effectRef>
-          <a:fontRef idx="minor">
-            <a:schemeClr val="tx1"/>
-          </a:fontRef>
-        </p:style>
-      </p:cxnSp>
-      <p:cxnSp>
-        <p:nvCxnSpPr>
-          <p:cNvPr id="65" name="Straight Arrow Connector 64"/>
-          <p:cNvCxnSpPr/>
-          <p:nvPr/>
-        </p:nvCxnSpPr>
-        <p:spPr>
-          <a:xfrm flipV="1">
-            <a:off x="4891432" y="2680934"/>
-            <a:ext cx="0" cy="2602486"/>
-          </a:xfrm>
-          <a:prstGeom prst="straightConnector1">
-            <a:avLst/>
-          </a:prstGeom>
-          <a:ln>
-            <a:solidFill>
-              <a:srgbClr val="FF0000"/>
-            </a:solidFill>
-            <a:prstDash val="dash"/>
-            <a:tailEnd type="arrow"/>
-          </a:ln>
-        </p:spPr>
-        <p:style>
-          <a:lnRef idx="2">
-            <a:schemeClr val="accent1"/>
-          </a:lnRef>
-          <a:fillRef idx="0">
-            <a:schemeClr val="accent1"/>
-          </a:fillRef>
-          <a:effectRef idx="1">
-            <a:schemeClr val="accent1"/>
-          </a:effectRef>
-          <a:fontRef idx="minor">
-            <a:schemeClr val="tx1"/>
-          </a:fontRef>
-        </p:style>
-      </p:cxnSp>
-      <p:cxnSp>
-        <p:nvCxnSpPr>
-          <p:cNvPr id="75" name="Straight Arrow Connector 74"/>
-          <p:cNvCxnSpPr/>
-          <p:nvPr/>
-        </p:nvCxnSpPr>
-        <p:spPr>
-          <a:xfrm>
-            <a:off x="4891432" y="2725886"/>
-            <a:ext cx="304710" cy="0"/>
-          </a:xfrm>
-          <a:prstGeom prst="straightConnector1">
-            <a:avLst/>
-          </a:prstGeom>
-          <a:ln>
-            <a:solidFill>
-              <a:srgbClr val="FF0000"/>
-            </a:solidFill>
-            <a:prstDash val="dash"/>
-            <a:tailEnd type="arrow"/>
-          </a:ln>
-        </p:spPr>
-        <p:style>
-          <a:lnRef idx="2">
-            <a:schemeClr val="accent1"/>
-          </a:lnRef>
-          <a:fillRef idx="0">
-            <a:schemeClr val="accent1"/>
-          </a:fillRef>
-          <a:effectRef idx="1">
-            <a:schemeClr val="accent1"/>
-          </a:effectRef>
-          <a:fontRef idx="minor">
-            <a:schemeClr val="tx1"/>
-          </a:fontRef>
-        </p:style>
-      </p:cxnSp>
-      <p:cxnSp>
-        <p:nvCxnSpPr>
-          <p:cNvPr id="78" name="Straight Arrow Connector 77"/>
-          <p:cNvCxnSpPr>
-            <a:endCxn id="17" idx="1"/>
-          </p:cNvCxnSpPr>
-          <p:nvPr/>
-        </p:nvCxnSpPr>
-        <p:spPr>
-          <a:xfrm>
-            <a:off x="5196142" y="1601946"/>
-            <a:ext cx="0" cy="3681474"/>
-          </a:xfrm>
-          <a:prstGeom prst="straightConnector1">
-            <a:avLst/>
-          </a:prstGeom>
-          <a:ln>
-            <a:solidFill>
-              <a:srgbClr val="FF0000"/>
-            </a:solidFill>
-            <a:prstDash val="dash"/>
-            <a:tailEnd type="arrow"/>
-          </a:ln>
-        </p:spPr>
-        <p:style>
-          <a:lnRef idx="2">
-            <a:schemeClr val="accent1"/>
-          </a:lnRef>
-          <a:fillRef idx="0">
-            <a:schemeClr val="accent1"/>
-          </a:fillRef>
-          <a:effectRef idx="1">
-            <a:schemeClr val="accent1"/>
-          </a:effectRef>
-          <a:fontRef idx="minor">
-            <a:schemeClr val="tx1"/>
-          </a:fontRef>
-        </p:style>
-      </p:cxnSp>
       <p:sp>
         <p:nvSpPr>
           <p:cNvPr id="79" name="Oval 78"/>
@@ -9263,8 +9119,8 @@
         </p:nvSpPr>
         <p:spPr>
           <a:xfrm>
-            <a:off x="4764690" y="5008180"/>
-            <a:ext cx="550040" cy="468377"/>
+            <a:off x="3516571" y="0"/>
+            <a:ext cx="1987347" cy="468377"/>
           </a:xfrm>
           <a:prstGeom prst="ellipse">
             <a:avLst/>
@@ -9406,6 +9262,372 @@
           </a:p>
         </p:txBody>
       </p:sp>
+      <p:cxnSp>
+        <p:nvCxnSpPr>
+          <p:cNvPr id="5" name="Straight Connector 4"/>
+          <p:cNvCxnSpPr/>
+          <p:nvPr/>
+        </p:nvCxnSpPr>
+        <p:spPr>
+          <a:xfrm>
+            <a:off x="4632430" y="6562693"/>
+            <a:ext cx="459728" cy="0"/>
+          </a:xfrm>
+          <a:prstGeom prst="line">
+            <a:avLst/>
+          </a:prstGeom>
+          <a:ln>
+            <a:solidFill>
+              <a:srgbClr val="FF0000"/>
+            </a:solidFill>
+            <a:prstDash val="dash"/>
+          </a:ln>
+        </p:spPr>
+        <p:style>
+          <a:lnRef idx="2">
+            <a:schemeClr val="accent1"/>
+          </a:lnRef>
+          <a:fillRef idx="0">
+            <a:schemeClr val="accent1"/>
+          </a:fillRef>
+          <a:effectRef idx="1">
+            <a:schemeClr val="accent1"/>
+          </a:effectRef>
+          <a:fontRef idx="minor">
+            <a:schemeClr val="tx1"/>
+          </a:fontRef>
+        </p:style>
+      </p:cxnSp>
+      <p:cxnSp>
+        <p:nvCxnSpPr>
+          <p:cNvPr id="50" name="Straight Arrow Connector 49"/>
+          <p:cNvCxnSpPr/>
+          <p:nvPr/>
+        </p:nvCxnSpPr>
+        <p:spPr>
+          <a:xfrm flipV="1">
+            <a:off x="5072467" y="5240938"/>
+            <a:ext cx="0" cy="1321755"/>
+          </a:xfrm>
+          <a:prstGeom prst="straightConnector1">
+            <a:avLst/>
+          </a:prstGeom>
+          <a:ln>
+            <a:solidFill>
+              <a:srgbClr val="FF0000"/>
+            </a:solidFill>
+            <a:prstDash val="dash"/>
+            <a:tailEnd type="arrow"/>
+          </a:ln>
+        </p:spPr>
+        <p:style>
+          <a:lnRef idx="2">
+            <a:schemeClr val="accent1"/>
+          </a:lnRef>
+          <a:fillRef idx="0">
+            <a:schemeClr val="accent1"/>
+          </a:fillRef>
+          <a:effectRef idx="1">
+            <a:schemeClr val="accent1"/>
+          </a:effectRef>
+          <a:fontRef idx="minor">
+            <a:schemeClr val="tx1"/>
+          </a:fontRef>
+        </p:style>
+      </p:cxnSp>
+      <p:cxnSp>
+        <p:nvCxnSpPr>
+          <p:cNvPr id="52" name="Straight Arrow Connector 51"/>
+          <p:cNvCxnSpPr/>
+          <p:nvPr/>
+        </p:nvCxnSpPr>
+        <p:spPr>
+          <a:xfrm flipV="1">
+            <a:off x="5072467" y="1264089"/>
+            <a:ext cx="0" cy="3976849"/>
+          </a:xfrm>
+          <a:prstGeom prst="straightConnector1">
+            <a:avLst/>
+          </a:prstGeom>
+          <a:ln>
+            <a:solidFill>
+              <a:srgbClr val="FF0000"/>
+            </a:solidFill>
+            <a:prstDash val="dash"/>
+            <a:tailEnd type="arrow"/>
+          </a:ln>
+        </p:spPr>
+        <p:style>
+          <a:lnRef idx="2">
+            <a:schemeClr val="accent1"/>
+          </a:lnRef>
+          <a:fillRef idx="0">
+            <a:schemeClr val="accent1"/>
+          </a:fillRef>
+          <a:effectRef idx="1">
+            <a:schemeClr val="accent1"/>
+          </a:effectRef>
+          <a:fontRef idx="minor">
+            <a:schemeClr val="tx1"/>
+          </a:fontRef>
+        </p:style>
+      </p:cxnSp>
+      <p:cxnSp>
+        <p:nvCxnSpPr>
+          <p:cNvPr id="58" name="Straight Connector 57"/>
+          <p:cNvCxnSpPr/>
+          <p:nvPr/>
+        </p:nvCxnSpPr>
+        <p:spPr>
+          <a:xfrm flipV="1">
+            <a:off x="5072467" y="280276"/>
+            <a:ext cx="0" cy="983813"/>
+          </a:xfrm>
+          <a:prstGeom prst="line">
+            <a:avLst/>
+          </a:prstGeom>
+          <a:ln>
+            <a:solidFill>
+              <a:srgbClr val="FF0000"/>
+            </a:solidFill>
+            <a:prstDash val="dash"/>
+          </a:ln>
+        </p:spPr>
+        <p:style>
+          <a:lnRef idx="2">
+            <a:schemeClr val="accent1"/>
+          </a:lnRef>
+          <a:fillRef idx="0">
+            <a:schemeClr val="accent1"/>
+          </a:fillRef>
+          <a:effectRef idx="1">
+            <a:schemeClr val="accent1"/>
+          </a:effectRef>
+          <a:fontRef idx="minor">
+            <a:schemeClr val="tx1"/>
+          </a:fontRef>
+        </p:style>
+      </p:cxnSp>
+      <p:cxnSp>
+        <p:nvCxnSpPr>
+          <p:cNvPr id="61" name="Straight Connector 60"/>
+          <p:cNvCxnSpPr/>
+          <p:nvPr/>
+        </p:nvCxnSpPr>
+        <p:spPr>
+          <a:xfrm flipH="1">
+            <a:off x="3857588" y="280276"/>
+            <a:ext cx="1214879" cy="0"/>
+          </a:xfrm>
+          <a:prstGeom prst="line">
+            <a:avLst/>
+          </a:prstGeom>
+          <a:ln>
+            <a:solidFill>
+              <a:srgbClr val="FF0000"/>
+            </a:solidFill>
+            <a:prstDash val="dash"/>
+          </a:ln>
+        </p:spPr>
+        <p:style>
+          <a:lnRef idx="2">
+            <a:schemeClr val="accent1"/>
+          </a:lnRef>
+          <a:fillRef idx="0">
+            <a:schemeClr val="accent1"/>
+          </a:fillRef>
+          <a:effectRef idx="1">
+            <a:schemeClr val="accent1"/>
+          </a:effectRef>
+          <a:fontRef idx="minor">
+            <a:schemeClr val="tx1"/>
+          </a:fontRef>
+        </p:style>
+      </p:cxnSp>
+      <p:cxnSp>
+        <p:nvCxnSpPr>
+          <p:cNvPr id="64" name="Straight Arrow Connector 63"/>
+          <p:cNvCxnSpPr/>
+          <p:nvPr/>
+        </p:nvCxnSpPr>
+        <p:spPr>
+          <a:xfrm>
+            <a:off x="3857588" y="280276"/>
+            <a:ext cx="0" cy="752748"/>
+          </a:xfrm>
+          <a:prstGeom prst="straightConnector1">
+            <a:avLst/>
+          </a:prstGeom>
+          <a:ln>
+            <a:solidFill>
+              <a:srgbClr val="FF0000"/>
+            </a:solidFill>
+            <a:prstDash val="dash"/>
+            <a:tailEnd type="arrow"/>
+          </a:ln>
+        </p:spPr>
+        <p:style>
+          <a:lnRef idx="2">
+            <a:schemeClr val="accent1"/>
+          </a:lnRef>
+          <a:fillRef idx="0">
+            <a:schemeClr val="accent1"/>
+          </a:fillRef>
+          <a:effectRef idx="1">
+            <a:schemeClr val="accent1"/>
+          </a:effectRef>
+          <a:fontRef idx="minor">
+            <a:schemeClr val="tx1"/>
+          </a:fontRef>
+        </p:style>
+      </p:cxnSp>
+      <p:cxnSp>
+        <p:nvCxnSpPr>
+          <p:cNvPr id="67" name="Straight Connector 66"/>
+          <p:cNvCxnSpPr/>
+          <p:nvPr/>
+        </p:nvCxnSpPr>
+        <p:spPr>
+          <a:xfrm flipH="1">
+            <a:off x="3688515" y="1033024"/>
+            <a:ext cx="169073" cy="0"/>
+          </a:xfrm>
+          <a:prstGeom prst="line">
+            <a:avLst/>
+          </a:prstGeom>
+          <a:ln>
+            <a:solidFill>
+              <a:srgbClr val="FF0000"/>
+            </a:solidFill>
+            <a:prstDash val="dash"/>
+          </a:ln>
+        </p:spPr>
+        <p:style>
+          <a:lnRef idx="2">
+            <a:schemeClr val="accent1"/>
+          </a:lnRef>
+          <a:fillRef idx="0">
+            <a:schemeClr val="accent1"/>
+          </a:fillRef>
+          <a:effectRef idx="1">
+            <a:schemeClr val="accent1"/>
+          </a:effectRef>
+          <a:fontRef idx="minor">
+            <a:schemeClr val="tx1"/>
+          </a:fontRef>
+        </p:style>
+      </p:cxnSp>
+      <p:cxnSp>
+        <p:nvCxnSpPr>
+          <p:cNvPr id="70" name="Straight Connector 69"/>
+          <p:cNvCxnSpPr/>
+          <p:nvPr/>
+        </p:nvCxnSpPr>
+        <p:spPr>
+          <a:xfrm flipV="1">
+            <a:off x="3688515" y="161114"/>
+            <a:ext cx="0" cy="871910"/>
+          </a:xfrm>
+          <a:prstGeom prst="line">
+            <a:avLst/>
+          </a:prstGeom>
+          <a:ln>
+            <a:solidFill>
+              <a:srgbClr val="FF0000"/>
+            </a:solidFill>
+            <a:prstDash val="dash"/>
+          </a:ln>
+        </p:spPr>
+        <p:style>
+          <a:lnRef idx="2">
+            <a:schemeClr val="accent1"/>
+          </a:lnRef>
+          <a:fillRef idx="0">
+            <a:schemeClr val="accent1"/>
+          </a:fillRef>
+          <a:effectRef idx="1">
+            <a:schemeClr val="accent1"/>
+          </a:effectRef>
+          <a:fontRef idx="minor">
+            <a:schemeClr val="tx1"/>
+          </a:fontRef>
+        </p:style>
+      </p:cxnSp>
+      <p:cxnSp>
+        <p:nvCxnSpPr>
+          <p:cNvPr id="73" name="Straight Connector 72"/>
+          <p:cNvCxnSpPr/>
+          <p:nvPr/>
+        </p:nvCxnSpPr>
+        <p:spPr>
+          <a:xfrm>
+            <a:off x="3722410" y="161114"/>
+            <a:ext cx="1473732" cy="0"/>
+          </a:xfrm>
+          <a:prstGeom prst="line">
+            <a:avLst/>
+          </a:prstGeom>
+          <a:ln>
+            <a:solidFill>
+              <a:srgbClr val="FF0000"/>
+            </a:solidFill>
+            <a:prstDash val="dash"/>
+          </a:ln>
+        </p:spPr>
+        <p:style>
+          <a:lnRef idx="2">
+            <a:schemeClr val="accent1"/>
+          </a:lnRef>
+          <a:fillRef idx="0">
+            <a:schemeClr val="accent1"/>
+          </a:fillRef>
+          <a:effectRef idx="1">
+            <a:schemeClr val="accent1"/>
+          </a:effectRef>
+          <a:fontRef idx="minor">
+            <a:schemeClr val="tx1"/>
+          </a:fontRef>
+        </p:style>
+      </p:cxnSp>
+      <p:cxnSp>
+        <p:nvCxnSpPr>
+          <p:cNvPr id="77" name="Straight Arrow Connector 76"/>
+          <p:cNvCxnSpPr>
+            <a:endCxn id="18" idx="1"/>
+          </p:cNvCxnSpPr>
+          <p:nvPr/>
+        </p:nvCxnSpPr>
+        <p:spPr>
+          <a:xfrm>
+            <a:off x="5196142" y="161114"/>
+            <a:ext cx="0" cy="2743349"/>
+          </a:xfrm>
+          <a:prstGeom prst="straightConnector1">
+            <a:avLst/>
+          </a:prstGeom>
+          <a:ln>
+            <a:solidFill>
+              <a:srgbClr val="FF0000"/>
+            </a:solidFill>
+            <a:prstDash val="dash"/>
+            <a:tailEnd type="arrow"/>
+          </a:ln>
+        </p:spPr>
+        <p:style>
+          <a:lnRef idx="2">
+            <a:schemeClr val="accent1"/>
+          </a:lnRef>
+          <a:fillRef idx="0">
+            <a:schemeClr val="accent1"/>
+          </a:fillRef>
+          <a:effectRef idx="1">
+            <a:schemeClr val="accent1"/>
+          </a:effectRef>
+          <a:fontRef idx="minor">
+            <a:schemeClr val="tx1"/>
+          </a:fontRef>
+        </p:style>
+      </p:cxnSp>
     </p:spTree>
     <p:extLst>
       <p:ext uri="{BB962C8B-B14F-4D97-AF65-F5344CB8AC3E}">
@@ -9442,7 +9664,7 @@
                                     <p:cond delay="0"/>
                                   </p:stCondLst>
                                   <p:childTnLst>
-                                    <p:animMotion origin="layout" path="M -0.00381 -0.07755 L -0.00468 -0.70463 " pathEditMode="relative" ptsTypes="AA">
+                                    <p:animMotion origin="layout" path="M 0.0283 0.00069 L 0.07707 -0.0007 " pathEditMode="relative" ptsTypes="AA">
                                       <p:cBhvr>
                                         <p:cTn id="6" dur="2000" fill="hold"/>
                                         <p:tgtEl>
@@ -9481,7 +9703,7 @@
                                     <p:cond delay="0"/>
                                   </p:stCondLst>
                                   <p:childTnLst>
-                                    <p:animMotion origin="layout" path="M -0.00468 -0.70463 C -0.00538 -0.72454 -0.00607 -0.74399 -0.00746 -0.76343 C -0.00729 -0.77408 -0.00729 -0.78496 -0.00659 -0.79538 C -0.00538 -0.81922 0.02466 -0.81783 0.03455 -0.81829 C 0.05886 -0.822 0.08507 -0.82732 0.10834 -0.81575 C 0.11389 -0.80487 0.10608 -0.81852 0.1132 -0.81065 C 0.11407 -0.80973 0.11424 -0.80788 0.11511 -0.80672 C 0.1158 -0.80579 0.11684 -0.8051 0.11789 -0.80417 C 0.12136 -0.79514 0.12396 -0.79098 0.12552 -0.7801 C 0.12657 -0.71204 0.12657 -0.74005 0.12657 -0.69584 " pathEditMode="relative" ptsTypes="fffffffffA">
+                                    <p:animMotion origin="layout" path="M 0.07708 -0.0007 L 0.07708 -0.19135 " pathEditMode="relative" ptsTypes="AA">
                                       <p:cBhvr>
                                         <p:cTn id="10" dur="2000" fill="hold"/>
                                         <p:tgtEl>
@@ -9520,7 +9742,7 @@
                                     <p:cond delay="0"/>
                                   </p:stCondLst>
                                   <p:childTnLst>
-                                    <p:animMotion origin="layout" path="M 0.12657 -0.69583 L 0.12657 -0.07755 " pathEditMode="relative" ptsTypes="AA">
+                                    <p:animMotion origin="layout" path="M 0.07707 -0.19135 L 0.07707 -0.76146 " pathEditMode="relative" ptsTypes="AA">
                                       <p:cBhvr>
                                         <p:cTn id="14" dur="2000" fill="hold"/>
                                         <p:tgtEl>
@@ -9559,7 +9781,7 @@
                                     <p:cond delay="0"/>
                                   </p:stCondLst>
                                   <p:childTnLst>
-                                    <p:animMotion origin="layout" path="M 0.12657 -0.07755 L 0.12553 -0.42639 " pathEditMode="relative" ptsTypes="AA">
+                                    <p:animMotion origin="layout" path="M 0.07708 -0.76146 L 0.0769 -0.92203 " pathEditMode="relative" ptsTypes="AA">
                                       <p:cBhvr>
                                         <p:cTn id="18" dur="2000" fill="hold"/>
                                         <p:tgtEl>
@@ -9593,14 +9815,209 @@
                             </p:stCondLst>
                             <p:childTnLst>
                               <p:par>
-                                <p:cTn id="21" presetID="1" presetClass="entr" presetSubtype="0" fill="hold" grpId="0" nodeType="clickEffect">
+                                <p:cTn id="21" presetID="0" presetClass="path" presetSubtype="0" accel="50000" decel="50000" fill="hold" nodeType="clickEffect">
+                                  <p:stCondLst>
+                                    <p:cond delay="0"/>
+                                  </p:stCondLst>
+                                  <p:childTnLst>
+                                    <p:animMotion origin="layout" path="M 0.0769 -0.92203 L -0.05867 -0.92203 " pathEditMode="relative" ptsTypes="AA">
+                                      <p:cBhvr>
+                                        <p:cTn id="22" dur="2000" fill="hold"/>
+                                        <p:tgtEl>
+                                          <p:spTgt spid="44"/>
+                                        </p:tgtEl>
+                                        <p:attrNameLst>
+                                          <p:attrName>ppt_x</p:attrName>
+                                          <p:attrName>ppt_y</p:attrName>
+                                        </p:attrNameLst>
+                                      </p:cBhvr>
+                                    </p:animMotion>
+                                  </p:childTnLst>
+                                </p:cTn>
+                              </p:par>
+                            </p:childTnLst>
+                          </p:cTn>
+                        </p:par>
+                      </p:childTnLst>
+                    </p:cTn>
+                  </p:par>
+                  <p:par>
+                    <p:cTn id="23" fill="hold">
+                      <p:stCondLst>
+                        <p:cond delay="indefinite"/>
+                      </p:stCondLst>
+                      <p:childTnLst>
+                        <p:par>
+                          <p:cTn id="24" fill="hold">
+                            <p:stCondLst>
+                              <p:cond delay="0"/>
+                            </p:stCondLst>
+                            <p:childTnLst>
+                              <p:par>
+                                <p:cTn id="25" presetID="0" presetClass="path" presetSubtype="0" accel="50000" decel="50000" fill="hold" nodeType="clickEffect">
+                                  <p:stCondLst>
+                                    <p:cond delay="0"/>
+                                  </p:stCondLst>
+                                  <p:childTnLst>
+                                    <p:animMotion origin="layout" path="M -0.05867 -0.92203 L -0.05867 -0.82763 " pathEditMode="relative" ptsTypes="AA">
+                                      <p:cBhvr>
+                                        <p:cTn id="26" dur="2000" fill="hold"/>
+                                        <p:tgtEl>
+                                          <p:spTgt spid="44"/>
+                                        </p:tgtEl>
+                                        <p:attrNameLst>
+                                          <p:attrName>ppt_x</p:attrName>
+                                          <p:attrName>ppt_y</p:attrName>
+                                        </p:attrNameLst>
+                                      </p:cBhvr>
+                                    </p:animMotion>
+                                  </p:childTnLst>
+                                </p:cTn>
+                              </p:par>
+                            </p:childTnLst>
+                          </p:cTn>
+                        </p:par>
+                      </p:childTnLst>
+                    </p:cTn>
+                  </p:par>
+                  <p:par>
+                    <p:cTn id="27" fill="hold">
+                      <p:stCondLst>
+                        <p:cond delay="indefinite"/>
+                      </p:stCondLst>
+                      <p:childTnLst>
+                        <p:par>
+                          <p:cTn id="28" fill="hold">
+                            <p:stCondLst>
+                              <p:cond delay="0"/>
+                            </p:stCondLst>
+                            <p:childTnLst>
+                              <p:par>
+                                <p:cTn id="29" presetID="0" presetClass="path" presetSubtype="0" accel="50000" decel="50000" fill="hold" nodeType="clickEffect">
+                                  <p:stCondLst>
+                                    <p:cond delay="0"/>
+                                  </p:stCondLst>
+                                  <p:childTnLst>
+                                    <p:animMotion origin="layout" path="M -0.05867 -0.82763 L -0.05971 -0.92226 " pathEditMode="relative" ptsTypes="AA">
+                                      <p:cBhvr>
+                                        <p:cTn id="30" dur="2000" fill="hold"/>
+                                        <p:tgtEl>
+                                          <p:spTgt spid="44"/>
+                                        </p:tgtEl>
+                                        <p:attrNameLst>
+                                          <p:attrName>ppt_x</p:attrName>
+                                          <p:attrName>ppt_y</p:attrName>
+                                        </p:attrNameLst>
+                                      </p:cBhvr>
+                                    </p:animMotion>
+                                  </p:childTnLst>
+                                </p:cTn>
+                              </p:par>
+                            </p:childTnLst>
+                          </p:cTn>
+                        </p:par>
+                      </p:childTnLst>
+                    </p:cTn>
+                  </p:par>
+                  <p:par>
+                    <p:cTn id="31" fill="hold">
+                      <p:stCondLst>
+                        <p:cond delay="indefinite"/>
+                      </p:stCondLst>
+                      <p:childTnLst>
+                        <p:par>
+                          <p:cTn id="32" fill="hold">
+                            <p:stCondLst>
+                              <p:cond delay="0"/>
+                            </p:stCondLst>
+                            <p:childTnLst>
+                              <p:par>
+                                <p:cTn id="33" presetID="0" presetClass="path" presetSubtype="0" accel="50000" decel="50000" fill="hold" nodeType="clickEffect">
+                                  <p:stCondLst>
+                                    <p:cond delay="0"/>
+                                  </p:stCondLst>
+                                  <p:childTnLst>
+                                    <p:animMotion origin="layout" path="M -0.05867 -0.92203 L 0.09391 -0.92203 " pathEditMode="relative" ptsTypes="AA">
+                                      <p:cBhvr>
+                                        <p:cTn id="34" dur="2000" fill="hold"/>
+                                        <p:tgtEl>
+                                          <p:spTgt spid="44"/>
+                                        </p:tgtEl>
+                                        <p:attrNameLst>
+                                          <p:attrName>ppt_x</p:attrName>
+                                          <p:attrName>ppt_y</p:attrName>
+                                        </p:attrNameLst>
+                                      </p:cBhvr>
+                                    </p:animMotion>
+                                  </p:childTnLst>
+                                </p:cTn>
+                              </p:par>
+                            </p:childTnLst>
+                          </p:cTn>
+                        </p:par>
+                      </p:childTnLst>
+                    </p:cTn>
+                  </p:par>
+                  <p:par>
+                    <p:cTn id="35" fill="hold">
+                      <p:stCondLst>
+                        <p:cond delay="indefinite"/>
+                      </p:stCondLst>
+                      <p:childTnLst>
+                        <p:par>
+                          <p:cTn id="36" fill="hold">
+                            <p:stCondLst>
+                              <p:cond delay="0"/>
+                            </p:stCondLst>
+                            <p:childTnLst>
+                              <p:par>
+                                <p:cTn id="37" presetID="0" presetClass="path" presetSubtype="0" accel="50000" decel="50000" fill="hold" nodeType="clickEffect">
+                                  <p:stCondLst>
+                                    <p:cond delay="0"/>
+                                  </p:stCondLst>
+                                  <p:childTnLst>
+                                    <p:animMotion origin="layout" path="M 0.0769 -0.92203 L 0.0769 -0.54234 " pathEditMode="relative" ptsTypes="AA">
+                                      <p:cBhvr>
+                                        <p:cTn id="38" dur="2000" fill="hold"/>
+                                        <p:tgtEl>
+                                          <p:spTgt spid="44"/>
+                                        </p:tgtEl>
+                                        <p:attrNameLst>
+                                          <p:attrName>ppt_x</p:attrName>
+                                          <p:attrName>ppt_y</p:attrName>
+                                        </p:attrNameLst>
+                                      </p:cBhvr>
+                                    </p:animMotion>
+                                  </p:childTnLst>
+                                </p:cTn>
+                              </p:par>
+                            </p:childTnLst>
+                          </p:cTn>
+                        </p:par>
+                      </p:childTnLst>
+                    </p:cTn>
+                  </p:par>
+                  <p:par>
+                    <p:cTn id="39" fill="hold">
+                      <p:stCondLst>
+                        <p:cond delay="indefinite"/>
+                      </p:stCondLst>
+                      <p:childTnLst>
+                        <p:par>
+                          <p:cTn id="40" fill="hold">
+                            <p:stCondLst>
+                              <p:cond delay="0"/>
+                            </p:stCondLst>
+                            <p:childTnLst>
+                              <p:par>
+                                <p:cTn id="41" presetID="1" presetClass="entr" presetSubtype="0" fill="hold" grpId="1" nodeType="clickEffect">
                                   <p:stCondLst>
                                     <p:cond delay="0"/>
                                   </p:stCondLst>
                                   <p:childTnLst>
                                     <p:set>
                                       <p:cBhvr>
-                                        <p:cTn id="22" dur="1" fill="hold">
+                                        <p:cTn id="42" dur="1" fill="hold">
                                           <p:stCondLst>
                                             <p:cond delay="0"/>
                                           </p:stCondLst>
@@ -9647,7 +10064,7 @@
       </p:par>
     </p:tnLst>
     <p:bldLst>
-      <p:bldP spid="79" grpId="0" animBg="1"/>
+      <p:bldP spid="79" grpId="1" animBg="1"/>
     </p:bldLst>
   </p:timing>
 </p:sld>
@@ -9686,7 +10103,7 @@
         </p:blipFill>
         <p:spPr>
           <a:xfrm>
-            <a:off x="330638" y="280276"/>
+            <a:off x="374433" y="304352"/>
             <a:ext cx="2901293" cy="5970320"/>
           </a:xfrm>
           <a:prstGeom prst="rect">
@@ -9734,7 +10151,7 @@
         </p:blipFill>
         <p:spPr>
           <a:xfrm>
-            <a:off x="374433" y="2509777"/>
+            <a:off x="412345" y="2519254"/>
             <a:ext cx="2743636" cy="294509"/>
           </a:xfrm>
           <a:prstGeom prst="rect">
@@ -10673,7 +11090,7 @@
           <a:p>
             <a:r>
               <a:rPr lang="en-US" dirty="0" smtClean="0"/>
-              <a:t>Wine</a:t>
+              <a:t>Peanut Butter</a:t>
             </a:r>
             <a:endParaRPr lang="en-US" dirty="0"/>
           </a:p>
@@ -10727,7 +11144,7 @@
           <a:p>
             <a:r>
               <a:rPr lang="en-US" dirty="0" smtClean="0"/>
-              <a:t>Cereals</a:t>
+              <a:t>Cold Beer</a:t>
             </a:r>
             <a:endParaRPr lang="en-US" dirty="0"/>
           </a:p>
@@ -10757,7 +11174,7 @@
           <a:p>
             <a:r>
               <a:rPr lang="en-US" dirty="0" smtClean="0"/>
-              <a:t> Cold Beer</a:t>
+              <a:t> Cereals</a:t>
             </a:r>
             <a:endParaRPr lang="en-US" dirty="0"/>
           </a:p>
@@ -10779,7 +11196,7 @@
         </p:blipFill>
         <p:spPr>
           <a:xfrm>
-            <a:off x="386689" y="3497763"/>
+            <a:off x="424601" y="3497763"/>
             <a:ext cx="2743636" cy="294509"/>
           </a:xfrm>
           <a:prstGeom prst="rect">
@@ -10857,7 +11274,7 @@
         </p:blipFill>
         <p:spPr>
           <a:xfrm>
-            <a:off x="3722410" y="5731564"/>
+            <a:off x="4177420" y="6316060"/>
             <a:ext cx="455010" cy="410343"/>
           </a:xfrm>
           <a:prstGeom prst="rect">
@@ -10889,7 +11306,7 @@
           <a:p>
             <a:r>
               <a:rPr lang="en-US" dirty="0" smtClean="0"/>
-              <a:t> Peanut Butter</a:t>
+              <a:t> Wine</a:t>
             </a:r>
             <a:endParaRPr lang="en-US" dirty="0"/>
           </a:p>
@@ -10911,7 +11328,7 @@
         </p:blipFill>
         <p:spPr>
           <a:xfrm>
-            <a:off x="386689" y="3932618"/>
+            <a:off x="424601" y="3932618"/>
             <a:ext cx="2743636" cy="294509"/>
           </a:xfrm>
           <a:prstGeom prst="rect">
@@ -10945,16 +11362,16 @@
       </p:pic>
       <p:cxnSp>
         <p:nvCxnSpPr>
-          <p:cNvPr id="4" name="Straight Arrow Connector 3"/>
+          <p:cNvPr id="16" name="Straight Connector 15"/>
           <p:cNvCxnSpPr/>
           <p:nvPr/>
         </p:nvCxnSpPr>
         <p:spPr>
           <a:xfrm flipV="1">
-            <a:off x="3872384" y="1081915"/>
-            <a:ext cx="1" cy="4394642"/>
-          </a:xfrm>
-          <a:prstGeom prst="straightConnector1">
+            <a:off x="3872384" y="280276"/>
+            <a:ext cx="0" cy="801638"/>
+          </a:xfrm>
+          <a:prstGeom prst="line">
             <a:avLst/>
           </a:prstGeom>
           <a:ln>
@@ -10962,43 +11379,8 @@
               <a:srgbClr val="FF0000"/>
             </a:solidFill>
             <a:prstDash val="dash"/>
-            <a:tailEnd type="arrow"/>
-          </a:ln>
-        </p:spPr>
-        <p:style>
-          <a:lnRef idx="2">
-            <a:schemeClr val="accent1"/>
-          </a:lnRef>
-          <a:fillRef idx="0">
-            <a:schemeClr val="accent1"/>
-          </a:fillRef>
-          <a:effectRef idx="1">
-            <a:schemeClr val="accent1"/>
-          </a:effectRef>
-          <a:fontRef idx="minor">
-            <a:schemeClr val="tx1"/>
-          </a:fontRef>
-        </p:style>
-      </p:cxnSp>
-      <p:cxnSp>
-        <p:nvCxnSpPr>
-          <p:cNvPr id="16" name="Straight Connector 15"/>
-          <p:cNvCxnSpPr/>
-          <p:nvPr/>
-        </p:nvCxnSpPr>
-        <p:spPr>
-          <a:xfrm flipV="1">
-            <a:off x="3872384" y="280276"/>
-            <a:ext cx="0" cy="801638"/>
-          </a:xfrm>
-          <a:prstGeom prst="line">
-            <a:avLst/>
-          </a:prstGeom>
-          <a:ln>
-            <a:solidFill>
-              <a:srgbClr val="FF0000"/>
-            </a:solidFill>
-            <a:prstDash val="dash"/>
+            <a:headEnd type="arrow"/>
+            <a:tailEnd type="none"/>
           </a:ln>
         </p:spPr>
         <p:style>
@@ -11071,7 +11453,7 @@
               <a:srgbClr val="FF0000"/>
             </a:solidFill>
             <a:prstDash val="dash"/>
-            <a:tailEnd type="arrow"/>
+            <a:tailEnd type="none"/>
           </a:ln>
         </p:spPr>
         <p:style>
@@ -11108,7 +11490,8 @@
               <a:srgbClr val="FF0000"/>
             </a:solidFill>
             <a:prstDash val="dash"/>
-            <a:tailEnd type="arrow"/>
+            <a:headEnd type="arrow"/>
+            <a:tailEnd type="none"/>
           </a:ln>
         </p:spPr>
         <p:style>
@@ -11145,7 +11528,8 @@
               <a:srgbClr val="FF0000"/>
             </a:solidFill>
             <a:prstDash val="dash"/>
-            <a:tailEnd type="arrow"/>
+            <a:headEnd type="arrow"/>
+            <a:tailEnd type="none"/>
           </a:ln>
         </p:spPr>
         <p:style>
@@ -11253,6 +11637,81 @@
           </a:p>
         </p:txBody>
       </p:sp>
+      <p:cxnSp>
+        <p:nvCxnSpPr>
+          <p:cNvPr id="5" name="Straight Connector 4"/>
+          <p:cNvCxnSpPr>
+            <a:stCxn id="44" idx="3"/>
+          </p:cNvCxnSpPr>
+          <p:nvPr/>
+        </p:nvCxnSpPr>
+        <p:spPr>
+          <a:xfrm>
+            <a:off x="4632430" y="6521232"/>
+            <a:ext cx="414290" cy="0"/>
+          </a:xfrm>
+          <a:prstGeom prst="line">
+            <a:avLst/>
+          </a:prstGeom>
+          <a:ln>
+            <a:solidFill>
+              <a:srgbClr val="FF0000"/>
+            </a:solidFill>
+            <a:prstDash val="dash"/>
+          </a:ln>
+        </p:spPr>
+        <p:style>
+          <a:lnRef idx="2">
+            <a:schemeClr val="accent1"/>
+          </a:lnRef>
+          <a:fillRef idx="0">
+            <a:schemeClr val="accent1"/>
+          </a:fillRef>
+          <a:effectRef idx="1">
+            <a:schemeClr val="accent1"/>
+          </a:effectRef>
+          <a:fontRef idx="minor">
+            <a:schemeClr val="tx1"/>
+          </a:fontRef>
+        </p:style>
+      </p:cxnSp>
+      <p:cxnSp>
+        <p:nvCxnSpPr>
+          <p:cNvPr id="51" name="Straight Arrow Connector 50"/>
+          <p:cNvCxnSpPr/>
+          <p:nvPr/>
+        </p:nvCxnSpPr>
+        <p:spPr>
+          <a:xfrm flipV="1">
+            <a:off x="5046719" y="5331170"/>
+            <a:ext cx="1" cy="1190062"/>
+          </a:xfrm>
+          <a:prstGeom prst="straightConnector1">
+            <a:avLst/>
+          </a:prstGeom>
+          <a:ln>
+            <a:solidFill>
+              <a:srgbClr val="FF0000"/>
+            </a:solidFill>
+            <a:prstDash val="dash"/>
+            <a:tailEnd type="arrow"/>
+          </a:ln>
+        </p:spPr>
+        <p:style>
+          <a:lnRef idx="2">
+            <a:schemeClr val="accent1"/>
+          </a:lnRef>
+          <a:fillRef idx="0">
+            <a:schemeClr val="accent1"/>
+          </a:fillRef>
+          <a:effectRef idx="1">
+            <a:schemeClr val="accent1"/>
+          </a:effectRef>
+          <a:fontRef idx="minor">
+            <a:schemeClr val="tx1"/>
+          </a:fontRef>
+        </p:style>
+      </p:cxnSp>
     </p:spTree>
     <p:extLst>
       <p:ext uri="{BB962C8B-B14F-4D97-AF65-F5344CB8AC3E}">
@@ -11289,7 +11748,7 @@
                                     <p:cond delay="0"/>
                                   </p:stCondLst>
                                   <p:childTnLst>
-                                    <p:animMotion origin="layout" path="M -0.00381 -0.07755 L -0.00468 -0.70463 " pathEditMode="relative" ptsTypes="AA">
+                                    <p:animMotion origin="layout" path="M 0.03455 0.00115 L 0.06978 0.00115 " pathEditMode="relative" ptsTypes="AA">
                                       <p:cBhvr>
                                         <p:cTn id="6" dur="2000" fill="hold"/>
                                         <p:tgtEl>
@@ -11328,7 +11787,7 @@
                                     <p:cond delay="0"/>
                                   </p:stCondLst>
                                   <p:childTnLst>
-                                    <p:animMotion origin="layout" path="M -0.00468 -0.70463 C -0.00538 -0.72454 -0.00607 -0.74399 -0.00746 -0.76343 C -0.00729 -0.77408 -0.00729 -0.78496 -0.00659 -0.79538 C -0.00538 -0.81922 0.02466 -0.81783 0.03455 -0.81829 C 0.05886 -0.822 0.08507 -0.82732 0.10834 -0.81575 C 0.11389 -0.80487 0.10608 -0.81852 0.1132 -0.81065 C 0.11407 -0.80973 0.11424 -0.80788 0.11511 -0.80672 C 0.1158 -0.80579 0.11684 -0.8051 0.11789 -0.80417 C 0.12136 -0.79514 0.12396 -0.79098 0.12552 -0.7801 C 0.12657 -0.71204 0.12657 -0.74005 0.12657 -0.69584 " pathEditMode="relative" ptsTypes="fffffffffA">
+                                    <p:animMotion origin="layout" path="M 0.06979 0.00115 L 0.06979 -0.1659 " pathEditMode="relative" ptsTypes="AA">
                                       <p:cBhvr>
                                         <p:cTn id="10" dur="2000" fill="hold"/>
                                         <p:tgtEl>
@@ -11367,7 +11826,7 @@
                                     <p:cond delay="0"/>
                                   </p:stCondLst>
                                   <p:childTnLst>
-                                    <p:animMotion origin="layout" path="M 0.12657 -0.69583 L 0.12657 -0.44051 " pathEditMode="relative" ptsTypes="AA">
+                                    <p:animMotion origin="layout" path="M 0.06978 -0.1659 L 0.06996 -0.52499 " pathEditMode="relative" ptsTypes="AA">
                                       <p:cBhvr>
                                         <p:cTn id="14" dur="2000" fill="hold"/>
                                         <p:tgtEl>
@@ -11406,9 +11865,87 @@
                                     <p:cond delay="0"/>
                                   </p:stCondLst>
                                   <p:childTnLst>
-                                    <p:animMotion origin="layout" path="M 0.12657 -0.44051 L 0.12674 -0.07755 " pathEditMode="relative" ptsTypes="AA">
+                                    <p:animMotion origin="layout" path="M 0.06996 -0.52499 L 0.06996 -0.764 " pathEditMode="relative" ptsTypes="AA">
                                       <p:cBhvr>
                                         <p:cTn id="18" dur="2000" fill="hold"/>
+                                        <p:tgtEl>
+                                          <p:spTgt spid="44"/>
+                                        </p:tgtEl>
+                                        <p:attrNameLst>
+                                          <p:attrName>ppt_x</p:attrName>
+                                          <p:attrName>ppt_y</p:attrName>
+                                        </p:attrNameLst>
+                                      </p:cBhvr>
+                                    </p:animMotion>
+                                  </p:childTnLst>
+                                </p:cTn>
+                              </p:par>
+                            </p:childTnLst>
+                          </p:cTn>
+                        </p:par>
+                      </p:childTnLst>
+                    </p:cTn>
+                  </p:par>
+                  <p:par>
+                    <p:cTn id="19" fill="hold">
+                      <p:stCondLst>
+                        <p:cond delay="indefinite"/>
+                      </p:stCondLst>
+                      <p:childTnLst>
+                        <p:par>
+                          <p:cTn id="20" fill="hold">
+                            <p:stCondLst>
+                              <p:cond delay="0"/>
+                            </p:stCondLst>
+                            <p:childTnLst>
+                              <p:par>
+                                <p:cTn id="21" presetID="0" presetClass="path" presetSubtype="0" accel="50000" decel="50000" fill="hold" nodeType="clickEffect">
+                                  <p:stCondLst>
+                                    <p:cond delay="0"/>
+                                  </p:stCondLst>
+                                  <p:childTnLst>
+                                    <p:animMotion origin="layout" path="M 0.06996 -0.764 L 0.06996 -0.9063 " pathEditMode="relative" ptsTypes="AA">
+                                      <p:cBhvr>
+                                        <p:cTn id="22" dur="2000" fill="hold"/>
+                                        <p:tgtEl>
+                                          <p:spTgt spid="44"/>
+                                        </p:tgtEl>
+                                        <p:attrNameLst>
+                                          <p:attrName>ppt_x</p:attrName>
+                                          <p:attrName>ppt_y</p:attrName>
+                                        </p:attrNameLst>
+                                      </p:cBhvr>
+                                    </p:animMotion>
+                                  </p:childTnLst>
+                                </p:cTn>
+                              </p:par>
+                            </p:childTnLst>
+                          </p:cTn>
+                        </p:par>
+                      </p:childTnLst>
+                    </p:cTn>
+                  </p:par>
+                  <p:par>
+                    <p:cTn id="23" fill="hold">
+                      <p:stCondLst>
+                        <p:cond delay="indefinite"/>
+                      </p:stCondLst>
+                      <p:childTnLst>
+                        <p:par>
+                          <p:cTn id="24" fill="hold">
+                            <p:stCondLst>
+                              <p:cond delay="0"/>
+                            </p:stCondLst>
+                            <p:childTnLst>
+                              <p:par>
+                                <p:cTn id="25" presetID="0" presetClass="path" presetSubtype="0" accel="50000" decel="50000" fill="hold" nodeType="clickEffect">
+                                  <p:stCondLst>
+                                    <p:cond delay="0"/>
+                                  </p:stCondLst>
+                                  <p:childTnLst>
+                                    <p:animMotion origin="layout" path="M 0.06995 -0.9063 L -0.05537 -0.9063 " pathEditMode="relative" ptsTypes="AA">
+                                      <p:cBhvr>
+                                        <p:cTn id="26" dur="2000" fill="hold"/>
                                         <p:tgtEl>
                                           <p:spTgt spid="44"/>
                                         </p:tgtEl>
@@ -20503,7 +21040,7 @@
         </p:blipFill>
         <p:spPr>
           <a:xfrm>
-            <a:off x="3722410" y="5731564"/>
+            <a:off x="3649126" y="5764810"/>
             <a:ext cx="455010" cy="410343"/>
           </a:xfrm>
           <a:prstGeom prst="rect">
@@ -20930,14 +21467,16 @@
       </p:sp>
       <p:cxnSp>
         <p:nvCxnSpPr>
-          <p:cNvPr id="5" name="Straight Connector 4"/>
-          <p:cNvCxnSpPr/>
+          <p:cNvPr id="57" name="Straight Connector 56"/>
+          <p:cNvCxnSpPr>
+            <a:stCxn id="44" idx="0"/>
+          </p:cNvCxnSpPr>
           <p:nvPr/>
         </p:nvCxnSpPr>
         <p:spPr>
-          <a:xfrm>
-            <a:off x="4271839" y="6404664"/>
-            <a:ext cx="177361" cy="253803"/>
+          <a:xfrm flipV="1">
+            <a:off x="3876631" y="360137"/>
+            <a:ext cx="18869" cy="5404673"/>
           </a:xfrm>
           <a:prstGeom prst="line">
             <a:avLst/>
@@ -20966,14 +21505,14 @@
       </p:cxnSp>
       <p:cxnSp>
         <p:nvCxnSpPr>
-          <p:cNvPr id="56" name="Straight Connector 55"/>
+          <p:cNvPr id="60" name="Straight Connector 59"/>
           <p:cNvCxnSpPr/>
           <p:nvPr/>
         </p:nvCxnSpPr>
         <p:spPr>
           <a:xfrm>
-            <a:off x="4449200" y="6658467"/>
-            <a:ext cx="642534" cy="0"/>
+            <a:off x="3895500" y="360137"/>
+            <a:ext cx="1196234" cy="0"/>
           </a:xfrm>
           <a:prstGeom prst="line">
             <a:avLst/>
@@ -21002,14 +21541,14 @@
       </p:cxnSp>
       <p:cxnSp>
         <p:nvCxnSpPr>
-          <p:cNvPr id="59" name="Straight Arrow Connector 58"/>
+          <p:cNvPr id="63" name="Straight Arrow Connector 62"/>
           <p:cNvCxnSpPr/>
           <p:nvPr/>
         </p:nvCxnSpPr>
         <p:spPr>
-          <a:xfrm flipH="1" flipV="1">
-            <a:off x="5072467" y="3063048"/>
-            <a:ext cx="19267" cy="3539716"/>
+          <a:xfrm>
+            <a:off x="5091734" y="360137"/>
+            <a:ext cx="0" cy="2634866"/>
           </a:xfrm>
           <a:prstGeom prst="straightConnector1">
             <a:avLst/>
@@ -21039,14 +21578,14 @@
       </p:cxnSp>
       <p:cxnSp>
         <p:nvCxnSpPr>
-          <p:cNvPr id="62" name="Straight Connector 61"/>
+          <p:cNvPr id="65" name="Straight Connector 64"/>
           <p:cNvCxnSpPr/>
           <p:nvPr/>
         </p:nvCxnSpPr>
         <p:spPr>
-          <a:xfrm flipV="1">
-            <a:off x="5072467" y="280276"/>
-            <a:ext cx="19267" cy="2714728"/>
+          <a:xfrm>
+            <a:off x="5091734" y="2995003"/>
+            <a:ext cx="0" cy="3477983"/>
           </a:xfrm>
           <a:prstGeom prst="line">
             <a:avLst/>
@@ -21075,14 +21614,14 @@
       </p:cxnSp>
       <p:cxnSp>
         <p:nvCxnSpPr>
-          <p:cNvPr id="68" name="Straight Connector 67"/>
+          <p:cNvPr id="67" name="Straight Connector 66"/>
           <p:cNvCxnSpPr/>
           <p:nvPr/>
         </p:nvCxnSpPr>
         <p:spPr>
           <a:xfrm>
-            <a:off x="5091734" y="280276"/>
-            <a:ext cx="1264048" cy="0"/>
+            <a:off x="5091734" y="6472986"/>
+            <a:ext cx="1192248" cy="0"/>
           </a:xfrm>
           <a:prstGeom prst="line">
             <a:avLst/>
@@ -21111,14 +21650,14 @@
       </p:cxnSp>
       <p:cxnSp>
         <p:nvCxnSpPr>
-          <p:cNvPr id="77" name="Straight Arrow Connector 76"/>
+          <p:cNvPr id="70" name="Straight Arrow Connector 69"/>
           <p:cNvCxnSpPr/>
           <p:nvPr/>
         </p:nvCxnSpPr>
         <p:spPr>
-          <a:xfrm>
-            <a:off x="6355782" y="280276"/>
-            <a:ext cx="0" cy="997697"/>
+          <a:xfrm flipV="1">
+            <a:off x="6283982" y="1165706"/>
+            <a:ext cx="0" cy="5307280"/>
           </a:xfrm>
           <a:prstGeom prst="straightConnector1">
             <a:avLst/>
@@ -21148,14 +21687,14 @@
       </p:cxnSp>
       <p:cxnSp>
         <p:nvCxnSpPr>
-          <p:cNvPr id="80" name="Straight Connector 79"/>
+          <p:cNvPr id="74" name="Straight Connector 73"/>
           <p:cNvCxnSpPr/>
           <p:nvPr/>
         </p:nvCxnSpPr>
         <p:spPr>
-          <a:xfrm>
-            <a:off x="6355782" y="1277973"/>
-            <a:ext cx="0" cy="5126691"/>
+          <a:xfrm flipV="1">
+            <a:off x="6283982" y="360137"/>
+            <a:ext cx="0" cy="805569"/>
           </a:xfrm>
           <a:prstGeom prst="line">
             <a:avLst/>
@@ -21184,14 +21723,14 @@
       </p:cxnSp>
       <p:cxnSp>
         <p:nvCxnSpPr>
-          <p:cNvPr id="84" name="Straight Connector 83"/>
+          <p:cNvPr id="79" name="Straight Connector 78"/>
           <p:cNvCxnSpPr/>
           <p:nvPr/>
         </p:nvCxnSpPr>
         <p:spPr>
           <a:xfrm>
-            <a:off x="6355782" y="6404664"/>
-            <a:ext cx="1135981" cy="0"/>
+            <a:off x="6283982" y="360137"/>
+            <a:ext cx="1063896" cy="0"/>
           </a:xfrm>
           <a:prstGeom prst="line">
             <a:avLst/>
@@ -21220,14 +21759,16 @@
       </p:cxnSp>
       <p:cxnSp>
         <p:nvCxnSpPr>
-          <p:cNvPr id="87" name="Straight Arrow Connector 86"/>
-          <p:cNvCxnSpPr/>
+          <p:cNvPr id="82" name="Straight Arrow Connector 81"/>
+          <p:cNvCxnSpPr>
+            <a:endCxn id="27" idx="3"/>
+          </p:cNvCxnSpPr>
           <p:nvPr/>
         </p:nvCxnSpPr>
         <p:spPr>
-          <a:xfrm flipV="1">
-            <a:off x="7491763" y="3645753"/>
-            <a:ext cx="0" cy="2758911"/>
+          <a:xfrm flipH="1">
+            <a:off x="7339198" y="360137"/>
+            <a:ext cx="8680" cy="3318365"/>
           </a:xfrm>
           <a:prstGeom prst="straightConnector1">
             <a:avLst/>
@@ -21257,14 +21798,16 @@
       </p:cxnSp>
       <p:cxnSp>
         <p:nvCxnSpPr>
-          <p:cNvPr id="91" name="Straight Connector 90"/>
-          <p:cNvCxnSpPr/>
+          <p:cNvPr id="85" name="Straight Connector 84"/>
+          <p:cNvCxnSpPr>
+            <a:stCxn id="27" idx="3"/>
+          </p:cNvCxnSpPr>
           <p:nvPr/>
         </p:nvCxnSpPr>
         <p:spPr>
-          <a:xfrm flipV="1">
-            <a:off x="7491763" y="280276"/>
-            <a:ext cx="0" cy="3272983"/>
+          <a:xfrm>
+            <a:off x="7339198" y="3678502"/>
+            <a:ext cx="0" cy="2794484"/>
           </a:xfrm>
           <a:prstGeom prst="line">
             <a:avLst/>
@@ -21293,14 +21836,14 @@
       </p:cxnSp>
       <p:cxnSp>
         <p:nvCxnSpPr>
-          <p:cNvPr id="94" name="Straight Connector 93"/>
+          <p:cNvPr id="88" name="Straight Connector 87"/>
           <p:cNvCxnSpPr/>
           <p:nvPr/>
         </p:nvCxnSpPr>
         <p:spPr>
           <a:xfrm>
-            <a:off x="7498163" y="280276"/>
-            <a:ext cx="960120" cy="0"/>
+            <a:off x="7338400" y="6472986"/>
+            <a:ext cx="1172937" cy="0"/>
           </a:xfrm>
           <a:prstGeom prst="line">
             <a:avLst/>
@@ -21329,14 +21872,14 @@
       </p:cxnSp>
       <p:cxnSp>
         <p:nvCxnSpPr>
-          <p:cNvPr id="96" name="Straight Arrow Connector 95"/>
+          <p:cNvPr id="92" name="Straight Arrow Connector 91"/>
           <p:cNvCxnSpPr/>
           <p:nvPr/>
         </p:nvCxnSpPr>
         <p:spPr>
-          <a:xfrm>
-            <a:off x="8458283" y="280276"/>
-            <a:ext cx="0" cy="2524010"/>
+          <a:xfrm flipV="1">
+            <a:off x="8511337" y="5262001"/>
+            <a:ext cx="0" cy="1210985"/>
           </a:xfrm>
           <a:prstGeom prst="straightConnector1">
             <a:avLst/>
@@ -21366,14 +21909,14 @@
       </p:cxnSp>
       <p:cxnSp>
         <p:nvCxnSpPr>
-          <p:cNvPr id="99" name="Straight Arrow Connector 98"/>
+          <p:cNvPr id="95" name="Straight Arrow Connector 94"/>
           <p:cNvCxnSpPr/>
           <p:nvPr/>
         </p:nvCxnSpPr>
         <p:spPr>
-          <a:xfrm>
-            <a:off x="8458283" y="2804286"/>
-            <a:ext cx="0" cy="2734803"/>
+          <a:xfrm flipV="1">
+            <a:off x="8511337" y="2995003"/>
+            <a:ext cx="0" cy="2266998"/>
           </a:xfrm>
           <a:prstGeom prst="straightConnector1">
             <a:avLst/>
@@ -21437,7 +21980,7 @@
                                     <p:cond delay="0"/>
                                   </p:stCondLst>
                                   <p:childTnLst>
-                                    <p:animMotion origin="layout" path="M 0.02465 0.05251 C 0.025 0.06153 0.02465 0.07078 0.02604 0.08004 C 0.02621 0.08189 0.02829 0.08212 0.02916 0.08397 C 0.02986 0.08559 0.02933 0.08813 0.03055 0.08975 C 0.04322 0.10664 0.06665 0.10432 0.08227 0.10571 C 0.0965 0.10502 0.11073 0.10525 0.12513 0.10363 C 0.14423 0.10109 0.13989 0.04834 0.13989 0.04071 " pathEditMode="relative" ptsTypes="ffffffA">
+                                    <p:animMotion origin="layout" path="M -0.00104 -0.03425 L 0.00209 -0.81606 " pathEditMode="relative" ptsTypes="AA">
                                       <p:cBhvr>
                                         <p:cTn id="6" dur="2000" fill="hold"/>
                                         <p:tgtEl>
@@ -21476,7 +22019,7 @@
                                     <p:cond delay="0"/>
                                   </p:stCondLst>
                                   <p:childTnLst>
-                                    <p:animMotion origin="layout" path="M 0.13989 0.04071 L 0.13989 -0.44761 " pathEditMode="relative" ptsTypes="AA">
+                                    <p:animMotion origin="layout" path="M 0.00209 -0.81606 L 0.13349 -0.81606 " pathEditMode="relative" ptsTypes="AA">
                                       <p:cBhvr>
                                         <p:cTn id="10" dur="2000" fill="hold"/>
                                         <p:tgtEl>
@@ -21515,7 +22058,7 @@
                                     <p:cond delay="0"/>
                                   </p:stCondLst>
                                   <p:childTnLst>
-                                    <p:animMotion origin="layout" path="M 0.13989 -0.44761 L 0.13989 -0.80986 " pathEditMode="relative" ptsTypes="AA">
+                                    <p:animMotion origin="layout" path="M 0.13349 -0.81606 L 0.13349 -0.42527 " pathEditMode="relative" ptsTypes="AA">
                                       <p:cBhvr>
                                         <p:cTn id="14" dur="2000" fill="hold"/>
                                         <p:tgtEl>
@@ -21554,7 +22097,7 @@
                                     <p:cond delay="0"/>
                                   </p:stCondLst>
                                   <p:childTnLst>
-                                    <p:animMotion origin="layout" path="M 0.13988 -0.80985 C 0.14839 -0.83275 0.16956 -0.82095 0.18865 -0.82165 C 0.20983 -0.82026 0.20861 -0.82049 0.22267 -0.81587 C 0.2251 -0.81517 0.22753 -0.81471 0.23013 -0.81378 C 0.23308 -0.81286 0.23898 -0.80985 0.23898 -0.80985 C 0.24332 -0.80152 0.24193 -0.80661 0.24193 -0.79412 " pathEditMode="relative" ptsTypes="fffffA">
+                                    <p:animMotion origin="layout" path="M 0.13349 -0.42527 L 0.13349 0.07311 " pathEditMode="relative" ptsTypes="AA">
                                       <p:cBhvr>
                                         <p:cTn id="18" dur="2000" fill="hold"/>
                                         <p:tgtEl>
@@ -21593,7 +22136,7 @@
                                     <p:cond delay="0"/>
                                   </p:stCondLst>
                                   <p:childTnLst>
-                                    <p:animMotion origin="layout" path="M 0.24194 -0.79412 L 0.24194 -0.6979 " pathEditMode="relative" ptsTypes="AA">
+                                    <p:animMotion origin="layout" path="M 0.13349 0.07311 L 0.26298 0.07311 " pathEditMode="relative" ptsTypes="AA">
                                       <p:cBhvr>
                                         <p:cTn id="22" dur="2000" fill="hold"/>
                                         <p:tgtEl>
@@ -21632,7 +22175,7 @@
                                     <p:cond delay="0"/>
                                   </p:stCondLst>
                                   <p:childTnLst>
-                                    <p:animMotion origin="layout" path="M 0.24194 -0.6979 L 0.24194 0.07356 " pathEditMode="relative" ptsTypes="AA">
+                                    <p:animMotion origin="layout" path="M 0.26298 0.07311 L 0.26298 -0.69181 " pathEditMode="relative" ptsTypes="AA">
                                       <p:cBhvr>
                                         <p:cTn id="26" dur="2000" fill="hold"/>
                                         <p:tgtEl>
@@ -21671,7 +22214,7 @@
                                     <p:cond delay="0"/>
                                   </p:stCondLst>
                                   <p:childTnLst>
-                                    <p:animMotion origin="layout" path="M 0.24194 0.07356 L 0.3806 0.07356 " pathEditMode="relative" ptsTypes="AA">
+                                    <p:animMotion origin="layout" path="M 0.26298 -0.69181 L 0.26298 -0.81606 " pathEditMode="relative" ptsTypes="AA">
                                       <p:cBhvr>
                                         <p:cTn id="30" dur="2000" fill="hold"/>
                                         <p:tgtEl>
@@ -21710,7 +22253,7 @@
                                     <p:cond delay="0"/>
                                   </p:stCondLst>
                                   <p:childTnLst>
-                                    <p:animMotion origin="layout" path="M 0.3806 0.07356 L 0.38078 -0.31205 " pathEditMode="relative" rAng="0" ptsTypes="AA">
+                                    <p:animMotion origin="layout" path="M 0.26298 -0.81606 L 0.38015 -0.81583 " pathEditMode="relative" ptsTypes="AA">
                                       <p:cBhvr>
                                         <p:cTn id="34" dur="2000" fill="hold"/>
                                         <p:tgtEl>
@@ -21721,7 +22264,6 @@
                                           <p:attrName>ppt_y</p:attrName>
                                         </p:attrNameLst>
                                       </p:cBhvr>
-                                      <p:rCtr x="0" y="-19292"/>
                                     </p:animMotion>
                                   </p:childTnLst>
                                 </p:cTn>
@@ -21750,7 +22292,7 @@
                                     <p:cond delay="0"/>
                                   </p:stCondLst>
                                   <p:childTnLst>
-                                    <p:animMotion origin="layout" path="M 0.38077 -0.31205 L 0.38077 -0.83276 " pathEditMode="relative" ptsTypes="AA">
+                                    <p:animMotion origin="layout" path="M 0.38015 -0.81583 L 0.38015 -0.3385 " pathEditMode="relative" ptsTypes="AA">
                                       <p:cBhvr>
                                         <p:cTn id="38" dur="2000" fill="hold"/>
                                         <p:tgtEl>
@@ -21789,7 +22331,7 @@
                                     <p:cond delay="0"/>
                                   </p:stCondLst>
                                   <p:childTnLst>
-                                    <p:animMotion origin="layout" path="M 0.38077 -0.83276 C 0.38563 -0.85404 0.42069 -0.83716 0.42659 -0.83669 C 0.43926 -0.83577 0.4521 -0.83554 0.46495 -0.83484 C 0.47119 -0.83276 0.47779 -0.83184 0.48404 -0.82883 C 0.48976 -0.82143 0.49428 -0.8124 0.49896 -0.80338 C 0.50209 -0.78927 0.50191 -0.78303 0.50191 -0.76591 " pathEditMode="relative" ptsTypes="fffffA">
+                                    <p:animMotion origin="layout" path="M 0.38015 -0.3385 L 0.38015 0.07288 " pathEditMode="relative" ptsTypes="AA">
                                       <p:cBhvr>
                                         <p:cTn id="42" dur="2000" fill="hold"/>
                                         <p:tgtEl>
@@ -21828,7 +22370,7 @@
                                     <p:cond delay="0"/>
                                   </p:stCondLst>
                                   <p:childTnLst>
-                                    <p:animMotion origin="layout" path="M 0.50191 -0.7659 L 0.50191 -0.4675 " pathEditMode="relative" ptsTypes="AA">
+                                    <p:animMotion origin="layout" path="M 0.38015 0.07288 L 0.50964 0.07288 " pathEditMode="relative" ptsTypes="AA">
                                       <p:cBhvr>
                                         <p:cTn id="46" dur="2000" fill="hold"/>
                                         <p:tgtEl>
@@ -21867,9 +22409,48 @@
                                     <p:cond delay="0"/>
                                   </p:stCondLst>
                                   <p:childTnLst>
-                                    <p:animMotion origin="layout" path="M 0.50191 -0.4675 L 0.50191 -0.1152 " pathEditMode="relative" ptsTypes="AA">
+                                    <p:animMotion origin="layout" path="M 0.50964 0.07288 L 0.50964 -0.09139 " pathEditMode="relative" ptsTypes="AA">
                                       <p:cBhvr>
                                         <p:cTn id="50" dur="2000" fill="hold"/>
+                                        <p:tgtEl>
+                                          <p:spTgt spid="44"/>
+                                        </p:tgtEl>
+                                        <p:attrNameLst>
+                                          <p:attrName>ppt_x</p:attrName>
+                                          <p:attrName>ppt_y</p:attrName>
+                                        </p:attrNameLst>
+                                      </p:cBhvr>
+                                    </p:animMotion>
+                                  </p:childTnLst>
+                                </p:cTn>
+                              </p:par>
+                            </p:childTnLst>
+                          </p:cTn>
+                        </p:par>
+                      </p:childTnLst>
+                    </p:cTn>
+                  </p:par>
+                  <p:par>
+                    <p:cTn id="51" fill="hold">
+                      <p:stCondLst>
+                        <p:cond delay="indefinite"/>
+                      </p:stCondLst>
+                      <p:childTnLst>
+                        <p:par>
+                          <p:cTn id="52" fill="hold">
+                            <p:stCondLst>
+                              <p:cond delay="0"/>
+                            </p:stCondLst>
+                            <p:childTnLst>
+                              <p:par>
+                                <p:cTn id="53" presetID="0" presetClass="path" presetSubtype="0" accel="50000" decel="50000" fill="hold" nodeType="clickEffect">
+                                  <p:stCondLst>
+                                    <p:cond delay="0"/>
+                                  </p:stCondLst>
+                                  <p:childTnLst>
+                                    <p:animMotion origin="layout" path="M 0.50964 -0.0914 L 0.50964 -0.42504 " pathEditMode="relative" ptsTypes="AA">
+                                      <p:cBhvr>
+                                        <p:cTn id="54" dur="2000" fill="hold"/>
                                         <p:tgtEl>
                                           <p:spTgt spid="44"/>
                                         </p:tgtEl>
@@ -21955,7 +22536,7 @@
       </p:sp>
       <p:pic>
         <p:nvPicPr>
-          <p:cNvPr id="4" name="Picture 3" descr="not-proximity.png"/>
+          <p:cNvPr id="3" name="Picture 2" descr="path-finding-issues.png"/>
           <p:cNvPicPr>
             <a:picLocks noChangeAspect="1"/>
           </p:cNvPicPr>
@@ -21975,8 +22556,8 @@
         </p:blipFill>
         <p:spPr>
           <a:xfrm>
-            <a:off x="987778" y="2564891"/>
-            <a:ext cx="7352193" cy="2310690"/>
+            <a:off x="1469106" y="1806966"/>
+            <a:ext cx="6094420" cy="3989920"/>
           </a:xfrm>
           <a:prstGeom prst="rect">
             <a:avLst/>
@@ -22389,23 +22970,7 @@
           <a:p>
             <a:r>
               <a:rPr lang="en-US" sz="2000" dirty="0" smtClean="0"/>
-              <a:t>Existing shopping list apps mostly categorize items into predefined categories, display available coupons, saving cards, </a:t>
-            </a:r>
-            <a:r>
-              <a:rPr lang="en-US" sz="2000" dirty="0" smtClean="0"/>
-              <a:t>display </a:t>
-            </a:r>
-            <a:r>
-              <a:rPr lang="en-US" sz="2000" dirty="0" smtClean="0"/>
-              <a:t>grocery stores in the vicinity, </a:t>
-            </a:r>
-            <a:r>
-              <a:rPr lang="en-US" sz="2000" dirty="0" smtClean="0"/>
-              <a:t>etc</a:t>
-            </a:r>
-            <a:r>
-              <a:rPr lang="en-US" sz="2000" dirty="0" smtClean="0"/>
-              <a:t>. </a:t>
+              <a:t>Existing shopping list apps mostly categorize items into predefined categories, display available coupons, saving cards, display grocery stores in the vicinity, etc. </a:t>
             </a:r>
           </a:p>
           <a:p>
@@ -22462,725 +23027,7 @@
   <p:timing>
     <p:tnLst>
       <p:par>
-        <p:cTn xmlns:p14="http://schemas.microsoft.com/office/powerpoint/2010/main" id="1" dur="indefinite" restart="never" nodeType="tmRoot">
-          <p:childTnLst>
-            <p:seq concurrent="1" nextAc="seek">
-              <p:cTn id="2" dur="indefinite" nodeType="mainSeq">
-                <p:childTnLst>
-                  <p:par>
-                    <p:cTn id="3" fill="hold">
-                      <p:stCondLst>
-                        <p:cond delay="indefinite"/>
-                      </p:stCondLst>
-                      <p:childTnLst>
-                        <p:par>
-                          <p:cTn id="4" fill="hold">
-                            <p:stCondLst>
-                              <p:cond delay="0"/>
-                            </p:stCondLst>
-                            <p:childTnLst>
-                              <p:par>
-                                <p:cTn id="5" presetID="16" presetClass="entr" presetSubtype="21" fill="hold" nodeType="clickEffect">
-                                  <p:stCondLst>
-                                    <p:cond delay="0"/>
-                                  </p:stCondLst>
-                                  <p:childTnLst>
-                                    <p:set>
-                                      <p:cBhvr>
-                                        <p:cTn id="6" dur="1" fill="hold">
-                                          <p:stCondLst>
-                                            <p:cond delay="0"/>
-                                          </p:stCondLst>
-                                        </p:cTn>
-                                        <p:tgtEl>
-                                          <p:spTgt spid="3">
-                                            <p:txEl>
-                                              <p:pRg st="0" end="0"/>
-                                            </p:txEl>
-                                          </p:spTgt>
-                                        </p:tgtEl>
-                                        <p:attrNameLst>
-                                          <p:attrName>style.visibility</p:attrName>
-                                        </p:attrNameLst>
-                                      </p:cBhvr>
-                                      <p:to>
-                                        <p:strVal val="visible"/>
-                                      </p:to>
-                                    </p:set>
-                                    <p:animEffect transition="in" filter="barn(inVertical)">
-                                      <p:cBhvr>
-                                        <p:cTn id="7" dur="500"/>
-                                        <p:tgtEl>
-                                          <p:spTgt spid="3">
-                                            <p:txEl>
-                                              <p:pRg st="0" end="0"/>
-                                            </p:txEl>
-                                          </p:spTgt>
-                                        </p:tgtEl>
-                                      </p:cBhvr>
-                                    </p:animEffect>
-                                  </p:childTnLst>
-                                </p:cTn>
-                              </p:par>
-                            </p:childTnLst>
-                          </p:cTn>
-                        </p:par>
-                      </p:childTnLst>
-                    </p:cTn>
-                  </p:par>
-                  <p:par>
-                    <p:cTn id="8" fill="hold">
-                      <p:stCondLst>
-                        <p:cond delay="indefinite"/>
-                      </p:stCondLst>
-                      <p:childTnLst>
-                        <p:par>
-                          <p:cTn id="9" fill="hold">
-                            <p:stCondLst>
-                              <p:cond delay="0"/>
-                            </p:stCondLst>
-                            <p:childTnLst>
-                              <p:par>
-                                <p:cTn id="10" presetID="55" presetClass="entr" presetSubtype="0" fill="hold" nodeType="clickEffect">
-                                  <p:stCondLst>
-                                    <p:cond delay="0"/>
-                                  </p:stCondLst>
-                                  <p:childTnLst>
-                                    <p:set>
-                                      <p:cBhvr>
-                                        <p:cTn id="11" dur="1" fill="hold">
-                                          <p:stCondLst>
-                                            <p:cond delay="0"/>
-                                          </p:stCondLst>
-                                        </p:cTn>
-                                        <p:tgtEl>
-                                          <p:spTgt spid="3">
-                                            <p:txEl>
-                                              <p:pRg st="2" end="2"/>
-                                            </p:txEl>
-                                          </p:spTgt>
-                                        </p:tgtEl>
-                                        <p:attrNameLst>
-                                          <p:attrName>style.visibility</p:attrName>
-                                        </p:attrNameLst>
-                                      </p:cBhvr>
-                                      <p:to>
-                                        <p:strVal val="visible"/>
-                                      </p:to>
-                                    </p:set>
-                                    <p:anim calcmode="lin" valueType="num">
-                                      <p:cBhvr>
-                                        <p:cTn id="12" dur="1000" fill="hold"/>
-                                        <p:tgtEl>
-                                          <p:spTgt spid="3">
-                                            <p:txEl>
-                                              <p:pRg st="2" end="2"/>
-                                            </p:txEl>
-                                          </p:spTgt>
-                                        </p:tgtEl>
-                                        <p:attrNameLst>
-                                          <p:attrName>ppt_w</p:attrName>
-                                        </p:attrNameLst>
-                                      </p:cBhvr>
-                                      <p:tavLst>
-                                        <p:tav tm="0">
-                                          <p:val>
-                                            <p:strVal val="#ppt_w*0.70"/>
-                                          </p:val>
-                                        </p:tav>
-                                        <p:tav tm="100000">
-                                          <p:val>
-                                            <p:strVal val="#ppt_w"/>
-                                          </p:val>
-                                        </p:tav>
-                                      </p:tavLst>
-                                    </p:anim>
-                                    <p:anim calcmode="lin" valueType="num">
-                                      <p:cBhvr>
-                                        <p:cTn id="13" dur="1000" fill="hold"/>
-                                        <p:tgtEl>
-                                          <p:spTgt spid="3">
-                                            <p:txEl>
-                                              <p:pRg st="2" end="2"/>
-                                            </p:txEl>
-                                          </p:spTgt>
-                                        </p:tgtEl>
-                                        <p:attrNameLst>
-                                          <p:attrName>ppt_h</p:attrName>
-                                        </p:attrNameLst>
-                                      </p:cBhvr>
-                                      <p:tavLst>
-                                        <p:tav tm="0">
-                                          <p:val>
-                                            <p:strVal val="#ppt_h"/>
-                                          </p:val>
-                                        </p:tav>
-                                        <p:tav tm="100000">
-                                          <p:val>
-                                            <p:strVal val="#ppt_h"/>
-                                          </p:val>
-                                        </p:tav>
-                                      </p:tavLst>
-                                    </p:anim>
-                                    <p:animEffect transition="in" filter="fade">
-                                      <p:cBhvr>
-                                        <p:cTn id="14" dur="1000"/>
-                                        <p:tgtEl>
-                                          <p:spTgt spid="3">
-                                            <p:txEl>
-                                              <p:pRg st="2" end="2"/>
-                                            </p:txEl>
-                                          </p:spTgt>
-                                        </p:tgtEl>
-                                      </p:cBhvr>
-                                    </p:animEffect>
-                                  </p:childTnLst>
-                                </p:cTn>
-                              </p:par>
-                            </p:childTnLst>
-                          </p:cTn>
-                        </p:par>
-                      </p:childTnLst>
-                    </p:cTn>
-                  </p:par>
-                  <p:par>
-                    <p:cTn id="15" fill="hold">
-                      <p:stCondLst>
-                        <p:cond delay="indefinite"/>
-                      </p:stCondLst>
-                      <p:childTnLst>
-                        <p:par>
-                          <p:cTn id="16" fill="hold">
-                            <p:stCondLst>
-                              <p:cond delay="0"/>
-                            </p:stCondLst>
-                            <p:childTnLst>
-                              <p:par>
-                                <p:cTn id="17" presetID="55" presetClass="entr" presetSubtype="0" fill="hold" nodeType="clickEffect">
-                                  <p:stCondLst>
-                                    <p:cond delay="0"/>
-                                  </p:stCondLst>
-                                  <p:childTnLst>
-                                    <p:set>
-                                      <p:cBhvr>
-                                        <p:cTn id="18" dur="1" fill="hold">
-                                          <p:stCondLst>
-                                            <p:cond delay="0"/>
-                                          </p:stCondLst>
-                                        </p:cTn>
-                                        <p:tgtEl>
-                                          <p:spTgt spid="3">
-                                            <p:txEl>
-                                              <p:pRg st="3" end="3"/>
-                                            </p:txEl>
-                                          </p:spTgt>
-                                        </p:tgtEl>
-                                        <p:attrNameLst>
-                                          <p:attrName>style.visibility</p:attrName>
-                                        </p:attrNameLst>
-                                      </p:cBhvr>
-                                      <p:to>
-                                        <p:strVal val="visible"/>
-                                      </p:to>
-                                    </p:set>
-                                    <p:anim calcmode="lin" valueType="num">
-                                      <p:cBhvr>
-                                        <p:cTn id="19" dur="1000" fill="hold"/>
-                                        <p:tgtEl>
-                                          <p:spTgt spid="3">
-                                            <p:txEl>
-                                              <p:pRg st="3" end="3"/>
-                                            </p:txEl>
-                                          </p:spTgt>
-                                        </p:tgtEl>
-                                        <p:attrNameLst>
-                                          <p:attrName>ppt_w</p:attrName>
-                                        </p:attrNameLst>
-                                      </p:cBhvr>
-                                      <p:tavLst>
-                                        <p:tav tm="0">
-                                          <p:val>
-                                            <p:strVal val="#ppt_w*0.70"/>
-                                          </p:val>
-                                        </p:tav>
-                                        <p:tav tm="100000">
-                                          <p:val>
-                                            <p:strVal val="#ppt_w"/>
-                                          </p:val>
-                                        </p:tav>
-                                      </p:tavLst>
-                                    </p:anim>
-                                    <p:anim calcmode="lin" valueType="num">
-                                      <p:cBhvr>
-                                        <p:cTn id="20" dur="1000" fill="hold"/>
-                                        <p:tgtEl>
-                                          <p:spTgt spid="3">
-                                            <p:txEl>
-                                              <p:pRg st="3" end="3"/>
-                                            </p:txEl>
-                                          </p:spTgt>
-                                        </p:tgtEl>
-                                        <p:attrNameLst>
-                                          <p:attrName>ppt_h</p:attrName>
-                                        </p:attrNameLst>
-                                      </p:cBhvr>
-                                      <p:tavLst>
-                                        <p:tav tm="0">
-                                          <p:val>
-                                            <p:strVal val="#ppt_h"/>
-                                          </p:val>
-                                        </p:tav>
-                                        <p:tav tm="100000">
-                                          <p:val>
-                                            <p:strVal val="#ppt_h"/>
-                                          </p:val>
-                                        </p:tav>
-                                      </p:tavLst>
-                                    </p:anim>
-                                    <p:animEffect transition="in" filter="fade">
-                                      <p:cBhvr>
-                                        <p:cTn id="21" dur="1000"/>
-                                        <p:tgtEl>
-                                          <p:spTgt spid="3">
-                                            <p:txEl>
-                                              <p:pRg st="3" end="3"/>
-                                            </p:txEl>
-                                          </p:spTgt>
-                                        </p:tgtEl>
-                                      </p:cBhvr>
-                                    </p:animEffect>
-                                  </p:childTnLst>
-                                </p:cTn>
-                              </p:par>
-                            </p:childTnLst>
-                          </p:cTn>
-                        </p:par>
-                      </p:childTnLst>
-                    </p:cTn>
-                  </p:par>
-                  <p:par>
-                    <p:cTn id="22" fill="hold">
-                      <p:stCondLst>
-                        <p:cond delay="indefinite"/>
-                      </p:stCondLst>
-                      <p:childTnLst>
-                        <p:par>
-                          <p:cTn id="23" fill="hold">
-                            <p:stCondLst>
-                              <p:cond delay="0"/>
-                            </p:stCondLst>
-                            <p:childTnLst>
-                              <p:par>
-                                <p:cTn id="24" presetID="55" presetClass="entr" presetSubtype="0" fill="hold" nodeType="clickEffect">
-                                  <p:stCondLst>
-                                    <p:cond delay="0"/>
-                                  </p:stCondLst>
-                                  <p:childTnLst>
-                                    <p:set>
-                                      <p:cBhvr>
-                                        <p:cTn id="25" dur="1" fill="hold">
-                                          <p:stCondLst>
-                                            <p:cond delay="0"/>
-                                          </p:stCondLst>
-                                        </p:cTn>
-                                        <p:tgtEl>
-                                          <p:spTgt spid="3">
-                                            <p:txEl>
-                                              <p:pRg st="4" end="4"/>
-                                            </p:txEl>
-                                          </p:spTgt>
-                                        </p:tgtEl>
-                                        <p:attrNameLst>
-                                          <p:attrName>style.visibility</p:attrName>
-                                        </p:attrNameLst>
-                                      </p:cBhvr>
-                                      <p:to>
-                                        <p:strVal val="visible"/>
-                                      </p:to>
-                                    </p:set>
-                                    <p:anim calcmode="lin" valueType="num">
-                                      <p:cBhvr>
-                                        <p:cTn id="26" dur="1000" fill="hold"/>
-                                        <p:tgtEl>
-                                          <p:spTgt spid="3">
-                                            <p:txEl>
-                                              <p:pRg st="4" end="4"/>
-                                            </p:txEl>
-                                          </p:spTgt>
-                                        </p:tgtEl>
-                                        <p:attrNameLst>
-                                          <p:attrName>ppt_w</p:attrName>
-                                        </p:attrNameLst>
-                                      </p:cBhvr>
-                                      <p:tavLst>
-                                        <p:tav tm="0">
-                                          <p:val>
-                                            <p:strVal val="#ppt_w*0.70"/>
-                                          </p:val>
-                                        </p:tav>
-                                        <p:tav tm="100000">
-                                          <p:val>
-                                            <p:strVal val="#ppt_w"/>
-                                          </p:val>
-                                        </p:tav>
-                                      </p:tavLst>
-                                    </p:anim>
-                                    <p:anim calcmode="lin" valueType="num">
-                                      <p:cBhvr>
-                                        <p:cTn id="27" dur="1000" fill="hold"/>
-                                        <p:tgtEl>
-                                          <p:spTgt spid="3">
-                                            <p:txEl>
-                                              <p:pRg st="4" end="4"/>
-                                            </p:txEl>
-                                          </p:spTgt>
-                                        </p:tgtEl>
-                                        <p:attrNameLst>
-                                          <p:attrName>ppt_h</p:attrName>
-                                        </p:attrNameLst>
-                                      </p:cBhvr>
-                                      <p:tavLst>
-                                        <p:tav tm="0">
-                                          <p:val>
-                                            <p:strVal val="#ppt_h"/>
-                                          </p:val>
-                                        </p:tav>
-                                        <p:tav tm="100000">
-                                          <p:val>
-                                            <p:strVal val="#ppt_h"/>
-                                          </p:val>
-                                        </p:tav>
-                                      </p:tavLst>
-                                    </p:anim>
-                                    <p:animEffect transition="in" filter="fade">
-                                      <p:cBhvr>
-                                        <p:cTn id="28" dur="1000"/>
-                                        <p:tgtEl>
-                                          <p:spTgt spid="3">
-                                            <p:txEl>
-                                              <p:pRg st="4" end="4"/>
-                                            </p:txEl>
-                                          </p:spTgt>
-                                        </p:tgtEl>
-                                      </p:cBhvr>
-                                    </p:animEffect>
-                                  </p:childTnLst>
-                                </p:cTn>
-                              </p:par>
-                            </p:childTnLst>
-                          </p:cTn>
-                        </p:par>
-                      </p:childTnLst>
-                    </p:cTn>
-                  </p:par>
-                  <p:par>
-                    <p:cTn id="29" fill="hold">
-                      <p:stCondLst>
-                        <p:cond delay="indefinite"/>
-                      </p:stCondLst>
-                      <p:childTnLst>
-                        <p:par>
-                          <p:cTn id="30" fill="hold">
-                            <p:stCondLst>
-                              <p:cond delay="0"/>
-                            </p:stCondLst>
-                            <p:childTnLst>
-                              <p:par>
-                                <p:cTn id="31" presetID="6" presetClass="entr" presetSubtype="16" fill="hold" nodeType="clickEffect">
-                                  <p:stCondLst>
-                                    <p:cond delay="0"/>
-                                  </p:stCondLst>
-                                  <p:childTnLst>
-                                    <p:set>
-                                      <p:cBhvr>
-                                        <p:cTn id="32" dur="1" fill="hold">
-                                          <p:stCondLst>
-                                            <p:cond delay="0"/>
-                                          </p:stCondLst>
-                                        </p:cTn>
-                                        <p:tgtEl>
-                                          <p:spTgt spid="3">
-                                            <p:txEl>
-                                              <p:pRg st="6" end="6"/>
-                                            </p:txEl>
-                                          </p:spTgt>
-                                        </p:tgtEl>
-                                        <p:attrNameLst>
-                                          <p:attrName>style.visibility</p:attrName>
-                                        </p:attrNameLst>
-                                      </p:cBhvr>
-                                      <p:to>
-                                        <p:strVal val="visible"/>
-                                      </p:to>
-                                    </p:set>
-                                    <p:animEffect transition="in" filter="circle(in)">
-                                      <p:cBhvr>
-                                        <p:cTn id="33" dur="2000"/>
-                                        <p:tgtEl>
-                                          <p:spTgt spid="3">
-                                            <p:txEl>
-                                              <p:pRg st="6" end="6"/>
-                                            </p:txEl>
-                                          </p:spTgt>
-                                        </p:tgtEl>
-                                      </p:cBhvr>
-                                    </p:animEffect>
-                                  </p:childTnLst>
-                                </p:cTn>
-                              </p:par>
-                              <p:par>
-                                <p:cTn id="34" presetID="6" presetClass="entr" presetSubtype="16" fill="hold" nodeType="withEffect">
-                                  <p:stCondLst>
-                                    <p:cond delay="0"/>
-                                  </p:stCondLst>
-                                  <p:childTnLst>
-                                    <p:set>
-                                      <p:cBhvr>
-                                        <p:cTn id="35" dur="1" fill="hold">
-                                          <p:stCondLst>
-                                            <p:cond delay="0"/>
-                                          </p:stCondLst>
-                                        </p:cTn>
-                                        <p:tgtEl>
-                                          <p:spTgt spid="3">
-                                            <p:txEl>
-                                              <p:pRg st="8" end="8"/>
-                                            </p:txEl>
-                                          </p:spTgt>
-                                        </p:tgtEl>
-                                        <p:attrNameLst>
-                                          <p:attrName>style.visibility</p:attrName>
-                                        </p:attrNameLst>
-                                      </p:cBhvr>
-                                      <p:to>
-                                        <p:strVal val="visible"/>
-                                      </p:to>
-                                    </p:set>
-                                    <p:animEffect transition="in" filter="circle(in)">
-                                      <p:cBhvr>
-                                        <p:cTn id="36" dur="2000"/>
-                                        <p:tgtEl>
-                                          <p:spTgt spid="3">
-                                            <p:txEl>
-                                              <p:pRg st="8" end="8"/>
-                                            </p:txEl>
-                                          </p:spTgt>
-                                        </p:tgtEl>
-                                      </p:cBhvr>
-                                    </p:animEffect>
-                                  </p:childTnLst>
-                                </p:cTn>
-                              </p:par>
-                              <p:par>
-                                <p:cTn id="37" presetID="6" presetClass="entr" presetSubtype="16" fill="hold" nodeType="withEffect">
-                                  <p:stCondLst>
-                                    <p:cond delay="0"/>
-                                  </p:stCondLst>
-                                  <p:childTnLst>
-                                    <p:set>
-                                      <p:cBhvr>
-                                        <p:cTn id="38" dur="1" fill="hold">
-                                          <p:stCondLst>
-                                            <p:cond delay="0"/>
-                                          </p:stCondLst>
-                                        </p:cTn>
-                                        <p:tgtEl>
-                                          <p:spTgt spid="3">
-                                            <p:txEl>
-                                              <p:pRg st="10" end="10"/>
-                                            </p:txEl>
-                                          </p:spTgt>
-                                        </p:tgtEl>
-                                        <p:attrNameLst>
-                                          <p:attrName>style.visibility</p:attrName>
-                                        </p:attrNameLst>
-                                      </p:cBhvr>
-                                      <p:to>
-                                        <p:strVal val="visible"/>
-                                      </p:to>
-                                    </p:set>
-                                    <p:animEffect transition="in" filter="circle(in)">
-                                      <p:cBhvr>
-                                        <p:cTn id="39" dur="2000"/>
-                                        <p:tgtEl>
-                                          <p:spTgt spid="3">
-                                            <p:txEl>
-                                              <p:pRg st="10" end="10"/>
-                                            </p:txEl>
-                                          </p:spTgt>
-                                        </p:tgtEl>
-                                      </p:cBhvr>
-                                    </p:animEffect>
-                                  </p:childTnLst>
-                                </p:cTn>
-                              </p:par>
-                            </p:childTnLst>
-                          </p:cTn>
-                        </p:par>
-                      </p:childTnLst>
-                    </p:cTn>
-                  </p:par>
-                  <p:par>
-                    <p:cTn id="40" fill="hold">
-                      <p:stCondLst>
-                        <p:cond delay="indefinite"/>
-                      </p:stCondLst>
-                      <p:childTnLst>
-                        <p:par>
-                          <p:cTn id="41" fill="hold">
-                            <p:stCondLst>
-                              <p:cond delay="0"/>
-                            </p:stCondLst>
-                            <p:childTnLst>
-                              <p:par>
-                                <p:cTn id="42" presetID="31" presetClass="entr" presetSubtype="0" fill="hold" nodeType="clickEffect">
-                                  <p:stCondLst>
-                                    <p:cond delay="0"/>
-                                  </p:stCondLst>
-                                  <p:childTnLst>
-                                    <p:set>
-                                      <p:cBhvr>
-                                        <p:cTn id="43" dur="1" fill="hold">
-                                          <p:stCondLst>
-                                            <p:cond delay="0"/>
-                                          </p:stCondLst>
-                                        </p:cTn>
-                                        <p:tgtEl>
-                                          <p:spTgt spid="3">
-                                            <p:txEl>
-                                              <p:pRg st="12" end="12"/>
-                                            </p:txEl>
-                                          </p:spTgt>
-                                        </p:tgtEl>
-                                        <p:attrNameLst>
-                                          <p:attrName>style.visibility</p:attrName>
-                                        </p:attrNameLst>
-                                      </p:cBhvr>
-                                      <p:to>
-                                        <p:strVal val="visible"/>
-                                      </p:to>
-                                    </p:set>
-                                    <p:anim calcmode="lin" valueType="num">
-                                      <p:cBhvr>
-                                        <p:cTn id="44" dur="1000" fill="hold"/>
-                                        <p:tgtEl>
-                                          <p:spTgt spid="3">
-                                            <p:txEl>
-                                              <p:pRg st="12" end="12"/>
-                                            </p:txEl>
-                                          </p:spTgt>
-                                        </p:tgtEl>
-                                        <p:attrNameLst>
-                                          <p:attrName>ppt_w</p:attrName>
-                                        </p:attrNameLst>
-                                      </p:cBhvr>
-                                      <p:tavLst>
-                                        <p:tav tm="0">
-                                          <p:val>
-                                            <p:fltVal val="0"/>
-                                          </p:val>
-                                        </p:tav>
-                                        <p:tav tm="100000">
-                                          <p:val>
-                                            <p:strVal val="#ppt_w"/>
-                                          </p:val>
-                                        </p:tav>
-                                      </p:tavLst>
-                                    </p:anim>
-                                    <p:anim calcmode="lin" valueType="num">
-                                      <p:cBhvr>
-                                        <p:cTn id="45" dur="1000" fill="hold"/>
-                                        <p:tgtEl>
-                                          <p:spTgt spid="3">
-                                            <p:txEl>
-                                              <p:pRg st="12" end="12"/>
-                                            </p:txEl>
-                                          </p:spTgt>
-                                        </p:tgtEl>
-                                        <p:attrNameLst>
-                                          <p:attrName>ppt_h</p:attrName>
-                                        </p:attrNameLst>
-                                      </p:cBhvr>
-                                      <p:tavLst>
-                                        <p:tav tm="0">
-                                          <p:val>
-                                            <p:fltVal val="0"/>
-                                          </p:val>
-                                        </p:tav>
-                                        <p:tav tm="100000">
-                                          <p:val>
-                                            <p:strVal val="#ppt_h"/>
-                                          </p:val>
-                                        </p:tav>
-                                      </p:tavLst>
-                                    </p:anim>
-                                    <p:anim calcmode="lin" valueType="num">
-                                      <p:cBhvr>
-                                        <p:cTn id="46" dur="1000" fill="hold"/>
-                                        <p:tgtEl>
-                                          <p:spTgt spid="3">
-                                            <p:txEl>
-                                              <p:pRg st="12" end="12"/>
-                                            </p:txEl>
-                                          </p:spTgt>
-                                        </p:tgtEl>
-                                        <p:attrNameLst>
-                                          <p:attrName>style.rotation</p:attrName>
-                                        </p:attrNameLst>
-                                      </p:cBhvr>
-                                      <p:tavLst>
-                                        <p:tav tm="0">
-                                          <p:val>
-                                            <p:fltVal val="90"/>
-                                          </p:val>
-                                        </p:tav>
-                                        <p:tav tm="100000">
-                                          <p:val>
-                                            <p:fltVal val="0"/>
-                                          </p:val>
-                                        </p:tav>
-                                      </p:tavLst>
-                                    </p:anim>
-                                    <p:animEffect transition="in" filter="fade">
-                                      <p:cBhvr>
-                                        <p:cTn id="47" dur="1000"/>
-                                        <p:tgtEl>
-                                          <p:spTgt spid="3">
-                                            <p:txEl>
-                                              <p:pRg st="12" end="12"/>
-                                            </p:txEl>
-                                          </p:spTgt>
-                                        </p:tgtEl>
-                                      </p:cBhvr>
-                                    </p:animEffect>
-                                  </p:childTnLst>
-                                </p:cTn>
-                              </p:par>
-                            </p:childTnLst>
-                          </p:cTn>
-                        </p:par>
-                      </p:childTnLst>
-                    </p:cTn>
-                  </p:par>
-                </p:childTnLst>
-              </p:cTn>
-              <p:prevCondLst>
-                <p:cond evt="onPrev" delay="0">
-                  <p:tgtEl>
-                    <p:sldTgt/>
-                  </p:tgtEl>
-                </p:cond>
-              </p:prevCondLst>
-              <p:nextCondLst>
-                <p:cond evt="onNext" delay="0">
-                  <p:tgtEl>
-                    <p:sldTgt/>
-                  </p:tgtEl>
-                </p:cond>
-              </p:nextCondLst>
-            </p:seq>
-          </p:childTnLst>
-        </p:cTn>
+        <p:cTn xmlns:p14="http://schemas.microsoft.com/office/powerpoint/2010/main" id="1" dur="indefinite" restart="never" nodeType="tmRoot"/>
       </p:par>
     </p:tnLst>
   </p:timing>
@@ -23507,121 +23354,153 @@
             <p:ph idx="1"/>
           </p:nvPr>
         </p:nvSpPr>
-        <p:spPr/>
+        <p:spPr>
+          <a:xfrm>
+            <a:off x="457200" y="1600200"/>
+            <a:ext cx="8229600" cy="4882263"/>
+          </a:xfrm>
+        </p:spPr>
         <p:txBody>
           <a:bodyPr>
-            <a:normAutofit fontScale="92500" lnSpcReduction="20000"/>
+            <a:normAutofit/>
           </a:bodyPr>
           <a:lstStyle/>
           <a:p>
             <a:r>
-              <a:rPr lang="en-US" dirty="0" smtClean="0"/>
+              <a:rPr lang="en-US" sz="1800" dirty="0" smtClean="0"/>
               <a:t>Start with fully characterized Dual graph</a:t>
             </a:r>
           </a:p>
           <a:p>
-            <a:r>
-              <a:rPr lang="en-US" dirty="0" smtClean="0"/>
-              <a:t>Use all-pairs shortest path finder (</a:t>
-            </a:r>
-            <a:r>
-              <a:rPr lang="en-US" dirty="0" err="1" smtClean="0"/>
+            <a:endParaRPr lang="en-US" sz="1800" dirty="0" smtClean="0"/>
+          </a:p>
+          <a:p>
+            <a:r>
+              <a:rPr lang="en-US" sz="1800" dirty="0" smtClean="0"/>
+              <a:t>Use </a:t>
+            </a:r>
+            <a:r>
+              <a:rPr lang="en-US" sz="1800" dirty="0" smtClean="0"/>
+              <a:t>all-pairs shortest path finder (</a:t>
+            </a:r>
+            <a:r>
+              <a:rPr lang="en-US" sz="1800" dirty="0" err="1" smtClean="0"/>
               <a:t>Dijkstra’s</a:t>
             </a:r>
             <a:r>
-              <a:rPr lang="en-US" dirty="0" smtClean="0"/>
+              <a:rPr lang="en-US" sz="1800" dirty="0" smtClean="0"/>
               <a:t> algorithm on every node)</a:t>
             </a:r>
           </a:p>
           <a:p>
-            <a:r>
-              <a:rPr lang="en-US" dirty="0" smtClean="0"/>
-              <a:t>Each category associated with </a:t>
+            <a:endParaRPr lang="en-US" sz="1800" dirty="0" smtClean="0"/>
+          </a:p>
+          <a:p>
+            <a:r>
+              <a:rPr lang="en-US" sz="1800" dirty="0" smtClean="0"/>
+              <a:t>Each </a:t>
+            </a:r>
+            <a:r>
+              <a:rPr lang="en-US" sz="1800" dirty="0" smtClean="0"/>
+              <a:t>category associated with </a:t>
             </a:r>
           </a:p>
           <a:p>
             <a:pPr lvl="1"/>
             <a:r>
-              <a:rPr lang="en-US" dirty="0" smtClean="0"/>
+              <a:rPr lang="en-US" sz="1800" dirty="0" smtClean="0"/>
               <a:t>a set of </a:t>
             </a:r>
             <a:r>
-              <a:rPr lang="en-US" b="1" dirty="0" smtClean="0"/>
+              <a:rPr lang="en-US" sz="1800" b="1" dirty="0" smtClean="0"/>
               <a:t>primal edges</a:t>
             </a:r>
           </a:p>
           <a:p>
             <a:pPr lvl="1"/>
             <a:r>
-              <a:rPr lang="en-US" dirty="0" smtClean="0"/>
+              <a:rPr lang="en-US" sz="1800" dirty="0" smtClean="0"/>
               <a:t>a set of </a:t>
             </a:r>
             <a:r>
-              <a:rPr lang="en-US" b="1" dirty="0" smtClean="0"/>
+              <a:rPr lang="en-US" sz="1800" b="1" dirty="0" smtClean="0"/>
               <a:t>dual nodes</a:t>
             </a:r>
           </a:p>
           <a:p>
-            <a:r>
-              <a:rPr lang="en-US" dirty="0" smtClean="0"/>
-              <a:t>Consider distance from a dual node to a category as:</a:t>
-            </a:r>
-          </a:p>
-          <a:p>
-            <a:pPr marL="1371600" lvl="6" indent="0">
+            <a:endParaRPr lang="en-US" sz="1800" dirty="0" smtClean="0"/>
+          </a:p>
+          <a:p>
+            <a:r>
+              <a:rPr lang="en-US" sz="1800" dirty="0" smtClean="0"/>
+              <a:t>Consider </a:t>
+            </a:r>
+            <a:r>
+              <a:rPr lang="en-US" sz="1800" dirty="0" smtClean="0"/>
+              <a:t>distance from a dual node to a category as</a:t>
+            </a:r>
+            <a:r>
+              <a:rPr lang="en-US" sz="1800" dirty="0" smtClean="0"/>
+              <a:t>:</a:t>
+            </a:r>
+          </a:p>
+          <a:p>
+            <a:endParaRPr lang="en-US" sz="1800" dirty="0" smtClean="0"/>
+          </a:p>
+          <a:p>
+            <a:pPr marL="0" indent="0">
               <a:buNone/>
             </a:pPr>
-            <a:r>
-              <a:rPr lang="en-US" dirty="0" err="1"/>
-              <a:t>dist</a:t>
-            </a:r>
-            <a:r>
-              <a:rPr lang="en-US" dirty="0"/>
-              <a:t> (</a:t>
-            </a:r>
-            <a:r>
-              <a:rPr lang="en-US" i="1" dirty="0"/>
-              <a:t>u</a:t>
-            </a:r>
-            <a:r>
-              <a:rPr lang="en-US" dirty="0"/>
-              <a:t>, category) = min { </a:t>
-            </a:r>
-            <a:r>
-              <a:rPr lang="en-US" dirty="0" err="1"/>
-              <a:t>dist</a:t>
-            </a:r>
-            <a:r>
-              <a:rPr lang="en-US" dirty="0"/>
-              <a:t>(</a:t>
-            </a:r>
-            <a:r>
-              <a:rPr lang="en-US" i="1" dirty="0"/>
-              <a:t>u, v</a:t>
-            </a:r>
-            <a:r>
-              <a:rPr lang="en-US" dirty="0"/>
-              <a:t>) </a:t>
-            </a:r>
-            <a:r>
-              <a:rPr lang="en-US" dirty="0" smtClean="0"/>
-              <a:t>}</a:t>
-            </a:r>
-          </a:p>
-          <a:p>
-            <a:r>
-              <a:rPr lang="en-US" dirty="0" smtClean="0"/>
-              <a:t>Greedy algorithm to walk from category to category</a:t>
+            <a:endParaRPr lang="en-US" sz="1800" dirty="0" smtClean="0"/>
+          </a:p>
+          <a:p>
+            <a:r>
+              <a:rPr lang="en-US" sz="1800" dirty="0" smtClean="0"/>
+              <a:t>Greedy </a:t>
+            </a:r>
+            <a:r>
+              <a:rPr lang="en-US" sz="1800" dirty="0" smtClean="0"/>
+              <a:t>algorithm to walk from category to category</a:t>
             </a:r>
           </a:p>
           <a:p>
             <a:pPr marL="1371600" lvl="3" indent="0">
               <a:buNone/>
             </a:pPr>
-            <a:endParaRPr lang="en-US" dirty="0" smtClean="0"/>
-          </a:p>
-        </p:txBody>
-      </p:sp>
+            <a:endParaRPr lang="en-US" sz="1800" dirty="0" smtClean="0"/>
+          </a:p>
+        </p:txBody>
+      </p:sp>
+      <p:pic>
+        <p:nvPicPr>
+          <p:cNvPr id="4" name="Picture 3" descr="distance-eqn.png"/>
+          <p:cNvPicPr>
+            <a:picLocks noChangeAspect="1"/>
+          </p:cNvPicPr>
+          <p:nvPr/>
+        </p:nvPicPr>
+        <p:blipFill>
+          <a:blip r:embed="rId2">
+            <a:extLst>
+              <a:ext uri="{28A0092B-C50C-407E-A947-70E740481C1C}">
+                <a14:useLocalDpi xmlns:a14="http://schemas.microsoft.com/office/drawing/2010/main" val="0"/>
+              </a:ext>
+            </a:extLst>
+          </a:blip>
+          <a:stretch>
+            <a:fillRect/>
+          </a:stretch>
+        </p:blipFill>
+        <p:spPr>
+          <a:xfrm>
+            <a:off x="1924055" y="4767170"/>
+            <a:ext cx="2919256" cy="368450"/>
+          </a:xfrm>
+          <a:prstGeom prst="rect">
+            <a:avLst/>
+          </a:prstGeom>
+        </p:spPr>
+      </p:pic>
     </p:spTree>
     <p:extLst>
       <p:ext uri="{BB962C8B-B14F-4D97-AF65-F5344CB8AC3E}">
@@ -23741,7 +23620,6 @@
               <a:rPr lang="en-US" sz="2800" dirty="0"/>
               <a:t>such data could then be made available to other users in the same area </a:t>
             </a:r>
-            <a:endParaRPr lang="en-US" sz="2800" dirty="0"/>
           </a:p>
           <a:p>
             <a:endParaRPr lang="en-US" sz="2800" dirty="0" smtClean="0"/>

</xml_diff>